<commit_message>
merge old chapter "buffer mode" with the new one
</commit_message>
<xml_diff>
--- a/VEEPortingGuide/images/ui_overview2.pptx
+++ b/VEEPortingGuide/images/ui_overview2.pptx
@@ -5,10 +5,10 @@
     <p:sldMasterId id="2147483660" r:id="rId1"/>
   </p:sldMasterIdLst>
   <p:notesMasterIdLst>
-    <p:notesMasterId r:id="rId11"/>
+    <p:notesMasterId r:id="rId13"/>
   </p:notesMasterIdLst>
   <p:handoutMasterIdLst>
-    <p:handoutMasterId r:id="rId12"/>
+    <p:handoutMasterId r:id="rId14"/>
   </p:handoutMasterIdLst>
   <p:sldIdLst>
     <p:sldId id="256" r:id="rId2"/>
@@ -20,6 +20,8 @@
     <p:sldId id="312" r:id="rId8"/>
     <p:sldId id="313" r:id="rId9"/>
     <p:sldId id="316" r:id="rId10"/>
+    <p:sldId id="318" r:id="rId11"/>
+    <p:sldId id="317" r:id="rId12"/>
   </p:sldIdLst>
   <p:sldSz cx="12192000" cy="6858000"/>
   <p:notesSz cx="6858000" cy="9144000"/>
@@ -235,7 +237,7 @@
               <a:rPr lang="fr-FR" smtClean="0">
                 <a:latin typeface="Calibri Regular" charset="0"/>
               </a:rPr>
-              <a:t>mercredi 31 janvier 2024</a:t>
+              <a:t>vendredi 2 février 2024</a:t>
             </a:fld>
             <a:endParaRPr lang="en-US" dirty="0">
               <a:latin typeface="Calibri Regular" charset="0"/>
@@ -413,7 +415,7 @@
           <a:p>
             <a:fld id="{885721CF-495B-2B41-A23A-4D3221F80235}" type="datetime2">
               <a:rPr lang="fr-FR" smtClean="0"/>
-              <a:t>mercredi 31 janvier 2024</a:t>
+              <a:t>vendredi 2 février 2024</a:t>
             </a:fld>
             <a:endParaRPr lang="en-US" dirty="0"/>
           </a:p>
@@ -857,6 +859,177 @@
 </p:notes>
 </file>
 
+<file path=ppt/notesSlides/notesSlide10.xml><?xml version="1.0" encoding="utf-8"?>
+<p:notes xmlns:a="http://schemas.openxmlformats.org/drawingml/2006/main" xmlns:r="http://schemas.openxmlformats.org/officeDocument/2006/relationships" xmlns:p="http://schemas.openxmlformats.org/presentationml/2006/main">
+  <p:cSld>
+    <p:spTree>
+      <p:nvGrpSpPr>
+        <p:cNvPr id="1" name=""/>
+        <p:cNvGrpSpPr/>
+        <p:nvPr/>
+      </p:nvGrpSpPr>
+      <p:grpSpPr>
+        <a:xfrm>
+          <a:off x="0" y="0"/>
+          <a:ext cx="0" cy="0"/>
+          <a:chOff x="0" y="0"/>
+          <a:chExt cx="0" cy="0"/>
+        </a:xfrm>
+      </p:grpSpPr>
+      <p:sp>
+        <p:nvSpPr>
+          <p:cNvPr id="2" name="Slide Image Placeholder 1"/>
+          <p:cNvSpPr>
+            <a:spLocks noGrp="1" noRot="1" noChangeAspect="1"/>
+          </p:cNvSpPr>
+          <p:nvPr>
+            <p:ph type="sldImg"/>
+          </p:nvPr>
+        </p:nvSpPr>
+        <p:spPr/>
+      </p:sp>
+      <p:sp>
+        <p:nvSpPr>
+          <p:cNvPr id="3" name="Notes Placeholder 2"/>
+          <p:cNvSpPr>
+            <a:spLocks noGrp="1"/>
+          </p:cNvSpPr>
+          <p:nvPr>
+            <p:ph type="body" idx="1"/>
+          </p:nvPr>
+        </p:nvSpPr>
+        <p:spPr/>
+        <p:txBody>
+          <a:bodyPr/>
+          <a:lstStyle/>
+          <a:p>
+            <a:pPr marL="0" indent="0">
+              <a:buFont typeface="Arial" panose="020B0604020202020204" pitchFamily="34" charset="0"/>
+              <a:buNone/>
+            </a:pPr>
+            <a:r>
+              <a:rPr lang="en-US" b="1" dirty="0"/>
+              <a:t>Stéphane</a:t>
+            </a:r>
+          </a:p>
+          <a:p>
+            <a:pPr marL="0" indent="0">
+              <a:buFont typeface="Arial" panose="020B0604020202020204" pitchFamily="34" charset="0"/>
+              <a:buNone/>
+            </a:pPr>
+            <a:endParaRPr lang="en-US" b="1" dirty="0"/>
+          </a:p>
+          <a:p>
+            <a:pPr marL="171450" lvl="0" indent="-171450">
+              <a:buFont typeface="Arial" panose="020B0604020202020204" pitchFamily="34" charset="0"/>
+              <a:buChar char="•"/>
+            </a:pPr>
+            <a:r>
+              <a:rPr lang="en-US" dirty="0"/>
+              <a:t>The LCD continuously refreshes its content by reading the data from a memory buffer.</a:t>
+            </a:r>
+          </a:p>
+          <a:p>
+            <a:pPr marL="628639" lvl="1" indent="-171450">
+              <a:buFont typeface="Arial" panose="020B0604020202020204" pitchFamily="34" charset="0"/>
+              <a:buChar char="•"/>
+            </a:pPr>
+            <a:r>
+              <a:rPr lang="en-US" dirty="0"/>
+              <a:t>The buffer size depends on the LCD size and its number of bits per pixel.</a:t>
+            </a:r>
+          </a:p>
+          <a:p>
+            <a:pPr marL="628639" lvl="1" indent="-171450">
+              <a:buFont typeface="Arial" panose="020B0604020202020204" pitchFamily="34" charset="0"/>
+              <a:buChar char="•"/>
+            </a:pPr>
+            <a:r>
+              <a:rPr lang="en-US" dirty="0"/>
+              <a:t>We cannot stop this refresh, otherwise the image fades away.</a:t>
+            </a:r>
+          </a:p>
+          <a:p>
+            <a:pPr marL="171450" lvl="0" indent="-171450">
+              <a:buFont typeface="Arial" panose="020B0604020202020204" pitchFamily="34" charset="0"/>
+              <a:buChar char="•"/>
+            </a:pPr>
+            <a:r>
+              <a:rPr lang="en-US" dirty="0"/>
+              <a:t>A new frame often appears every 16.6ms (60Hz).</a:t>
+            </a:r>
+          </a:p>
+          <a:p>
+            <a:pPr marL="171450" indent="-171450">
+              <a:buFont typeface="Arial" panose="020B0604020202020204" pitchFamily="34" charset="0"/>
+              <a:buChar char="•"/>
+            </a:pPr>
+            <a:r>
+              <a:rPr lang="en-US" dirty="0"/>
+              <a:t>The electric signals may be generated by an internal LCD controller in the LCD device or by a LCD controller in the MCU.</a:t>
+            </a:r>
+          </a:p>
+          <a:p>
+            <a:pPr marL="171450" indent="-171450">
+              <a:buFont typeface="Arial" panose="020B0604020202020204" pitchFamily="34" charset="0"/>
+              <a:buChar char="•"/>
+            </a:pPr>
+            <a:r>
+              <a:rPr lang="en-US" dirty="0"/>
+              <a:t>The electric signals frequency is several MHz</a:t>
+            </a:r>
+          </a:p>
+          <a:p>
+            <a:pPr marL="171450" indent="-171450">
+              <a:buFont typeface="Arial" panose="020B0604020202020204" pitchFamily="34" charset="0"/>
+              <a:buChar char="•"/>
+            </a:pPr>
+            <a:endParaRPr lang="en-US" dirty="0"/>
+          </a:p>
+          <a:p>
+            <a:pPr marL="171450" indent="-171450">
+              <a:buFont typeface="Arial" panose="020B0604020202020204" pitchFamily="34" charset="0"/>
+              <a:buChar char="•"/>
+            </a:pPr>
+            <a:r>
+              <a:rPr lang="en-US" dirty="0"/>
+              <a:t>If we draw at the same time and in the same buffer than the LCD, we will see the drawings “one by one” instead of seeing the entire frame at once</a:t>
+            </a:r>
+          </a:p>
+        </p:txBody>
+      </p:sp>
+      <p:sp>
+        <p:nvSpPr>
+          <p:cNvPr id="4" name="Footer Placeholder 3"/>
+          <p:cNvSpPr>
+            <a:spLocks noGrp="1"/>
+          </p:cNvSpPr>
+          <p:nvPr>
+            <p:ph type="ftr" sz="quarter" idx="4"/>
+          </p:nvPr>
+        </p:nvSpPr>
+        <p:spPr/>
+        <p:txBody>
+          <a:bodyPr/>
+          <a:lstStyle/>
+          <a:p>
+            <a:endParaRPr lang="en-US" dirty="0"/>
+          </a:p>
+        </p:txBody>
+      </p:sp>
+    </p:spTree>
+    <p:extLst>
+      <p:ext uri="{BB962C8B-B14F-4D97-AF65-F5344CB8AC3E}">
+        <p14:creationId xmlns:p14="http://schemas.microsoft.com/office/powerpoint/2010/main" val="883837639"/>
+      </p:ext>
+    </p:extLst>
+  </p:cSld>
+  <p:clrMapOvr>
+    <a:masterClrMapping/>
+  </p:clrMapOvr>
+</p:notes>
+</file>
+
 <file path=ppt/notesSlides/notesSlide2.xml><?xml version="1.0" encoding="utf-8"?>
 <p:notes xmlns:a="http://schemas.openxmlformats.org/drawingml/2006/main" xmlns:r="http://schemas.openxmlformats.org/officeDocument/2006/relationships" xmlns:p="http://schemas.openxmlformats.org/presentationml/2006/main">
   <p:cSld>
@@ -2045,6 +2218,177 @@
     <p:extLst>
       <p:ext uri="{BB962C8B-B14F-4D97-AF65-F5344CB8AC3E}">
         <p14:creationId xmlns:p14="http://schemas.microsoft.com/office/powerpoint/2010/main" val="506615833"/>
+      </p:ext>
+    </p:extLst>
+  </p:cSld>
+  <p:clrMapOvr>
+    <a:masterClrMapping/>
+  </p:clrMapOvr>
+</p:notes>
+</file>
+
+<file path=ppt/notesSlides/notesSlide9.xml><?xml version="1.0" encoding="utf-8"?>
+<p:notes xmlns:a="http://schemas.openxmlformats.org/drawingml/2006/main" xmlns:r="http://schemas.openxmlformats.org/officeDocument/2006/relationships" xmlns:p="http://schemas.openxmlformats.org/presentationml/2006/main">
+  <p:cSld>
+    <p:spTree>
+      <p:nvGrpSpPr>
+        <p:cNvPr id="1" name=""/>
+        <p:cNvGrpSpPr/>
+        <p:nvPr/>
+      </p:nvGrpSpPr>
+      <p:grpSpPr>
+        <a:xfrm>
+          <a:off x="0" y="0"/>
+          <a:ext cx="0" cy="0"/>
+          <a:chOff x="0" y="0"/>
+          <a:chExt cx="0" cy="0"/>
+        </a:xfrm>
+      </p:grpSpPr>
+      <p:sp>
+        <p:nvSpPr>
+          <p:cNvPr id="2" name="Slide Image Placeholder 1"/>
+          <p:cNvSpPr>
+            <a:spLocks noGrp="1" noRot="1" noChangeAspect="1"/>
+          </p:cNvSpPr>
+          <p:nvPr>
+            <p:ph type="sldImg"/>
+          </p:nvPr>
+        </p:nvSpPr>
+        <p:spPr/>
+      </p:sp>
+      <p:sp>
+        <p:nvSpPr>
+          <p:cNvPr id="3" name="Notes Placeholder 2"/>
+          <p:cNvSpPr>
+            <a:spLocks noGrp="1"/>
+          </p:cNvSpPr>
+          <p:nvPr>
+            <p:ph type="body" idx="1"/>
+          </p:nvPr>
+        </p:nvSpPr>
+        <p:spPr/>
+        <p:txBody>
+          <a:bodyPr/>
+          <a:lstStyle/>
+          <a:p>
+            <a:pPr marL="0" indent="0">
+              <a:buFont typeface="Arial" panose="020B0604020202020204" pitchFamily="34" charset="0"/>
+              <a:buNone/>
+            </a:pPr>
+            <a:r>
+              <a:rPr lang="en-US" b="1" dirty="0"/>
+              <a:t>Stéphane</a:t>
+            </a:r>
+          </a:p>
+          <a:p>
+            <a:pPr marL="0" indent="0">
+              <a:buFont typeface="Arial" panose="020B0604020202020204" pitchFamily="34" charset="0"/>
+              <a:buNone/>
+            </a:pPr>
+            <a:endParaRPr lang="en-US" b="1" dirty="0"/>
+          </a:p>
+          <a:p>
+            <a:pPr marL="171450" lvl="0" indent="-171450">
+              <a:buFont typeface="Arial" panose="020B0604020202020204" pitchFamily="34" charset="0"/>
+              <a:buChar char="•"/>
+            </a:pPr>
+            <a:r>
+              <a:rPr lang="en-US" dirty="0"/>
+              <a:t>The LCD continuously refreshes its content by reading the data from a memory buffer.</a:t>
+            </a:r>
+          </a:p>
+          <a:p>
+            <a:pPr marL="628639" lvl="1" indent="-171450">
+              <a:buFont typeface="Arial" panose="020B0604020202020204" pitchFamily="34" charset="0"/>
+              <a:buChar char="•"/>
+            </a:pPr>
+            <a:r>
+              <a:rPr lang="en-US" dirty="0"/>
+              <a:t>The buffer size depends on the LCD size and its number of bits per pixel.</a:t>
+            </a:r>
+          </a:p>
+          <a:p>
+            <a:pPr marL="628639" lvl="1" indent="-171450">
+              <a:buFont typeface="Arial" panose="020B0604020202020204" pitchFamily="34" charset="0"/>
+              <a:buChar char="•"/>
+            </a:pPr>
+            <a:r>
+              <a:rPr lang="en-US" dirty="0"/>
+              <a:t>We cannot stop this refresh, otherwise the image fades away.</a:t>
+            </a:r>
+          </a:p>
+          <a:p>
+            <a:pPr marL="171450" lvl="0" indent="-171450">
+              <a:buFont typeface="Arial" panose="020B0604020202020204" pitchFamily="34" charset="0"/>
+              <a:buChar char="•"/>
+            </a:pPr>
+            <a:r>
+              <a:rPr lang="en-US" dirty="0"/>
+              <a:t>A new frame often appears every 16.6ms (60Hz).</a:t>
+            </a:r>
+          </a:p>
+          <a:p>
+            <a:pPr marL="171450" indent="-171450">
+              <a:buFont typeface="Arial" panose="020B0604020202020204" pitchFamily="34" charset="0"/>
+              <a:buChar char="•"/>
+            </a:pPr>
+            <a:r>
+              <a:rPr lang="en-US" dirty="0"/>
+              <a:t>The electric signals may be generated by an internal LCD controller in the LCD device or by a LCD controller in the MCU.</a:t>
+            </a:r>
+          </a:p>
+          <a:p>
+            <a:pPr marL="171450" indent="-171450">
+              <a:buFont typeface="Arial" panose="020B0604020202020204" pitchFamily="34" charset="0"/>
+              <a:buChar char="•"/>
+            </a:pPr>
+            <a:r>
+              <a:rPr lang="en-US" dirty="0"/>
+              <a:t>The electric signals frequency is several MHz</a:t>
+            </a:r>
+          </a:p>
+          <a:p>
+            <a:pPr marL="171450" indent="-171450">
+              <a:buFont typeface="Arial" panose="020B0604020202020204" pitchFamily="34" charset="0"/>
+              <a:buChar char="•"/>
+            </a:pPr>
+            <a:endParaRPr lang="en-US" dirty="0"/>
+          </a:p>
+          <a:p>
+            <a:pPr marL="171450" indent="-171450">
+              <a:buFont typeface="Arial" panose="020B0604020202020204" pitchFamily="34" charset="0"/>
+              <a:buChar char="•"/>
+            </a:pPr>
+            <a:r>
+              <a:rPr lang="en-US" dirty="0"/>
+              <a:t>If we draw at the same time and in the same buffer than the LCD, we will see the drawings “one by one” instead of seeing the entire frame at once</a:t>
+            </a:r>
+          </a:p>
+        </p:txBody>
+      </p:sp>
+      <p:sp>
+        <p:nvSpPr>
+          <p:cNvPr id="4" name="Footer Placeholder 3"/>
+          <p:cNvSpPr>
+            <a:spLocks noGrp="1"/>
+          </p:cNvSpPr>
+          <p:nvPr>
+            <p:ph type="ftr" sz="quarter" idx="4"/>
+          </p:nvPr>
+        </p:nvSpPr>
+        <p:spPr/>
+        <p:txBody>
+          <a:bodyPr/>
+          <a:lstStyle/>
+          <a:p>
+            <a:endParaRPr lang="en-US" dirty="0"/>
+          </a:p>
+        </p:txBody>
+      </p:sp>
+    </p:spTree>
+    <p:extLst>
+      <p:ext uri="{BB962C8B-B14F-4D97-AF65-F5344CB8AC3E}">
+        <p14:creationId xmlns:p14="http://schemas.microsoft.com/office/powerpoint/2010/main" val="2417623509"/>
       </p:ext>
     </p:extLst>
   </p:cSld>
@@ -14653,7 +14997,7 @@
           <a:p>
             <a:fld id="{4E285625-C24A-4341-90BC-6CD71F835625}" type="datetimeFigureOut">
               <a:rPr lang="en-GB" smtClean="0"/>
-              <a:t>31/01/2024</a:t>
+              <a:t>02/02/2024</a:t>
             </a:fld>
             <a:endParaRPr lang="en-GB"/>
           </a:p>
@@ -20966,6 +21310,813 @@
     <p:extLst>
       <p:ext uri="{BB962C8B-B14F-4D97-AF65-F5344CB8AC3E}">
         <p14:creationId xmlns:p14="http://schemas.microsoft.com/office/powerpoint/2010/main" val="167739976"/>
+      </p:ext>
+    </p:extLst>
+  </p:cSld>
+  <p:clrMapOvr>
+    <a:masterClrMapping/>
+  </p:clrMapOvr>
+</p:sld>
+</file>
+
+<file path=ppt/slides/slide10.xml><?xml version="1.0" encoding="utf-8"?>
+<p:sld xmlns:a="http://schemas.openxmlformats.org/drawingml/2006/main" xmlns:r="http://schemas.openxmlformats.org/officeDocument/2006/relationships" xmlns:p="http://schemas.openxmlformats.org/presentationml/2006/main">
+  <p:cSld>
+    <p:spTree>
+      <p:nvGrpSpPr>
+        <p:cNvPr id="1" name=""/>
+        <p:cNvGrpSpPr/>
+        <p:nvPr/>
+      </p:nvGrpSpPr>
+      <p:grpSpPr>
+        <a:xfrm>
+          <a:off x="0" y="0"/>
+          <a:ext cx="0" cy="0"/>
+          <a:chOff x="0" y="0"/>
+          <a:chExt cx="0" cy="0"/>
+        </a:xfrm>
+      </p:grpSpPr>
+      <p:sp>
+        <p:nvSpPr>
+          <p:cNvPr id="16" name="Rectangle 15">
+            <a:extLst>
+              <a:ext uri="{FF2B5EF4-FFF2-40B4-BE49-F238E27FC236}">
+                <a16:creationId xmlns:a16="http://schemas.microsoft.com/office/drawing/2014/main" id="{64AD43B7-23E8-6DBF-53B4-D516396CBA62}"/>
+              </a:ext>
+            </a:extLst>
+          </p:cNvPr>
+          <p:cNvSpPr/>
+          <p:nvPr/>
+        </p:nvSpPr>
+        <p:spPr>
+          <a:xfrm>
+            <a:off x="1421176" y="2145535"/>
+            <a:ext cx="5290435" cy="2566930"/>
+          </a:xfrm>
+          <a:prstGeom prst="rect">
+            <a:avLst/>
+          </a:prstGeom>
+          <a:ln/>
+        </p:spPr>
+        <p:style>
+          <a:lnRef idx="2">
+            <a:schemeClr val="accent2"/>
+          </a:lnRef>
+          <a:fillRef idx="1">
+            <a:schemeClr val="lt1"/>
+          </a:fillRef>
+          <a:effectRef idx="0">
+            <a:schemeClr val="accent2"/>
+          </a:effectRef>
+          <a:fontRef idx="minor">
+            <a:schemeClr val="dk1"/>
+          </a:fontRef>
+        </p:style>
+        <p:txBody>
+          <a:bodyPr rtlCol="0" anchor="b" anchorCtr="0"/>
+          <a:lstStyle/>
+          <a:p>
+            <a:pPr algn="ctr"/>
+            <a:r>
+              <a:rPr lang="en-US" sz="1400" dirty="0">
+                <a:solidFill>
+                  <a:schemeClr val="tx2"/>
+                </a:solidFill>
+                <a:latin typeface="Source Sans Pro Light" panose="020B0403030403020204" pitchFamily="34" charset="77"/>
+                <a:ea typeface="Source Sans Pro" panose="020B0503030403020204" pitchFamily="34" charset="0"/>
+              </a:rPr>
+              <a:t>MCU</a:t>
+            </a:r>
+          </a:p>
+        </p:txBody>
+      </p:sp>
+      <p:sp>
+        <p:nvSpPr>
+          <p:cNvPr id="11" name="Rectangle 10">
+            <a:extLst>
+              <a:ext uri="{FF2B5EF4-FFF2-40B4-BE49-F238E27FC236}">
+                <a16:creationId xmlns:a16="http://schemas.microsoft.com/office/drawing/2014/main" id="{FD80A1C3-DC8A-ADFF-8382-C05410AF9436}"/>
+              </a:ext>
+            </a:extLst>
+          </p:cNvPr>
+          <p:cNvSpPr/>
+          <p:nvPr/>
+        </p:nvSpPr>
+        <p:spPr>
+          <a:xfrm>
+            <a:off x="7094863" y="2145536"/>
+            <a:ext cx="4384713" cy="2566930"/>
+          </a:xfrm>
+          <a:prstGeom prst="rect">
+            <a:avLst/>
+          </a:prstGeom>
+          <a:ln/>
+        </p:spPr>
+        <p:style>
+          <a:lnRef idx="2">
+            <a:schemeClr val="accent2"/>
+          </a:lnRef>
+          <a:fillRef idx="1">
+            <a:schemeClr val="lt1"/>
+          </a:fillRef>
+          <a:effectRef idx="0">
+            <a:schemeClr val="accent2"/>
+          </a:effectRef>
+          <a:fontRef idx="minor">
+            <a:schemeClr val="dk1"/>
+          </a:fontRef>
+        </p:style>
+        <p:txBody>
+          <a:bodyPr rtlCol="0" anchor="b" anchorCtr="0"/>
+          <a:lstStyle/>
+          <a:p>
+            <a:pPr algn="ctr"/>
+            <a:r>
+              <a:rPr lang="en-US" sz="1400" dirty="0">
+                <a:solidFill>
+                  <a:schemeClr val="tx2"/>
+                </a:solidFill>
+                <a:latin typeface="Source Sans Pro Light" panose="020B0403030403020204" pitchFamily="34" charset="77"/>
+                <a:ea typeface="Source Sans Pro" panose="020B0503030403020204" pitchFamily="34" charset="0"/>
+              </a:rPr>
+              <a:t>Display module</a:t>
+            </a:r>
+          </a:p>
+        </p:txBody>
+      </p:sp>
+      <p:pic>
+        <p:nvPicPr>
+          <p:cNvPr id="8" name="Picture 7">
+            <a:extLst>
+              <a:ext uri="{FF2B5EF4-FFF2-40B4-BE49-F238E27FC236}">
+                <a16:creationId xmlns:a16="http://schemas.microsoft.com/office/drawing/2014/main" id="{FFED50E9-4666-827D-A26D-B1C27D6DCC8C}"/>
+              </a:ext>
+            </a:extLst>
+          </p:cNvPr>
+          <p:cNvPicPr>
+            <a:picLocks noChangeAspect="1"/>
+          </p:cNvPicPr>
+          <p:nvPr/>
+        </p:nvPicPr>
+        <p:blipFill rotWithShape="1">
+          <a:blip r:embed="rId3" cstate="print">
+            <a:extLst>
+              <a:ext uri="{28A0092B-C50C-407E-A947-70E740481C1C}">
+                <a14:useLocalDpi xmlns:a14="http://schemas.microsoft.com/office/drawing/2010/main" val="0"/>
+              </a:ext>
+            </a:extLst>
+          </a:blip>
+          <a:srcRect l="18554" t="45307" r="13825" b="13196"/>
+          <a:stretch/>
+        </p:blipFill>
+        <p:spPr>
+          <a:xfrm>
+            <a:off x="8858813" y="2708978"/>
+            <a:ext cx="2279239" cy="1415820"/>
+          </a:xfrm>
+          <a:prstGeom prst="rect">
+            <a:avLst/>
+          </a:prstGeom>
+        </p:spPr>
+      </p:pic>
+      <p:sp>
+        <p:nvSpPr>
+          <p:cNvPr id="10" name="Arc 9">
+            <a:extLst>
+              <a:ext uri="{FF2B5EF4-FFF2-40B4-BE49-F238E27FC236}">
+                <a16:creationId xmlns:a16="http://schemas.microsoft.com/office/drawing/2014/main" id="{070CE625-638E-D085-FAEA-696B711BC3C5}"/>
+              </a:ext>
+            </a:extLst>
+          </p:cNvPr>
+          <p:cNvSpPr/>
+          <p:nvPr/>
+        </p:nvSpPr>
+        <p:spPr>
+          <a:xfrm>
+            <a:off x="3966071" y="2542830"/>
+            <a:ext cx="5496491" cy="1787652"/>
+          </a:xfrm>
+          <a:prstGeom prst="arc">
+            <a:avLst>
+              <a:gd name="adj1" fmla="val 11979648"/>
+              <a:gd name="adj2" fmla="val 9567484"/>
+            </a:avLst>
+          </a:prstGeom>
+          <a:ln w="25400">
+            <a:tailEnd type="stealth" w="lg" len="lg"/>
+          </a:ln>
+        </p:spPr>
+        <p:style>
+          <a:lnRef idx="1">
+            <a:schemeClr val="accent1"/>
+          </a:lnRef>
+          <a:fillRef idx="0">
+            <a:schemeClr val="accent1"/>
+          </a:fillRef>
+          <a:effectRef idx="0">
+            <a:schemeClr val="accent1"/>
+          </a:effectRef>
+          <a:fontRef idx="minor">
+            <a:schemeClr val="tx1"/>
+          </a:fontRef>
+        </p:style>
+        <p:txBody>
+          <a:bodyPr rtlCol="0" anchor="ctr"/>
+          <a:lstStyle/>
+          <a:p>
+            <a:pPr algn="ctr"/>
+            <a:endParaRPr lang="en-US"/>
+          </a:p>
+        </p:txBody>
+      </p:sp>
+      <p:sp>
+        <p:nvSpPr>
+          <p:cNvPr id="7" name="Rectangle 6">
+            <a:extLst>
+              <a:ext uri="{FF2B5EF4-FFF2-40B4-BE49-F238E27FC236}">
+                <a16:creationId xmlns:a16="http://schemas.microsoft.com/office/drawing/2014/main" id="{EE9CF8DD-BEBD-03CC-60A2-FB1191005967}"/>
+              </a:ext>
+            </a:extLst>
+          </p:cNvPr>
+          <p:cNvSpPr/>
+          <p:nvPr/>
+        </p:nvSpPr>
+        <p:spPr>
+          <a:xfrm>
+            <a:off x="7416641" y="3159565"/>
+            <a:ext cx="762586" cy="507693"/>
+          </a:xfrm>
+          <a:prstGeom prst="rect">
+            <a:avLst/>
+          </a:prstGeom>
+          <a:ln/>
+        </p:spPr>
+        <p:style>
+          <a:lnRef idx="2">
+            <a:schemeClr val="accent1"/>
+          </a:lnRef>
+          <a:fillRef idx="1">
+            <a:schemeClr val="lt1"/>
+          </a:fillRef>
+          <a:effectRef idx="0">
+            <a:schemeClr val="accent1"/>
+          </a:effectRef>
+          <a:fontRef idx="minor">
+            <a:schemeClr val="dk1"/>
+          </a:fontRef>
+        </p:style>
+        <p:txBody>
+          <a:bodyPr rtlCol="0" anchor="ctr"/>
+          <a:lstStyle/>
+          <a:p>
+            <a:pPr algn="ctr"/>
+            <a:r>
+              <a:rPr lang="en-US" sz="1400" dirty="0">
+                <a:solidFill>
+                  <a:schemeClr val="tx2"/>
+                </a:solidFill>
+                <a:latin typeface="Source Sans Pro Light" panose="020B0403030403020204" pitchFamily="34" charset="77"/>
+                <a:ea typeface="Source Sans Pro" panose="020B0503030403020204" pitchFamily="34" charset="0"/>
+              </a:rPr>
+              <a:t>LCDC</a:t>
+            </a:r>
+          </a:p>
+        </p:txBody>
+      </p:sp>
+      <p:sp>
+        <p:nvSpPr>
+          <p:cNvPr id="14" name="Rectangle 13">
+            <a:extLst>
+              <a:ext uri="{FF2B5EF4-FFF2-40B4-BE49-F238E27FC236}">
+                <a16:creationId xmlns:a16="http://schemas.microsoft.com/office/drawing/2014/main" id="{F79704A7-1530-628C-D595-3F2FEF1E99C5}"/>
+              </a:ext>
+            </a:extLst>
+          </p:cNvPr>
+          <p:cNvSpPr/>
+          <p:nvPr/>
+        </p:nvSpPr>
+        <p:spPr>
+          <a:xfrm>
+            <a:off x="5749586" y="3159565"/>
+            <a:ext cx="762586" cy="507693"/>
+          </a:xfrm>
+          <a:prstGeom prst="rect">
+            <a:avLst/>
+          </a:prstGeom>
+          <a:ln/>
+        </p:spPr>
+        <p:style>
+          <a:lnRef idx="2">
+            <a:schemeClr val="accent1"/>
+          </a:lnRef>
+          <a:fillRef idx="1">
+            <a:schemeClr val="lt1"/>
+          </a:fillRef>
+          <a:effectRef idx="0">
+            <a:schemeClr val="accent1"/>
+          </a:effectRef>
+          <a:fontRef idx="minor">
+            <a:schemeClr val="dk1"/>
+          </a:fontRef>
+        </p:style>
+        <p:txBody>
+          <a:bodyPr rtlCol="0" anchor="ctr"/>
+          <a:lstStyle/>
+          <a:p>
+            <a:pPr algn="ctr"/>
+            <a:r>
+              <a:rPr lang="en-US" sz="1400" dirty="0">
+                <a:solidFill>
+                  <a:schemeClr val="tx2"/>
+                </a:solidFill>
+                <a:latin typeface="Source Sans Pro Light" panose="020B0403030403020204" pitchFamily="34" charset="77"/>
+                <a:ea typeface="Source Sans Pro" panose="020B0503030403020204" pitchFamily="34" charset="0"/>
+              </a:rPr>
+              <a:t>LCDC</a:t>
+            </a:r>
+          </a:p>
+        </p:txBody>
+      </p:sp>
+      <p:sp>
+        <p:nvSpPr>
+          <p:cNvPr id="15" name="Rectangle 14">
+            <a:extLst>
+              <a:ext uri="{FF2B5EF4-FFF2-40B4-BE49-F238E27FC236}">
+                <a16:creationId xmlns:a16="http://schemas.microsoft.com/office/drawing/2014/main" id="{65049CB4-0DDB-CE65-2175-D46A619BA7B2}"/>
+              </a:ext>
+            </a:extLst>
+          </p:cNvPr>
+          <p:cNvSpPr/>
+          <p:nvPr/>
+        </p:nvSpPr>
+        <p:spPr>
+          <a:xfrm>
+            <a:off x="3858937" y="2921307"/>
+            <a:ext cx="1637489" cy="1015386"/>
+          </a:xfrm>
+          <a:prstGeom prst="rect">
+            <a:avLst/>
+          </a:prstGeom>
+          <a:ln/>
+        </p:spPr>
+        <p:style>
+          <a:lnRef idx="2">
+            <a:schemeClr val="accent1"/>
+          </a:lnRef>
+          <a:fillRef idx="1">
+            <a:schemeClr val="lt1"/>
+          </a:fillRef>
+          <a:effectRef idx="0">
+            <a:schemeClr val="accent1"/>
+          </a:effectRef>
+          <a:fontRef idx="minor">
+            <a:schemeClr val="dk1"/>
+          </a:fontRef>
+        </p:style>
+        <p:txBody>
+          <a:bodyPr rtlCol="0" anchor="ctr"/>
+          <a:lstStyle/>
+          <a:p>
+            <a:pPr algn="ctr"/>
+            <a:r>
+              <a:rPr lang="en-US" sz="1400" dirty="0">
+                <a:solidFill>
+                  <a:schemeClr val="tx2"/>
+                </a:solidFill>
+                <a:latin typeface="Source Sans Pro Light" panose="020B0403030403020204" pitchFamily="34" charset="77"/>
+                <a:ea typeface="Source Sans Pro" panose="020B0503030403020204" pitchFamily="34" charset="0"/>
+              </a:rPr>
+              <a:t>Frame buffer</a:t>
+            </a:r>
+          </a:p>
+        </p:txBody>
+      </p:sp>
+      <p:cxnSp>
+        <p:nvCxnSpPr>
+          <p:cNvPr id="17" name="Straight Connector 16">
+            <a:extLst>
+              <a:ext uri="{FF2B5EF4-FFF2-40B4-BE49-F238E27FC236}">
+                <a16:creationId xmlns:a16="http://schemas.microsoft.com/office/drawing/2014/main" id="{39002000-D704-2B02-CC7E-0FEDD6AAC47B}"/>
+              </a:ext>
+            </a:extLst>
+          </p:cNvPr>
+          <p:cNvCxnSpPr>
+            <a:cxnSpLocks/>
+            <a:stCxn id="14" idx="3"/>
+            <a:endCxn id="7" idx="1"/>
+          </p:cNvCxnSpPr>
+          <p:nvPr/>
+        </p:nvCxnSpPr>
+        <p:spPr>
+          <a:xfrm>
+            <a:off x="6512172" y="3413412"/>
+            <a:ext cx="904469" cy="0"/>
+          </a:xfrm>
+          <a:prstGeom prst="line">
+            <a:avLst/>
+          </a:prstGeom>
+          <a:ln w="19050"/>
+        </p:spPr>
+        <p:style>
+          <a:lnRef idx="1">
+            <a:schemeClr val="accent4"/>
+          </a:lnRef>
+          <a:fillRef idx="0">
+            <a:schemeClr val="accent4"/>
+          </a:fillRef>
+          <a:effectRef idx="0">
+            <a:schemeClr val="accent4"/>
+          </a:effectRef>
+          <a:fontRef idx="minor">
+            <a:schemeClr val="tx1"/>
+          </a:fontRef>
+        </p:style>
+      </p:cxnSp>
+      <p:cxnSp>
+        <p:nvCxnSpPr>
+          <p:cNvPr id="20" name="Straight Connector 19">
+            <a:extLst>
+              <a:ext uri="{FF2B5EF4-FFF2-40B4-BE49-F238E27FC236}">
+                <a16:creationId xmlns:a16="http://schemas.microsoft.com/office/drawing/2014/main" id="{A58706F5-92DC-DD6A-522F-3751BFC398BA}"/>
+              </a:ext>
+            </a:extLst>
+          </p:cNvPr>
+          <p:cNvCxnSpPr>
+            <a:cxnSpLocks/>
+          </p:cNvCxnSpPr>
+          <p:nvPr/>
+        </p:nvCxnSpPr>
+        <p:spPr>
+          <a:xfrm flipV="1">
+            <a:off x="6831045" y="3333868"/>
+            <a:ext cx="148324" cy="190263"/>
+          </a:xfrm>
+          <a:prstGeom prst="line">
+            <a:avLst/>
+          </a:prstGeom>
+          <a:ln w="15875"/>
+        </p:spPr>
+        <p:style>
+          <a:lnRef idx="1">
+            <a:schemeClr val="accent4"/>
+          </a:lnRef>
+          <a:fillRef idx="0">
+            <a:schemeClr val="accent4"/>
+          </a:fillRef>
+          <a:effectRef idx="0">
+            <a:schemeClr val="accent4"/>
+          </a:effectRef>
+          <a:fontRef idx="minor">
+            <a:schemeClr val="tx1"/>
+          </a:fontRef>
+        </p:style>
+      </p:cxnSp>
+      <p:cxnSp>
+        <p:nvCxnSpPr>
+          <p:cNvPr id="18" name="Straight Connector 17">
+            <a:extLst>
+              <a:ext uri="{FF2B5EF4-FFF2-40B4-BE49-F238E27FC236}">
+                <a16:creationId xmlns:a16="http://schemas.microsoft.com/office/drawing/2014/main" id="{2D602AE7-0E9D-5DE3-055C-6D70D35F7389}"/>
+              </a:ext>
+            </a:extLst>
+          </p:cNvPr>
+          <p:cNvCxnSpPr/>
+          <p:nvPr/>
+        </p:nvCxnSpPr>
+        <p:spPr>
+          <a:xfrm>
+            <a:off x="8177100" y="3425591"/>
+            <a:ext cx="683840" cy="1"/>
+          </a:xfrm>
+          <a:prstGeom prst="line">
+            <a:avLst/>
+          </a:prstGeom>
+        </p:spPr>
+        <p:style>
+          <a:lnRef idx="1">
+            <a:schemeClr val="accent4"/>
+          </a:lnRef>
+          <a:fillRef idx="0">
+            <a:schemeClr val="accent4"/>
+          </a:fillRef>
+          <a:effectRef idx="0">
+            <a:schemeClr val="accent4"/>
+          </a:effectRef>
+          <a:fontRef idx="minor">
+            <a:schemeClr val="tx1"/>
+          </a:fontRef>
+        </p:style>
+      </p:cxnSp>
+      <p:cxnSp>
+        <p:nvCxnSpPr>
+          <p:cNvPr id="19" name="Straight Connector 18">
+            <a:extLst>
+              <a:ext uri="{FF2B5EF4-FFF2-40B4-BE49-F238E27FC236}">
+                <a16:creationId xmlns:a16="http://schemas.microsoft.com/office/drawing/2014/main" id="{FCAF8A7D-C69E-3F8B-CFA8-B2A81AEA78A2}"/>
+              </a:ext>
+            </a:extLst>
+          </p:cNvPr>
+          <p:cNvCxnSpPr>
+            <a:cxnSpLocks/>
+          </p:cNvCxnSpPr>
+          <p:nvPr/>
+        </p:nvCxnSpPr>
+        <p:spPr>
+          <a:xfrm flipV="1">
+            <a:off x="8430260" y="3368240"/>
+            <a:ext cx="113670" cy="145810"/>
+          </a:xfrm>
+          <a:prstGeom prst="line">
+            <a:avLst/>
+          </a:prstGeom>
+        </p:spPr>
+        <p:style>
+          <a:lnRef idx="1">
+            <a:schemeClr val="accent4"/>
+          </a:lnRef>
+          <a:fillRef idx="0">
+            <a:schemeClr val="accent4"/>
+          </a:fillRef>
+          <a:effectRef idx="0">
+            <a:schemeClr val="accent4"/>
+          </a:effectRef>
+          <a:fontRef idx="minor">
+            <a:schemeClr val="tx1"/>
+          </a:fontRef>
+        </p:style>
+      </p:cxnSp>
+      <p:sp>
+        <p:nvSpPr>
+          <p:cNvPr id="3" name="Rectangle 2">
+            <a:extLst>
+              <a:ext uri="{FF2B5EF4-FFF2-40B4-BE49-F238E27FC236}">
+                <a16:creationId xmlns:a16="http://schemas.microsoft.com/office/drawing/2014/main" id="{46E57B75-70B0-F647-D712-A75871947801}"/>
+              </a:ext>
+            </a:extLst>
+          </p:cNvPr>
+          <p:cNvSpPr/>
+          <p:nvPr/>
+        </p:nvSpPr>
+        <p:spPr>
+          <a:xfrm>
+            <a:off x="1910693" y="2917898"/>
+            <a:ext cx="1637489" cy="1015386"/>
+          </a:xfrm>
+          <a:prstGeom prst="rect">
+            <a:avLst/>
+          </a:prstGeom>
+          <a:ln/>
+        </p:spPr>
+        <p:style>
+          <a:lnRef idx="2">
+            <a:schemeClr val="accent1"/>
+          </a:lnRef>
+          <a:fillRef idx="1">
+            <a:schemeClr val="lt1"/>
+          </a:fillRef>
+          <a:effectRef idx="0">
+            <a:schemeClr val="accent1"/>
+          </a:effectRef>
+          <a:fontRef idx="minor">
+            <a:schemeClr val="dk1"/>
+          </a:fontRef>
+        </p:style>
+        <p:txBody>
+          <a:bodyPr rtlCol="0" anchor="ctr"/>
+          <a:lstStyle/>
+          <a:p>
+            <a:pPr algn="ctr"/>
+            <a:r>
+              <a:rPr lang="en-US" sz="1400" dirty="0">
+                <a:solidFill>
+                  <a:schemeClr val="tx2"/>
+                </a:solidFill>
+                <a:latin typeface="Source Sans Pro Light" panose="020B0403030403020204" pitchFamily="34" charset="77"/>
+                <a:ea typeface="Source Sans Pro" panose="020B0503030403020204" pitchFamily="34" charset="0"/>
+              </a:rPr>
+              <a:t>Back buffer</a:t>
+            </a:r>
+          </a:p>
+        </p:txBody>
+      </p:sp>
+      <p:sp>
+        <p:nvSpPr>
+          <p:cNvPr id="9" name="TextBox 8">
+            <a:extLst>
+              <a:ext uri="{FF2B5EF4-FFF2-40B4-BE49-F238E27FC236}">
+                <a16:creationId xmlns:a16="http://schemas.microsoft.com/office/drawing/2014/main" id="{C1612016-8035-FD67-2BBA-1979063563E8}"/>
+              </a:ext>
+            </a:extLst>
+          </p:cNvPr>
+          <p:cNvSpPr txBox="1"/>
+          <p:nvPr/>
+        </p:nvSpPr>
+        <p:spPr>
+          <a:xfrm>
+            <a:off x="0" y="3288533"/>
+            <a:ext cx="720832" cy="215444"/>
+          </a:xfrm>
+          <a:prstGeom prst="rect">
+            <a:avLst/>
+          </a:prstGeom>
+          <a:noFill/>
+        </p:spPr>
+        <p:txBody>
+          <a:bodyPr vert="horz" wrap="square" lIns="0" tIns="0" rIns="0" bIns="0" numCol="1" spcCol="288000" rtlCol="0" anchor="t" anchorCtr="0">
+            <a:spAutoFit/>
+          </a:bodyPr>
+          <a:lstStyle/>
+          <a:p>
+            <a:pPr algn="r">
+              <a:spcBef>
+                <a:spcPts val="0"/>
+              </a:spcBef>
+              <a:spcAft>
+                <a:spcPts val="600"/>
+              </a:spcAft>
+            </a:pPr>
+            <a:r>
+              <a:rPr lang="en-US" sz="1400" b="0" i="0" spc="0" dirty="0">
+                <a:ln>
+                  <a:noFill/>
+                </a:ln>
+                <a:solidFill>
+                  <a:schemeClr val="tx2"/>
+                </a:solidFill>
+                <a:latin typeface="Source Sans Pro Light" charset="0"/>
+                <a:ea typeface="Source Sans Pro Light" charset="0"/>
+                <a:cs typeface="Source Sans Pro Light" charset="0"/>
+              </a:rPr>
+              <a:t>Drawings </a:t>
+            </a:r>
+          </a:p>
+        </p:txBody>
+      </p:sp>
+      <p:cxnSp>
+        <p:nvCxnSpPr>
+          <p:cNvPr id="12" name="Straight Arrow Connector 11">
+            <a:extLst>
+              <a:ext uri="{FF2B5EF4-FFF2-40B4-BE49-F238E27FC236}">
+                <a16:creationId xmlns:a16="http://schemas.microsoft.com/office/drawing/2014/main" id="{18E49BAF-41A5-1AF0-1587-F3A4FEC1AA83}"/>
+              </a:ext>
+            </a:extLst>
+          </p:cNvPr>
+          <p:cNvCxnSpPr/>
+          <p:nvPr/>
+        </p:nvCxnSpPr>
+        <p:spPr>
+          <a:xfrm>
+            <a:off x="934696" y="3423593"/>
+            <a:ext cx="896407" cy="0"/>
+          </a:xfrm>
+          <a:prstGeom prst="straightConnector1">
+            <a:avLst/>
+          </a:prstGeom>
+          <a:ln w="25400">
+            <a:tailEnd type="stealth" w="lg" len="med"/>
+          </a:ln>
+        </p:spPr>
+        <p:style>
+          <a:lnRef idx="1">
+            <a:schemeClr val="accent1"/>
+          </a:lnRef>
+          <a:fillRef idx="0">
+            <a:schemeClr val="accent1"/>
+          </a:fillRef>
+          <a:effectRef idx="0">
+            <a:schemeClr val="accent1"/>
+          </a:effectRef>
+          <a:fontRef idx="minor">
+            <a:schemeClr val="tx1"/>
+          </a:fontRef>
+        </p:style>
+      </p:cxnSp>
+      <p:sp>
+        <p:nvSpPr>
+          <p:cNvPr id="25" name="TextBox 24">
+            <a:extLst>
+              <a:ext uri="{FF2B5EF4-FFF2-40B4-BE49-F238E27FC236}">
+                <a16:creationId xmlns:a16="http://schemas.microsoft.com/office/drawing/2014/main" id="{3FAE8C18-2985-2E71-6B8F-5B68E0AA2ADA}"/>
+              </a:ext>
+            </a:extLst>
+          </p:cNvPr>
+          <p:cNvSpPr txBox="1"/>
+          <p:nvPr/>
+        </p:nvSpPr>
+        <p:spPr>
+          <a:xfrm>
+            <a:off x="3081171" y="4156949"/>
+            <a:ext cx="827153" cy="215444"/>
+          </a:xfrm>
+          <a:prstGeom prst="rect">
+            <a:avLst/>
+          </a:prstGeom>
+          <a:noFill/>
+        </p:spPr>
+        <p:txBody>
+          <a:bodyPr vert="horz" wrap="square" lIns="0" tIns="0" rIns="0" bIns="0" numCol="1" spcCol="288000" rtlCol="0" anchor="t" anchorCtr="0">
+            <a:spAutoFit/>
+          </a:bodyPr>
+          <a:lstStyle/>
+          <a:p>
+            <a:pPr algn="r">
+              <a:spcBef>
+                <a:spcPts val="0"/>
+              </a:spcBef>
+              <a:spcAft>
+                <a:spcPts val="600"/>
+              </a:spcAft>
+            </a:pPr>
+            <a:r>
+              <a:rPr lang="en-US" sz="1400" b="0" i="0" spc="0" dirty="0">
+                <a:ln>
+                  <a:noFill/>
+                </a:ln>
+                <a:solidFill>
+                  <a:schemeClr val="tx2"/>
+                </a:solidFill>
+                <a:latin typeface="Source Sans Pro Light" charset="0"/>
+                <a:ea typeface="Source Sans Pro Light" charset="0"/>
+                <a:cs typeface="Source Sans Pro Light" charset="0"/>
+              </a:rPr>
+              <a:t>Flush </a:t>
+            </a:r>
+          </a:p>
+        </p:txBody>
+      </p:sp>
+      <p:cxnSp>
+        <p:nvCxnSpPr>
+          <p:cNvPr id="2" name="Straight Arrow Connector 1">
+            <a:extLst>
+              <a:ext uri="{FF2B5EF4-FFF2-40B4-BE49-F238E27FC236}">
+                <a16:creationId xmlns:a16="http://schemas.microsoft.com/office/drawing/2014/main" id="{F713EF1F-B989-0E94-CEDA-7F7765A98819}"/>
+              </a:ext>
+            </a:extLst>
+          </p:cNvPr>
+          <p:cNvCxnSpPr/>
+          <p:nvPr/>
+        </p:nvCxnSpPr>
+        <p:spPr>
+          <a:xfrm>
+            <a:off x="3287262" y="4124798"/>
+            <a:ext cx="896407" cy="0"/>
+          </a:xfrm>
+          <a:prstGeom prst="straightConnector1">
+            <a:avLst/>
+          </a:prstGeom>
+          <a:ln w="25400">
+            <a:tailEnd type="stealth" w="lg" len="med"/>
+          </a:ln>
+        </p:spPr>
+        <p:style>
+          <a:lnRef idx="1">
+            <a:schemeClr val="accent1"/>
+          </a:lnRef>
+          <a:fillRef idx="0">
+            <a:schemeClr val="accent1"/>
+          </a:fillRef>
+          <a:effectRef idx="0">
+            <a:schemeClr val="accent1"/>
+          </a:effectRef>
+          <a:fontRef idx="minor">
+            <a:schemeClr val="tx1"/>
+          </a:fontRef>
+        </p:style>
+      </p:cxnSp>
+    </p:spTree>
+    <p:extLst>
+      <p:ext uri="{BB962C8B-B14F-4D97-AF65-F5344CB8AC3E}">
+        <p14:creationId xmlns:p14="http://schemas.microsoft.com/office/powerpoint/2010/main" val="2802100400"/>
+      </p:ext>
+    </p:extLst>
+  </p:cSld>
+  <p:clrMapOvr>
+    <a:masterClrMapping/>
+  </p:clrMapOvr>
+</p:sld>
+</file>
+
+<file path=ppt/slides/slide11.xml><?xml version="1.0" encoding="utf-8"?>
+<p:sld xmlns:a="http://schemas.openxmlformats.org/drawingml/2006/main" xmlns:r="http://schemas.openxmlformats.org/officeDocument/2006/relationships" xmlns:p="http://schemas.openxmlformats.org/presentationml/2006/main">
+  <p:cSld>
+    <p:spTree>
+      <p:nvGrpSpPr>
+        <p:cNvPr id="1" name=""/>
+        <p:cNvGrpSpPr/>
+        <p:nvPr/>
+      </p:nvGrpSpPr>
+      <p:grpSpPr>
+        <a:xfrm>
+          <a:off x="0" y="0"/>
+          <a:ext cx="0" cy="0"/>
+          <a:chOff x="0" y="0"/>
+          <a:chExt cx="0" cy="0"/>
+        </a:xfrm>
+      </p:grpSpPr>
+    </p:spTree>
+    <p:extLst>
+      <p:ext uri="{BB962C8B-B14F-4D97-AF65-F5344CB8AC3E}">
+        <p14:creationId xmlns:p14="http://schemas.microsoft.com/office/powerpoint/2010/main" val="2116760150"/>
       </p:ext>
     </p:extLst>
   </p:cSld>

</xml_diff>

<commit_message>
fix the chapters "buffer modes"
</commit_message>
<xml_diff>
--- a/VEEPortingGuide/images/ui_overview2.pptx
+++ b/VEEPortingGuide/images/ui_overview2.pptx
@@ -5,10 +5,10 @@
     <p:sldMasterId id="2147483660" r:id="rId1"/>
   </p:sldMasterIdLst>
   <p:notesMasterIdLst>
-    <p:notesMasterId r:id="rId16"/>
+    <p:notesMasterId r:id="rId17"/>
   </p:notesMasterIdLst>
   <p:handoutMasterIdLst>
-    <p:handoutMasterId r:id="rId17"/>
+    <p:handoutMasterId r:id="rId18"/>
   </p:handoutMasterIdLst>
   <p:sldIdLst>
     <p:sldId id="256" r:id="rId2"/>
@@ -21,10 +21,11 @@
     <p:sldId id="313" r:id="rId9"/>
     <p:sldId id="316" r:id="rId10"/>
     <p:sldId id="318" r:id="rId11"/>
-    <p:sldId id="317" r:id="rId12"/>
-    <p:sldId id="319" r:id="rId13"/>
-    <p:sldId id="320" r:id="rId14"/>
-    <p:sldId id="321" r:id="rId15"/>
+    <p:sldId id="322" r:id="rId12"/>
+    <p:sldId id="317" r:id="rId13"/>
+    <p:sldId id="319" r:id="rId14"/>
+    <p:sldId id="320" r:id="rId15"/>
+    <p:sldId id="321" r:id="rId16"/>
   </p:sldIdLst>
   <p:sldSz cx="12192000" cy="6858000"/>
   <p:notesSz cx="6858000" cy="9144000"/>
@@ -10256,7 +10257,7 @@
     </p:spTree>
     <p:extLst>
       <p:ext uri="{BB962C8B-B14F-4D97-AF65-F5344CB8AC3E}">
-        <p14:creationId xmlns:p14="http://schemas.microsoft.com/office/powerpoint/2010/main" val="883837639"/>
+        <p14:creationId xmlns:p14="http://schemas.microsoft.com/office/powerpoint/2010/main" val="1811495877"/>
       </p:ext>
     </p:extLst>
   </p:cSld>
@@ -10340,7 +10341,7 @@
     </p:spTree>
     <p:extLst>
       <p:ext uri="{BB962C8B-B14F-4D97-AF65-F5344CB8AC3E}">
-        <p14:creationId xmlns:p14="http://schemas.microsoft.com/office/powerpoint/2010/main" val="858701620"/>
+        <p14:creationId xmlns:p14="http://schemas.microsoft.com/office/powerpoint/2010/main" val="883837639"/>
       </p:ext>
     </p:extLst>
   </p:cSld>
@@ -10424,6 +10425,90 @@
     </p:spTree>
     <p:extLst>
       <p:ext uri="{BB962C8B-B14F-4D97-AF65-F5344CB8AC3E}">
+        <p14:creationId xmlns:p14="http://schemas.microsoft.com/office/powerpoint/2010/main" val="858701620"/>
+      </p:ext>
+    </p:extLst>
+  </p:cSld>
+  <p:clrMapOvr>
+    <a:masterClrMapping/>
+  </p:clrMapOvr>
+</p:notes>
+</file>
+
+<file path=ppt/notesSlides/notesSlide13.xml><?xml version="1.0" encoding="utf-8"?>
+<p:notes xmlns:a="http://schemas.openxmlformats.org/drawingml/2006/main" xmlns:r="http://schemas.openxmlformats.org/officeDocument/2006/relationships" xmlns:p="http://schemas.openxmlformats.org/presentationml/2006/main">
+  <p:cSld>
+    <p:spTree>
+      <p:nvGrpSpPr>
+        <p:cNvPr id="1" name=""/>
+        <p:cNvGrpSpPr/>
+        <p:nvPr/>
+      </p:nvGrpSpPr>
+      <p:grpSpPr>
+        <a:xfrm>
+          <a:off x="0" y="0"/>
+          <a:ext cx="0" cy="0"/>
+          <a:chOff x="0" y="0"/>
+          <a:chExt cx="0" cy="0"/>
+        </a:xfrm>
+      </p:grpSpPr>
+      <p:sp>
+        <p:nvSpPr>
+          <p:cNvPr id="2" name="Slide Image Placeholder 1"/>
+          <p:cNvSpPr>
+            <a:spLocks noGrp="1" noRot="1" noChangeAspect="1"/>
+          </p:cNvSpPr>
+          <p:nvPr>
+            <p:ph type="sldImg"/>
+          </p:nvPr>
+        </p:nvSpPr>
+        <p:spPr/>
+      </p:sp>
+      <p:sp>
+        <p:nvSpPr>
+          <p:cNvPr id="3" name="Notes Placeholder 2"/>
+          <p:cNvSpPr>
+            <a:spLocks noGrp="1"/>
+          </p:cNvSpPr>
+          <p:nvPr>
+            <p:ph type="body" idx="1"/>
+          </p:nvPr>
+        </p:nvSpPr>
+        <p:spPr/>
+        <p:txBody>
+          <a:bodyPr/>
+          <a:lstStyle/>
+          <a:p>
+            <a:pPr marL="0" indent="0">
+              <a:buFont typeface="Arial" panose="020B0604020202020204" pitchFamily="34" charset="0"/>
+              <a:buNone/>
+            </a:pPr>
+            <a:endParaRPr lang="en-US" dirty="0"/>
+          </a:p>
+        </p:txBody>
+      </p:sp>
+      <p:sp>
+        <p:nvSpPr>
+          <p:cNvPr id="4" name="Footer Placeholder 3"/>
+          <p:cNvSpPr>
+            <a:spLocks noGrp="1"/>
+          </p:cNvSpPr>
+          <p:nvPr>
+            <p:ph type="ftr" sz="quarter" idx="4"/>
+          </p:nvPr>
+        </p:nvSpPr>
+        <p:spPr/>
+        <p:txBody>
+          <a:bodyPr/>
+          <a:lstStyle/>
+          <a:p>
+            <a:endParaRPr lang="en-US" dirty="0"/>
+          </a:p>
+        </p:txBody>
+      </p:sp>
+    </p:spTree>
+    <p:extLst>
+      <p:ext uri="{BB962C8B-B14F-4D97-AF65-F5344CB8AC3E}">
         <p14:creationId xmlns:p14="http://schemas.microsoft.com/office/powerpoint/2010/main" val="3764272466"/>
       </p:ext>
     </p:extLst>
@@ -10434,7 +10519,7 @@
 </p:notes>
 </file>
 
-<file path=ppt/notesSlides/notesSlide13.xml><?xml version="1.0" encoding="utf-8"?>
+<file path=ppt/notesSlides/notesSlide14.xml><?xml version="1.0" encoding="utf-8"?>
 <p:notes xmlns:a="http://schemas.openxmlformats.org/drawingml/2006/main" xmlns:r="http://schemas.openxmlformats.org/officeDocument/2006/relationships" xmlns:p="http://schemas.openxmlformats.org/presentationml/2006/main">
   <p:cSld>
     <p:spTree>
@@ -30907,6 +30992,891 @@
       </p:grpSpPr>
       <p:sp>
         <p:nvSpPr>
+          <p:cNvPr id="16" name="Rectangle 15">
+            <a:extLst>
+              <a:ext uri="{FF2B5EF4-FFF2-40B4-BE49-F238E27FC236}">
+                <a16:creationId xmlns:a16="http://schemas.microsoft.com/office/drawing/2014/main" id="{64AD43B7-23E8-6DBF-53B4-D516396CBA62}"/>
+              </a:ext>
+            </a:extLst>
+          </p:cNvPr>
+          <p:cNvSpPr/>
+          <p:nvPr/>
+        </p:nvSpPr>
+        <p:spPr>
+          <a:xfrm>
+            <a:off x="1431375" y="1897676"/>
+            <a:ext cx="5290435" cy="3296624"/>
+          </a:xfrm>
+          <a:prstGeom prst="rect">
+            <a:avLst/>
+          </a:prstGeom>
+          <a:ln/>
+        </p:spPr>
+        <p:style>
+          <a:lnRef idx="2">
+            <a:schemeClr val="accent2"/>
+          </a:lnRef>
+          <a:fillRef idx="1">
+            <a:schemeClr val="lt1"/>
+          </a:fillRef>
+          <a:effectRef idx="0">
+            <a:schemeClr val="accent2"/>
+          </a:effectRef>
+          <a:fontRef idx="minor">
+            <a:schemeClr val="dk1"/>
+          </a:fontRef>
+        </p:style>
+        <p:txBody>
+          <a:bodyPr rtlCol="0" anchor="b" anchorCtr="0"/>
+          <a:lstStyle/>
+          <a:p>
+            <a:pPr algn="ctr"/>
+            <a:r>
+              <a:rPr lang="en-US" sz="1400" dirty="0">
+                <a:solidFill>
+                  <a:schemeClr val="tx2"/>
+                </a:solidFill>
+                <a:latin typeface="Source Sans Pro Light" panose="020B0403030403020204" pitchFamily="34" charset="77"/>
+                <a:ea typeface="Source Sans Pro" panose="020B0503030403020204" pitchFamily="34" charset="0"/>
+              </a:rPr>
+              <a:t>MCU</a:t>
+            </a:r>
+          </a:p>
+        </p:txBody>
+      </p:sp>
+      <p:sp>
+        <p:nvSpPr>
+          <p:cNvPr id="11" name="Rectangle 10">
+            <a:extLst>
+              <a:ext uri="{FF2B5EF4-FFF2-40B4-BE49-F238E27FC236}">
+                <a16:creationId xmlns:a16="http://schemas.microsoft.com/office/drawing/2014/main" id="{FD80A1C3-DC8A-ADFF-8382-C05410AF9436}"/>
+              </a:ext>
+            </a:extLst>
+          </p:cNvPr>
+          <p:cNvSpPr/>
+          <p:nvPr/>
+        </p:nvSpPr>
+        <p:spPr>
+          <a:xfrm>
+            <a:off x="7127664" y="1897675"/>
+            <a:ext cx="4384713" cy="3296624"/>
+          </a:xfrm>
+          <a:prstGeom prst="rect">
+            <a:avLst/>
+          </a:prstGeom>
+          <a:ln/>
+        </p:spPr>
+        <p:style>
+          <a:lnRef idx="2">
+            <a:schemeClr val="accent2"/>
+          </a:lnRef>
+          <a:fillRef idx="1">
+            <a:schemeClr val="lt1"/>
+          </a:fillRef>
+          <a:effectRef idx="0">
+            <a:schemeClr val="accent2"/>
+          </a:effectRef>
+          <a:fontRef idx="minor">
+            <a:schemeClr val="dk1"/>
+          </a:fontRef>
+        </p:style>
+        <p:txBody>
+          <a:bodyPr rtlCol="0" anchor="b" anchorCtr="0"/>
+          <a:lstStyle/>
+          <a:p>
+            <a:pPr algn="ctr"/>
+            <a:r>
+              <a:rPr lang="en-US" sz="1400" dirty="0">
+                <a:solidFill>
+                  <a:schemeClr val="tx2"/>
+                </a:solidFill>
+                <a:latin typeface="Source Sans Pro Light" panose="020B0403030403020204" pitchFamily="34" charset="77"/>
+                <a:ea typeface="Source Sans Pro" panose="020B0503030403020204" pitchFamily="34" charset="0"/>
+              </a:rPr>
+              <a:t>Display module</a:t>
+            </a:r>
+          </a:p>
+        </p:txBody>
+      </p:sp>
+      <p:pic>
+        <p:nvPicPr>
+          <p:cNvPr id="8" name="Picture 7">
+            <a:extLst>
+              <a:ext uri="{FF2B5EF4-FFF2-40B4-BE49-F238E27FC236}">
+                <a16:creationId xmlns:a16="http://schemas.microsoft.com/office/drawing/2014/main" id="{FFED50E9-4666-827D-A26D-B1C27D6DCC8C}"/>
+              </a:ext>
+            </a:extLst>
+          </p:cNvPr>
+          <p:cNvPicPr>
+            <a:picLocks noChangeAspect="1"/>
+          </p:cNvPicPr>
+          <p:nvPr/>
+        </p:nvPicPr>
+        <p:blipFill rotWithShape="1">
+          <a:blip r:embed="rId3" cstate="print">
+            <a:extLst>
+              <a:ext uri="{28A0092B-C50C-407E-A947-70E740481C1C}">
+                <a14:useLocalDpi xmlns:a14="http://schemas.microsoft.com/office/drawing/2010/main" val="0"/>
+              </a:ext>
+            </a:extLst>
+          </a:blip>
+          <a:srcRect l="18554" t="45307" r="13825" b="13196"/>
+          <a:stretch/>
+        </p:blipFill>
+        <p:spPr>
+          <a:xfrm>
+            <a:off x="8858813" y="2708978"/>
+            <a:ext cx="2279239" cy="1415820"/>
+          </a:xfrm>
+          <a:prstGeom prst="rect">
+            <a:avLst/>
+          </a:prstGeom>
+        </p:spPr>
+      </p:pic>
+      <p:sp>
+        <p:nvSpPr>
+          <p:cNvPr id="10" name="Arc 9">
+            <a:extLst>
+              <a:ext uri="{FF2B5EF4-FFF2-40B4-BE49-F238E27FC236}">
+                <a16:creationId xmlns:a16="http://schemas.microsoft.com/office/drawing/2014/main" id="{070CE625-638E-D085-FAEA-696B711BC3C5}"/>
+              </a:ext>
+            </a:extLst>
+          </p:cNvPr>
+          <p:cNvSpPr/>
+          <p:nvPr/>
+        </p:nvSpPr>
+        <p:spPr>
+          <a:xfrm>
+            <a:off x="3966071" y="2542830"/>
+            <a:ext cx="5496491" cy="1787652"/>
+          </a:xfrm>
+          <a:prstGeom prst="arc">
+            <a:avLst>
+              <a:gd name="adj1" fmla="val 11979648"/>
+              <a:gd name="adj2" fmla="val 9567484"/>
+            </a:avLst>
+          </a:prstGeom>
+          <a:ln w="25400">
+            <a:tailEnd type="stealth" w="lg" len="lg"/>
+          </a:ln>
+        </p:spPr>
+        <p:style>
+          <a:lnRef idx="1">
+            <a:schemeClr val="accent1"/>
+          </a:lnRef>
+          <a:fillRef idx="0">
+            <a:schemeClr val="accent1"/>
+          </a:fillRef>
+          <a:effectRef idx="0">
+            <a:schemeClr val="accent1"/>
+          </a:effectRef>
+          <a:fontRef idx="minor">
+            <a:schemeClr val="tx1"/>
+          </a:fontRef>
+        </p:style>
+        <p:txBody>
+          <a:bodyPr rtlCol="0" anchor="ctr"/>
+          <a:lstStyle/>
+          <a:p>
+            <a:pPr algn="ctr"/>
+            <a:endParaRPr lang="en-US"/>
+          </a:p>
+        </p:txBody>
+      </p:sp>
+      <p:sp>
+        <p:nvSpPr>
+          <p:cNvPr id="7" name="Rectangle 6">
+            <a:extLst>
+              <a:ext uri="{FF2B5EF4-FFF2-40B4-BE49-F238E27FC236}">
+                <a16:creationId xmlns:a16="http://schemas.microsoft.com/office/drawing/2014/main" id="{EE9CF8DD-BEBD-03CC-60A2-FB1191005967}"/>
+              </a:ext>
+            </a:extLst>
+          </p:cNvPr>
+          <p:cNvSpPr/>
+          <p:nvPr/>
+        </p:nvSpPr>
+        <p:spPr>
+          <a:xfrm>
+            <a:off x="7416641" y="3159565"/>
+            <a:ext cx="762586" cy="507693"/>
+          </a:xfrm>
+          <a:prstGeom prst="rect">
+            <a:avLst/>
+          </a:prstGeom>
+          <a:ln/>
+        </p:spPr>
+        <p:style>
+          <a:lnRef idx="2">
+            <a:schemeClr val="accent1"/>
+          </a:lnRef>
+          <a:fillRef idx="1">
+            <a:schemeClr val="lt1"/>
+          </a:fillRef>
+          <a:effectRef idx="0">
+            <a:schemeClr val="accent1"/>
+          </a:effectRef>
+          <a:fontRef idx="minor">
+            <a:schemeClr val="dk1"/>
+          </a:fontRef>
+        </p:style>
+        <p:txBody>
+          <a:bodyPr rtlCol="0" anchor="ctr"/>
+          <a:lstStyle/>
+          <a:p>
+            <a:pPr algn="ctr"/>
+            <a:r>
+              <a:rPr lang="en-US" sz="1400" dirty="0">
+                <a:solidFill>
+                  <a:schemeClr val="tx2"/>
+                </a:solidFill>
+                <a:latin typeface="Source Sans Pro Light" panose="020B0403030403020204" pitchFamily="34" charset="77"/>
+                <a:ea typeface="Source Sans Pro" panose="020B0503030403020204" pitchFamily="34" charset="0"/>
+              </a:rPr>
+              <a:t>LCDC</a:t>
+            </a:r>
+          </a:p>
+        </p:txBody>
+      </p:sp>
+      <p:sp>
+        <p:nvSpPr>
+          <p:cNvPr id="14" name="Rectangle 13">
+            <a:extLst>
+              <a:ext uri="{FF2B5EF4-FFF2-40B4-BE49-F238E27FC236}">
+                <a16:creationId xmlns:a16="http://schemas.microsoft.com/office/drawing/2014/main" id="{F79704A7-1530-628C-D595-3F2FEF1E99C5}"/>
+              </a:ext>
+            </a:extLst>
+          </p:cNvPr>
+          <p:cNvSpPr/>
+          <p:nvPr/>
+        </p:nvSpPr>
+        <p:spPr>
+          <a:xfrm>
+            <a:off x="5749586" y="3159565"/>
+            <a:ext cx="762586" cy="507693"/>
+          </a:xfrm>
+          <a:prstGeom prst="rect">
+            <a:avLst/>
+          </a:prstGeom>
+          <a:ln/>
+        </p:spPr>
+        <p:style>
+          <a:lnRef idx="2">
+            <a:schemeClr val="accent1"/>
+          </a:lnRef>
+          <a:fillRef idx="1">
+            <a:schemeClr val="lt1"/>
+          </a:fillRef>
+          <a:effectRef idx="0">
+            <a:schemeClr val="accent1"/>
+          </a:effectRef>
+          <a:fontRef idx="minor">
+            <a:schemeClr val="dk1"/>
+          </a:fontRef>
+        </p:style>
+        <p:txBody>
+          <a:bodyPr rtlCol="0" anchor="ctr"/>
+          <a:lstStyle/>
+          <a:p>
+            <a:pPr algn="ctr"/>
+            <a:r>
+              <a:rPr lang="en-US" sz="1400" dirty="0">
+                <a:solidFill>
+                  <a:schemeClr val="tx2"/>
+                </a:solidFill>
+                <a:latin typeface="Source Sans Pro Light" panose="020B0403030403020204" pitchFamily="34" charset="77"/>
+                <a:ea typeface="Source Sans Pro" panose="020B0503030403020204" pitchFamily="34" charset="0"/>
+              </a:rPr>
+              <a:t>LCDC</a:t>
+            </a:r>
+          </a:p>
+        </p:txBody>
+      </p:sp>
+      <p:sp>
+        <p:nvSpPr>
+          <p:cNvPr id="15" name="Rectangle 14">
+            <a:extLst>
+              <a:ext uri="{FF2B5EF4-FFF2-40B4-BE49-F238E27FC236}">
+                <a16:creationId xmlns:a16="http://schemas.microsoft.com/office/drawing/2014/main" id="{65049CB4-0DDB-CE65-2175-D46A619BA7B2}"/>
+              </a:ext>
+            </a:extLst>
+          </p:cNvPr>
+          <p:cNvSpPr/>
+          <p:nvPr/>
+        </p:nvSpPr>
+        <p:spPr>
+          <a:xfrm>
+            <a:off x="3858937" y="2921307"/>
+            <a:ext cx="1637489" cy="1015386"/>
+          </a:xfrm>
+          <a:prstGeom prst="rect">
+            <a:avLst/>
+          </a:prstGeom>
+          <a:ln/>
+        </p:spPr>
+        <p:style>
+          <a:lnRef idx="2">
+            <a:schemeClr val="accent1"/>
+          </a:lnRef>
+          <a:fillRef idx="1">
+            <a:schemeClr val="lt1"/>
+          </a:fillRef>
+          <a:effectRef idx="0">
+            <a:schemeClr val="accent1"/>
+          </a:effectRef>
+          <a:fontRef idx="minor">
+            <a:schemeClr val="dk1"/>
+          </a:fontRef>
+        </p:style>
+        <p:txBody>
+          <a:bodyPr rtlCol="0" anchor="ctr"/>
+          <a:lstStyle/>
+          <a:p>
+            <a:pPr algn="ctr"/>
+            <a:r>
+              <a:rPr lang="en-US" sz="1400" dirty="0">
+                <a:solidFill>
+                  <a:schemeClr val="tx2"/>
+                </a:solidFill>
+                <a:latin typeface="Source Sans Pro Light" panose="020B0403030403020204" pitchFamily="34" charset="77"/>
+                <a:ea typeface="Source Sans Pro" panose="020B0503030403020204" pitchFamily="34" charset="0"/>
+              </a:rPr>
+              <a:t>Frame buffer</a:t>
+            </a:r>
+          </a:p>
+        </p:txBody>
+      </p:sp>
+      <p:cxnSp>
+        <p:nvCxnSpPr>
+          <p:cNvPr id="17" name="Straight Connector 16">
+            <a:extLst>
+              <a:ext uri="{FF2B5EF4-FFF2-40B4-BE49-F238E27FC236}">
+                <a16:creationId xmlns:a16="http://schemas.microsoft.com/office/drawing/2014/main" id="{39002000-D704-2B02-CC7E-0FEDD6AAC47B}"/>
+              </a:ext>
+            </a:extLst>
+          </p:cNvPr>
+          <p:cNvCxnSpPr>
+            <a:cxnSpLocks/>
+            <a:stCxn id="14" idx="3"/>
+            <a:endCxn id="7" idx="1"/>
+          </p:cNvCxnSpPr>
+          <p:nvPr/>
+        </p:nvCxnSpPr>
+        <p:spPr>
+          <a:xfrm>
+            <a:off x="6512172" y="3413412"/>
+            <a:ext cx="904469" cy="0"/>
+          </a:xfrm>
+          <a:prstGeom prst="line">
+            <a:avLst/>
+          </a:prstGeom>
+          <a:ln w="19050"/>
+        </p:spPr>
+        <p:style>
+          <a:lnRef idx="1">
+            <a:schemeClr val="accent4"/>
+          </a:lnRef>
+          <a:fillRef idx="0">
+            <a:schemeClr val="accent4"/>
+          </a:fillRef>
+          <a:effectRef idx="0">
+            <a:schemeClr val="accent4"/>
+          </a:effectRef>
+          <a:fontRef idx="minor">
+            <a:schemeClr val="tx1"/>
+          </a:fontRef>
+        </p:style>
+      </p:cxnSp>
+      <p:cxnSp>
+        <p:nvCxnSpPr>
+          <p:cNvPr id="20" name="Straight Connector 19">
+            <a:extLst>
+              <a:ext uri="{FF2B5EF4-FFF2-40B4-BE49-F238E27FC236}">
+                <a16:creationId xmlns:a16="http://schemas.microsoft.com/office/drawing/2014/main" id="{A58706F5-92DC-DD6A-522F-3751BFC398BA}"/>
+              </a:ext>
+            </a:extLst>
+          </p:cNvPr>
+          <p:cNvCxnSpPr>
+            <a:cxnSpLocks/>
+          </p:cNvCxnSpPr>
+          <p:nvPr/>
+        </p:nvCxnSpPr>
+        <p:spPr>
+          <a:xfrm flipV="1">
+            <a:off x="6831045" y="3333868"/>
+            <a:ext cx="148324" cy="190263"/>
+          </a:xfrm>
+          <a:prstGeom prst="line">
+            <a:avLst/>
+          </a:prstGeom>
+          <a:ln w="15875"/>
+        </p:spPr>
+        <p:style>
+          <a:lnRef idx="1">
+            <a:schemeClr val="accent4"/>
+          </a:lnRef>
+          <a:fillRef idx="0">
+            <a:schemeClr val="accent4"/>
+          </a:fillRef>
+          <a:effectRef idx="0">
+            <a:schemeClr val="accent4"/>
+          </a:effectRef>
+          <a:fontRef idx="minor">
+            <a:schemeClr val="tx1"/>
+          </a:fontRef>
+        </p:style>
+      </p:cxnSp>
+      <p:cxnSp>
+        <p:nvCxnSpPr>
+          <p:cNvPr id="18" name="Straight Connector 17">
+            <a:extLst>
+              <a:ext uri="{FF2B5EF4-FFF2-40B4-BE49-F238E27FC236}">
+                <a16:creationId xmlns:a16="http://schemas.microsoft.com/office/drawing/2014/main" id="{2D602AE7-0E9D-5DE3-055C-6D70D35F7389}"/>
+              </a:ext>
+            </a:extLst>
+          </p:cNvPr>
+          <p:cNvCxnSpPr/>
+          <p:nvPr/>
+        </p:nvCxnSpPr>
+        <p:spPr>
+          <a:xfrm>
+            <a:off x="8177100" y="3425591"/>
+            <a:ext cx="683840" cy="1"/>
+          </a:xfrm>
+          <a:prstGeom prst="line">
+            <a:avLst/>
+          </a:prstGeom>
+        </p:spPr>
+        <p:style>
+          <a:lnRef idx="1">
+            <a:schemeClr val="accent4"/>
+          </a:lnRef>
+          <a:fillRef idx="0">
+            <a:schemeClr val="accent4"/>
+          </a:fillRef>
+          <a:effectRef idx="0">
+            <a:schemeClr val="accent4"/>
+          </a:effectRef>
+          <a:fontRef idx="minor">
+            <a:schemeClr val="tx1"/>
+          </a:fontRef>
+        </p:style>
+      </p:cxnSp>
+      <p:cxnSp>
+        <p:nvCxnSpPr>
+          <p:cNvPr id="19" name="Straight Connector 18">
+            <a:extLst>
+              <a:ext uri="{FF2B5EF4-FFF2-40B4-BE49-F238E27FC236}">
+                <a16:creationId xmlns:a16="http://schemas.microsoft.com/office/drawing/2014/main" id="{FCAF8A7D-C69E-3F8B-CFA8-B2A81AEA78A2}"/>
+              </a:ext>
+            </a:extLst>
+          </p:cNvPr>
+          <p:cNvCxnSpPr>
+            <a:cxnSpLocks/>
+          </p:cNvCxnSpPr>
+          <p:nvPr/>
+        </p:nvCxnSpPr>
+        <p:spPr>
+          <a:xfrm flipV="1">
+            <a:off x="8430260" y="3368240"/>
+            <a:ext cx="113670" cy="145810"/>
+          </a:xfrm>
+          <a:prstGeom prst="line">
+            <a:avLst/>
+          </a:prstGeom>
+        </p:spPr>
+        <p:style>
+          <a:lnRef idx="1">
+            <a:schemeClr val="accent4"/>
+          </a:lnRef>
+          <a:fillRef idx="0">
+            <a:schemeClr val="accent4"/>
+          </a:fillRef>
+          <a:effectRef idx="0">
+            <a:schemeClr val="accent4"/>
+          </a:effectRef>
+          <a:fontRef idx="minor">
+            <a:schemeClr val="tx1"/>
+          </a:fontRef>
+        </p:style>
+      </p:cxnSp>
+      <p:sp>
+        <p:nvSpPr>
+          <p:cNvPr id="3" name="Rectangle 2">
+            <a:extLst>
+              <a:ext uri="{FF2B5EF4-FFF2-40B4-BE49-F238E27FC236}">
+                <a16:creationId xmlns:a16="http://schemas.microsoft.com/office/drawing/2014/main" id="{46E57B75-70B0-F647-D712-A75871947801}"/>
+              </a:ext>
+            </a:extLst>
+          </p:cNvPr>
+          <p:cNvSpPr/>
+          <p:nvPr/>
+        </p:nvSpPr>
+        <p:spPr>
+          <a:xfrm>
+            <a:off x="1949057" y="2307134"/>
+            <a:ext cx="1637489" cy="1015386"/>
+          </a:xfrm>
+          <a:prstGeom prst="rect">
+            <a:avLst/>
+          </a:prstGeom>
+          <a:ln/>
+        </p:spPr>
+        <p:style>
+          <a:lnRef idx="2">
+            <a:schemeClr val="accent1"/>
+          </a:lnRef>
+          <a:fillRef idx="1">
+            <a:schemeClr val="lt1"/>
+          </a:fillRef>
+          <a:effectRef idx="0">
+            <a:schemeClr val="accent1"/>
+          </a:effectRef>
+          <a:fontRef idx="minor">
+            <a:schemeClr val="dk1"/>
+          </a:fontRef>
+        </p:style>
+        <p:txBody>
+          <a:bodyPr rtlCol="0" anchor="ctr"/>
+          <a:lstStyle/>
+          <a:p>
+            <a:pPr algn="ctr"/>
+            <a:r>
+              <a:rPr lang="en-US" sz="1400" dirty="0">
+                <a:solidFill>
+                  <a:schemeClr val="tx2"/>
+                </a:solidFill>
+                <a:latin typeface="Source Sans Pro Light" panose="020B0403030403020204" pitchFamily="34" charset="77"/>
+                <a:ea typeface="Source Sans Pro" panose="020B0503030403020204" pitchFamily="34" charset="0"/>
+              </a:rPr>
+              <a:t>Back buffer</a:t>
+            </a:r>
+          </a:p>
+        </p:txBody>
+      </p:sp>
+      <p:sp>
+        <p:nvSpPr>
+          <p:cNvPr id="9" name="TextBox 8">
+            <a:extLst>
+              <a:ext uri="{FF2B5EF4-FFF2-40B4-BE49-F238E27FC236}">
+                <a16:creationId xmlns:a16="http://schemas.microsoft.com/office/drawing/2014/main" id="{C1612016-8035-FD67-2BBA-1979063563E8}"/>
+              </a:ext>
+            </a:extLst>
+          </p:cNvPr>
+          <p:cNvSpPr txBox="1"/>
+          <p:nvPr/>
+        </p:nvSpPr>
+        <p:spPr>
+          <a:xfrm>
+            <a:off x="0" y="3288533"/>
+            <a:ext cx="720832" cy="215444"/>
+          </a:xfrm>
+          <a:prstGeom prst="rect">
+            <a:avLst/>
+          </a:prstGeom>
+          <a:noFill/>
+        </p:spPr>
+        <p:txBody>
+          <a:bodyPr vert="horz" wrap="square" lIns="0" tIns="0" rIns="0" bIns="0" numCol="1" spcCol="288000" rtlCol="0" anchor="t" anchorCtr="0">
+            <a:spAutoFit/>
+          </a:bodyPr>
+          <a:lstStyle/>
+          <a:p>
+            <a:pPr algn="r">
+              <a:spcBef>
+                <a:spcPts val="0"/>
+              </a:spcBef>
+              <a:spcAft>
+                <a:spcPts val="600"/>
+              </a:spcAft>
+            </a:pPr>
+            <a:r>
+              <a:rPr lang="en-US" sz="1400" b="0" i="0" spc="0" dirty="0">
+                <a:ln>
+                  <a:noFill/>
+                </a:ln>
+                <a:solidFill>
+                  <a:schemeClr val="tx2"/>
+                </a:solidFill>
+                <a:latin typeface="Source Sans Pro Light" charset="0"/>
+                <a:ea typeface="Source Sans Pro Light" charset="0"/>
+                <a:cs typeface="Source Sans Pro Light" charset="0"/>
+              </a:rPr>
+              <a:t>Drawings </a:t>
+            </a:r>
+          </a:p>
+        </p:txBody>
+      </p:sp>
+      <p:cxnSp>
+        <p:nvCxnSpPr>
+          <p:cNvPr id="12" name="Straight Arrow Connector 11">
+            <a:extLst>
+              <a:ext uri="{FF2B5EF4-FFF2-40B4-BE49-F238E27FC236}">
+                <a16:creationId xmlns:a16="http://schemas.microsoft.com/office/drawing/2014/main" id="{18E49BAF-41A5-1AF0-1587-F3A4FEC1AA83}"/>
+              </a:ext>
+            </a:extLst>
+          </p:cNvPr>
+          <p:cNvCxnSpPr/>
+          <p:nvPr/>
+        </p:nvCxnSpPr>
+        <p:spPr>
+          <a:xfrm>
+            <a:off x="934696" y="3423593"/>
+            <a:ext cx="896407" cy="0"/>
+          </a:xfrm>
+          <a:prstGeom prst="straightConnector1">
+            <a:avLst/>
+          </a:prstGeom>
+          <a:ln w="25400">
+            <a:tailEnd type="stealth" w="lg" len="med"/>
+          </a:ln>
+        </p:spPr>
+        <p:style>
+          <a:lnRef idx="1">
+            <a:schemeClr val="accent1"/>
+          </a:lnRef>
+          <a:fillRef idx="0">
+            <a:schemeClr val="accent1"/>
+          </a:fillRef>
+          <a:effectRef idx="0">
+            <a:schemeClr val="accent1"/>
+          </a:effectRef>
+          <a:fontRef idx="minor">
+            <a:schemeClr val="tx1"/>
+          </a:fontRef>
+        </p:style>
+      </p:cxnSp>
+      <p:cxnSp>
+        <p:nvCxnSpPr>
+          <p:cNvPr id="2" name="Straight Arrow Connector 1">
+            <a:extLst>
+              <a:ext uri="{FF2B5EF4-FFF2-40B4-BE49-F238E27FC236}">
+                <a16:creationId xmlns:a16="http://schemas.microsoft.com/office/drawing/2014/main" id="{F713EF1F-B989-0E94-CEDA-7F7765A98819}"/>
+              </a:ext>
+            </a:extLst>
+          </p:cNvPr>
+          <p:cNvCxnSpPr>
+            <a:cxnSpLocks/>
+          </p:cNvCxnSpPr>
+          <p:nvPr/>
+        </p:nvCxnSpPr>
+        <p:spPr>
+          <a:xfrm>
+            <a:off x="3494747" y="3472914"/>
+            <a:ext cx="599973" cy="0"/>
+          </a:xfrm>
+          <a:prstGeom prst="straightConnector1">
+            <a:avLst/>
+          </a:prstGeom>
+          <a:ln w="25400">
+            <a:tailEnd type="stealth" w="lg" len="med"/>
+          </a:ln>
+        </p:spPr>
+        <p:style>
+          <a:lnRef idx="1">
+            <a:schemeClr val="accent1"/>
+          </a:lnRef>
+          <a:fillRef idx="0">
+            <a:schemeClr val="accent1"/>
+          </a:fillRef>
+          <a:effectRef idx="0">
+            <a:schemeClr val="accent1"/>
+          </a:effectRef>
+          <a:fontRef idx="minor">
+            <a:schemeClr val="tx1"/>
+          </a:fontRef>
+        </p:style>
+      </p:cxnSp>
+      <p:sp>
+        <p:nvSpPr>
+          <p:cNvPr id="4" name="Rectangle 3">
+            <a:extLst>
+              <a:ext uri="{FF2B5EF4-FFF2-40B4-BE49-F238E27FC236}">
+                <a16:creationId xmlns:a16="http://schemas.microsoft.com/office/drawing/2014/main" id="{CED46245-158F-A895-FC48-1BA060A2F501}"/>
+              </a:ext>
+            </a:extLst>
+          </p:cNvPr>
+          <p:cNvSpPr/>
+          <p:nvPr/>
+        </p:nvSpPr>
+        <p:spPr>
+          <a:xfrm>
+            <a:off x="1945330" y="3730540"/>
+            <a:ext cx="1637489" cy="1015386"/>
+          </a:xfrm>
+          <a:prstGeom prst="rect">
+            <a:avLst/>
+          </a:prstGeom>
+          <a:ln/>
+        </p:spPr>
+        <p:style>
+          <a:lnRef idx="2">
+            <a:schemeClr val="accent1"/>
+          </a:lnRef>
+          <a:fillRef idx="1">
+            <a:schemeClr val="lt1"/>
+          </a:fillRef>
+          <a:effectRef idx="0">
+            <a:schemeClr val="accent1"/>
+          </a:effectRef>
+          <a:fontRef idx="minor">
+            <a:schemeClr val="dk1"/>
+          </a:fontRef>
+        </p:style>
+        <p:txBody>
+          <a:bodyPr rtlCol="0" anchor="ctr"/>
+          <a:lstStyle/>
+          <a:p>
+            <a:pPr algn="ctr"/>
+            <a:r>
+              <a:rPr lang="en-US" sz="1400" dirty="0">
+                <a:solidFill>
+                  <a:schemeClr val="tx2"/>
+                </a:solidFill>
+                <a:latin typeface="Source Sans Pro Light" panose="020B0403030403020204" pitchFamily="34" charset="77"/>
+                <a:ea typeface="Source Sans Pro" panose="020B0503030403020204" pitchFamily="34" charset="0"/>
+              </a:rPr>
+              <a:t>Back buffer</a:t>
+            </a:r>
+          </a:p>
+        </p:txBody>
+      </p:sp>
+      <p:sp>
+        <p:nvSpPr>
+          <p:cNvPr id="5" name="Arc 4">
+            <a:extLst>
+              <a:ext uri="{FF2B5EF4-FFF2-40B4-BE49-F238E27FC236}">
+                <a16:creationId xmlns:a16="http://schemas.microsoft.com/office/drawing/2014/main" id="{6473BA74-36D0-0BF4-EC2F-D253ED35AB30}"/>
+              </a:ext>
+            </a:extLst>
+          </p:cNvPr>
+          <p:cNvSpPr>
+            <a:spLocks noChangeAspect="1"/>
+          </p:cNvSpPr>
+          <p:nvPr/>
+        </p:nvSpPr>
+        <p:spPr>
+          <a:xfrm>
+            <a:off x="2460265" y="3232261"/>
+            <a:ext cx="574951" cy="543432"/>
+          </a:xfrm>
+          <a:prstGeom prst="arc">
+            <a:avLst>
+              <a:gd name="adj1" fmla="val 12872902"/>
+              <a:gd name="adj2" fmla="val 10403590"/>
+            </a:avLst>
+          </a:prstGeom>
+          <a:ln w="25400">
+            <a:tailEnd type="stealth" w="lg" len="lg"/>
+          </a:ln>
+        </p:spPr>
+        <p:style>
+          <a:lnRef idx="1">
+            <a:schemeClr val="accent1"/>
+          </a:lnRef>
+          <a:fillRef idx="0">
+            <a:schemeClr val="accent1"/>
+          </a:fillRef>
+          <a:effectRef idx="0">
+            <a:schemeClr val="accent1"/>
+          </a:effectRef>
+          <a:fontRef idx="minor">
+            <a:schemeClr val="tx1"/>
+          </a:fontRef>
+        </p:style>
+        <p:txBody>
+          <a:bodyPr rtlCol="0" anchor="ctr"/>
+          <a:lstStyle/>
+          <a:p>
+            <a:pPr algn="ctr"/>
+            <a:endParaRPr lang="en-US"/>
+          </a:p>
+        </p:txBody>
+      </p:sp>
+      <p:sp>
+        <p:nvSpPr>
+          <p:cNvPr id="6" name="TextBox 5">
+            <a:extLst>
+              <a:ext uri="{FF2B5EF4-FFF2-40B4-BE49-F238E27FC236}">
+                <a16:creationId xmlns:a16="http://schemas.microsoft.com/office/drawing/2014/main" id="{A4A922FF-C801-B74A-1D06-0F5E43CB8BC3}"/>
+              </a:ext>
+            </a:extLst>
+          </p:cNvPr>
+          <p:cNvSpPr txBox="1"/>
+          <p:nvPr/>
+        </p:nvSpPr>
+        <p:spPr>
+          <a:xfrm>
+            <a:off x="2633553" y="3386284"/>
+            <a:ext cx="827153" cy="215444"/>
+          </a:xfrm>
+          <a:prstGeom prst="rect">
+            <a:avLst/>
+          </a:prstGeom>
+          <a:noFill/>
+        </p:spPr>
+        <p:txBody>
+          <a:bodyPr vert="horz" wrap="square" lIns="0" tIns="0" rIns="0" bIns="0" numCol="1" spcCol="288000" rtlCol="0" anchor="t" anchorCtr="0">
+            <a:spAutoFit/>
+          </a:bodyPr>
+          <a:lstStyle/>
+          <a:p>
+            <a:pPr algn="r">
+              <a:spcBef>
+                <a:spcPts val="0"/>
+              </a:spcBef>
+              <a:spcAft>
+                <a:spcPts val="600"/>
+              </a:spcAft>
+            </a:pPr>
+            <a:r>
+              <a:rPr lang="en-US" sz="1400" b="0" i="0" spc="0" dirty="0">
+                <a:ln>
+                  <a:noFill/>
+                </a:ln>
+                <a:solidFill>
+                  <a:schemeClr val="tx2"/>
+                </a:solidFill>
+                <a:latin typeface="Source Sans Pro Light" charset="0"/>
+                <a:ea typeface="Source Sans Pro Light" charset="0"/>
+                <a:cs typeface="Source Sans Pro Light" charset="0"/>
+              </a:rPr>
+              <a:t>Flush </a:t>
+            </a:r>
+          </a:p>
+        </p:txBody>
+      </p:sp>
+    </p:spTree>
+    <p:extLst>
+      <p:ext uri="{BB962C8B-B14F-4D97-AF65-F5344CB8AC3E}">
+        <p14:creationId xmlns:p14="http://schemas.microsoft.com/office/powerpoint/2010/main" val="4002024810"/>
+      </p:ext>
+    </p:extLst>
+  </p:cSld>
+  <p:clrMapOvr>
+    <a:masterClrMapping/>
+  </p:clrMapOvr>
+</p:sld>
+</file>
+
+<file path=ppt/slides/slide12.xml><?xml version="1.0" encoding="utf-8"?>
+<p:sld xmlns:a="http://schemas.openxmlformats.org/drawingml/2006/main" xmlns:r="http://schemas.openxmlformats.org/officeDocument/2006/relationships" xmlns:p="http://schemas.openxmlformats.org/presentationml/2006/main">
+  <p:cSld>
+    <p:spTree>
+      <p:nvGrpSpPr>
+        <p:cNvPr id="1" name=""/>
+        <p:cNvGrpSpPr/>
+        <p:nvPr/>
+      </p:nvGrpSpPr>
+      <p:grpSpPr>
+        <a:xfrm>
+          <a:off x="0" y="0"/>
+          <a:ext cx="0" cy="0"/>
+          <a:chOff x="0" y="0"/>
+          <a:chExt cx="0" cy="0"/>
+        </a:xfrm>
+      </p:grpSpPr>
+      <p:sp>
+        <p:nvSpPr>
           <p:cNvPr id="2" name="Rectangle 1">
             <a:extLst>
               <a:ext uri="{FF2B5EF4-FFF2-40B4-BE49-F238E27FC236}">
@@ -32554,7 +33524,7 @@
 </p:sld>
 </file>
 
-<file path=ppt/slides/slide12.xml><?xml version="1.0" encoding="utf-8"?>
+<file path=ppt/slides/slide13.xml><?xml version="1.0" encoding="utf-8"?>
 <p:sld xmlns:a="http://schemas.openxmlformats.org/drawingml/2006/main" xmlns:r="http://schemas.openxmlformats.org/officeDocument/2006/relationships" xmlns:p="http://schemas.openxmlformats.org/presentationml/2006/main">
   <p:cSld>
     <p:spTree>
@@ -34426,7 +35396,7 @@
 </p:sld>
 </file>
 
-<file path=ppt/slides/slide13.xml><?xml version="1.0" encoding="utf-8"?>
+<file path=ppt/slides/slide14.xml><?xml version="1.0" encoding="utf-8"?>
 <p:sld xmlns:a="http://schemas.openxmlformats.org/drawingml/2006/main" xmlns:r="http://schemas.openxmlformats.org/officeDocument/2006/relationships" xmlns:p="http://schemas.openxmlformats.org/presentationml/2006/main">
   <p:cSld>
     <p:spTree>
@@ -36812,7 +37782,7 @@
 </p:sld>
 </file>
 
-<file path=ppt/slides/slide14.xml><?xml version="1.0" encoding="utf-8"?>
+<file path=ppt/slides/slide15.xml><?xml version="1.0" encoding="utf-8"?>
 <p:sld xmlns:a="http://schemas.openxmlformats.org/drawingml/2006/main" xmlns:r="http://schemas.openxmlformats.org/officeDocument/2006/relationships" xmlns:p="http://schemas.openxmlformats.org/presentationml/2006/main">
   <p:cSld>
     <p:spTree>
@@ -36872,59 +37842,6 @@
           </a:fontRef>
         </p:style>
       </p:cxnSp>
-      <p:sp>
-        <p:nvSpPr>
-          <p:cNvPr id="45" name="TextBox 44">
-            <a:extLst>
-              <a:ext uri="{FF2B5EF4-FFF2-40B4-BE49-F238E27FC236}">
-                <a16:creationId xmlns:a16="http://schemas.microsoft.com/office/drawing/2014/main" id="{70C8ED73-1DF2-00BE-28FF-1E7A78AF2938}"/>
-              </a:ext>
-            </a:extLst>
-          </p:cNvPr>
-          <p:cNvSpPr txBox="1"/>
-          <p:nvPr/>
-        </p:nvSpPr>
-        <p:spPr>
-          <a:xfrm>
-            <a:off x="-2744195" y="-4929353"/>
-            <a:ext cx="296624" cy="215444"/>
-          </a:xfrm>
-          <a:prstGeom prst="rect">
-            <a:avLst/>
-          </a:prstGeom>
-          <a:noFill/>
-        </p:spPr>
-        <p:txBody>
-          <a:bodyPr vert="horz" wrap="square" lIns="0" tIns="0" rIns="0" bIns="0" numCol="1" spcCol="288000" rtlCol="0" anchor="t" anchorCtr="0">
-            <a:spAutoFit/>
-          </a:bodyPr>
-          <a:lstStyle/>
-          <a:p>
-            <a:pPr algn="l">
-              <a:spcBef>
-                <a:spcPts val="0"/>
-              </a:spcBef>
-              <a:spcAft>
-                <a:spcPts val="600"/>
-              </a:spcAft>
-            </a:pPr>
-            <a:r>
-              <a:rPr lang="en-US" sz="1400" b="0" i="0" spc="0" dirty="0">
-                <a:ln>
-                  <a:noFill/>
-                </a:ln>
-                <a:solidFill>
-                  <a:schemeClr val="tx2"/>
-                </a:solidFill>
-                <a:latin typeface="Source Sans Pro Light" charset="0"/>
-                <a:ea typeface="Source Sans Pro Light" charset="0"/>
-                <a:cs typeface="Source Sans Pro Light" charset="0"/>
-              </a:rPr>
-              <a:t>no</a:t>
-            </a:r>
-          </a:p>
-        </p:txBody>
-      </p:sp>
       <p:cxnSp>
         <p:nvCxnSpPr>
           <p:cNvPr id="47" name="Connector: Elbow 46">
@@ -37998,112 +38915,6 @@
                 <a:ea typeface="Source Sans Pro" panose="020B0503030403020204" pitchFamily="34" charset="0"/>
               </a:rPr>
               <a:t>Connection Parallel</a:t>
-            </a:r>
-          </a:p>
-        </p:txBody>
-      </p:sp>
-      <p:sp>
-        <p:nvSpPr>
-          <p:cNvPr id="468" name="TextBox 467">
-            <a:extLst>
-              <a:ext uri="{FF2B5EF4-FFF2-40B4-BE49-F238E27FC236}">
-                <a16:creationId xmlns:a16="http://schemas.microsoft.com/office/drawing/2014/main" id="{580DC9F1-77A8-2A2B-CB29-361202138909}"/>
-              </a:ext>
-            </a:extLst>
-          </p:cNvPr>
-          <p:cNvSpPr txBox="1"/>
-          <p:nvPr/>
-        </p:nvSpPr>
-        <p:spPr>
-          <a:xfrm>
-            <a:off x="-684197" y="-4938746"/>
-            <a:ext cx="296624" cy="215444"/>
-          </a:xfrm>
-          <a:prstGeom prst="rect">
-            <a:avLst/>
-          </a:prstGeom>
-          <a:noFill/>
-        </p:spPr>
-        <p:txBody>
-          <a:bodyPr vert="horz" wrap="square" lIns="0" tIns="0" rIns="0" bIns="0" numCol="1" spcCol="288000" rtlCol="0" anchor="t" anchorCtr="0">
-            <a:spAutoFit/>
-          </a:bodyPr>
-          <a:lstStyle/>
-          <a:p>
-            <a:pPr algn="l">
-              <a:spcBef>
-                <a:spcPts val="0"/>
-              </a:spcBef>
-              <a:spcAft>
-                <a:spcPts val="600"/>
-              </a:spcAft>
-            </a:pPr>
-            <a:r>
-              <a:rPr lang="en-US" sz="1400" b="0" i="0" spc="0" dirty="0">
-                <a:ln>
-                  <a:noFill/>
-                </a:ln>
-                <a:solidFill>
-                  <a:schemeClr val="tx2"/>
-                </a:solidFill>
-                <a:latin typeface="Source Sans Pro Light" charset="0"/>
-                <a:ea typeface="Source Sans Pro Light" charset="0"/>
-                <a:cs typeface="Source Sans Pro Light" charset="0"/>
-              </a:rPr>
-              <a:t>yes</a:t>
-            </a:r>
-          </a:p>
-        </p:txBody>
-      </p:sp>
-      <p:sp>
-        <p:nvSpPr>
-          <p:cNvPr id="469" name="TextBox 468">
-            <a:extLst>
-              <a:ext uri="{FF2B5EF4-FFF2-40B4-BE49-F238E27FC236}">
-                <a16:creationId xmlns:a16="http://schemas.microsoft.com/office/drawing/2014/main" id="{C6130480-EB3A-662B-CFB5-3B1E4BF7BAC5}"/>
-              </a:ext>
-            </a:extLst>
-          </p:cNvPr>
-          <p:cNvSpPr txBox="1"/>
-          <p:nvPr/>
-        </p:nvSpPr>
-        <p:spPr>
-          <a:xfrm>
-            <a:off x="1158902" y="-4201764"/>
-            <a:ext cx="296624" cy="215444"/>
-          </a:xfrm>
-          <a:prstGeom prst="rect">
-            <a:avLst/>
-          </a:prstGeom>
-          <a:noFill/>
-        </p:spPr>
-        <p:txBody>
-          <a:bodyPr vert="horz" wrap="square" lIns="0" tIns="0" rIns="0" bIns="0" numCol="1" spcCol="288000" rtlCol="0" anchor="t" anchorCtr="0">
-            <a:spAutoFit/>
-          </a:bodyPr>
-          <a:lstStyle/>
-          <a:p>
-            <a:pPr algn="l">
-              <a:spcBef>
-                <a:spcPts val="0"/>
-              </a:spcBef>
-              <a:spcAft>
-                <a:spcPts val="600"/>
-              </a:spcAft>
-            </a:pPr>
-            <a:r>
-              <a:rPr lang="en-US" sz="1400" b="0" i="0" spc="0" dirty="0">
-                <a:ln>
-                  <a:noFill/>
-                </a:ln>
-                <a:solidFill>
-                  <a:schemeClr val="tx2"/>
-                </a:solidFill>
-                <a:latin typeface="Source Sans Pro Light" charset="0"/>
-                <a:ea typeface="Source Sans Pro Light" charset="0"/>
-                <a:cs typeface="Source Sans Pro Light" charset="0"/>
-              </a:rPr>
-              <a:t>yes</a:t>
             </a:r>
           </a:p>
         </p:txBody>

</xml_diff>

<commit_message>
review the decision trees
(cherry picked from commit 0bce7b812241d55ffbfc2fd8c36cd6e83522ff85)
</commit_message>
<xml_diff>
--- a/VEEPortingGuide/images/ui_overview2.pptx
+++ b/VEEPortingGuide/images/ui_overview2.pptx
@@ -5,10 +5,10 @@
     <p:sldMasterId id="2147483660" r:id="rId1"/>
   </p:sldMasterIdLst>
   <p:notesMasterIdLst>
-    <p:notesMasterId r:id="rId17"/>
+    <p:notesMasterId r:id="rId19"/>
   </p:notesMasterIdLst>
   <p:handoutMasterIdLst>
-    <p:handoutMasterId r:id="rId18"/>
+    <p:handoutMasterId r:id="rId20"/>
   </p:handoutMasterIdLst>
   <p:sldIdLst>
     <p:sldId id="256" r:id="rId2"/>
@@ -26,6 +26,8 @@
     <p:sldId id="319" r:id="rId14"/>
     <p:sldId id="320" r:id="rId15"/>
     <p:sldId id="321" r:id="rId16"/>
+    <p:sldId id="323" r:id="rId17"/>
+    <p:sldId id="324" r:id="rId18"/>
   </p:sldIdLst>
   <p:sldSz cx="12192000" cy="6858000"/>
   <p:notesSz cx="6858000" cy="9144000"/>
@@ -9648,7 +9650,7 @@
               <a:rPr lang="fr-FR" smtClean="0">
                 <a:latin typeface="Calibri Regular" charset="0"/>
               </a:rPr>
-              <a:t>jeudi 8 février 2024</a:t>
+              <a:t>lundi 19 février 2024</a:t>
             </a:fld>
             <a:endParaRPr lang="en-US" dirty="0">
               <a:latin typeface="Calibri Regular" charset="0"/>
@@ -9826,7 +9828,7 @@
           <a:p>
             <a:fld id="{885721CF-495B-2B41-A23A-4D3221F80235}" type="datetime2">
               <a:rPr lang="fr-FR" smtClean="0"/>
-              <a:t>jeudi 8 février 2024</a:t>
+              <a:t>lundi 19 février 2024</a:t>
             </a:fld>
             <a:endParaRPr lang="en-US" dirty="0"/>
           </a:p>
@@ -10594,6 +10596,222 @@
     <p:extLst>
       <p:ext uri="{BB962C8B-B14F-4D97-AF65-F5344CB8AC3E}">
         <p14:creationId xmlns:p14="http://schemas.microsoft.com/office/powerpoint/2010/main" val="296598514"/>
+      </p:ext>
+    </p:extLst>
+  </p:cSld>
+  <p:clrMapOvr>
+    <a:masterClrMapping/>
+  </p:clrMapOvr>
+</p:notes>
+</file>
+
+<file path=ppt/notesSlides/notesSlide15.xml><?xml version="1.0" encoding="utf-8"?>
+<p:notes xmlns:a="http://schemas.openxmlformats.org/drawingml/2006/main" xmlns:r="http://schemas.openxmlformats.org/officeDocument/2006/relationships" xmlns:p="http://schemas.openxmlformats.org/presentationml/2006/main">
+  <p:cSld>
+    <p:spTree>
+      <p:nvGrpSpPr>
+        <p:cNvPr id="1" name="">
+          <a:extLst>
+            <a:ext uri="{FF2B5EF4-FFF2-40B4-BE49-F238E27FC236}">
+              <a16:creationId xmlns:a16="http://schemas.microsoft.com/office/drawing/2014/main" id="{D0FF28E6-95C9-4756-84CA-A153D8810E28}"/>
+            </a:ext>
+          </a:extLst>
+        </p:cNvPr>
+        <p:cNvGrpSpPr/>
+        <p:nvPr/>
+      </p:nvGrpSpPr>
+      <p:grpSpPr>
+        <a:xfrm>
+          <a:off x="0" y="0"/>
+          <a:ext cx="0" cy="0"/>
+          <a:chOff x="0" y="0"/>
+          <a:chExt cx="0" cy="0"/>
+        </a:xfrm>
+      </p:grpSpPr>
+      <p:sp>
+        <p:nvSpPr>
+          <p:cNvPr id="2" name="Slide Image Placeholder 1">
+            <a:extLst>
+              <a:ext uri="{FF2B5EF4-FFF2-40B4-BE49-F238E27FC236}">
+                <a16:creationId xmlns:a16="http://schemas.microsoft.com/office/drawing/2014/main" id="{5F66419A-560C-6152-80E8-978C57E6383D}"/>
+              </a:ext>
+            </a:extLst>
+          </p:cNvPr>
+          <p:cNvSpPr>
+            <a:spLocks noGrp="1" noRot="1" noChangeAspect="1"/>
+          </p:cNvSpPr>
+          <p:nvPr>
+            <p:ph type="sldImg"/>
+          </p:nvPr>
+        </p:nvSpPr>
+        <p:spPr/>
+      </p:sp>
+      <p:sp>
+        <p:nvSpPr>
+          <p:cNvPr id="3" name="Notes Placeholder 2">
+            <a:extLst>
+              <a:ext uri="{FF2B5EF4-FFF2-40B4-BE49-F238E27FC236}">
+                <a16:creationId xmlns:a16="http://schemas.microsoft.com/office/drawing/2014/main" id="{34AAAD37-D2A0-660C-51CB-2BE4ECC1DFCD}"/>
+              </a:ext>
+            </a:extLst>
+          </p:cNvPr>
+          <p:cNvSpPr>
+            <a:spLocks noGrp="1"/>
+          </p:cNvSpPr>
+          <p:nvPr>
+            <p:ph type="body" idx="1"/>
+          </p:nvPr>
+        </p:nvSpPr>
+        <p:spPr/>
+        <p:txBody>
+          <a:bodyPr/>
+          <a:lstStyle/>
+          <a:p>
+            <a:pPr marL="0" indent="0">
+              <a:buFont typeface="Arial" panose="020B0604020202020204" pitchFamily="34" charset="0"/>
+              <a:buNone/>
+            </a:pPr>
+            <a:endParaRPr lang="en-US" dirty="0"/>
+          </a:p>
+        </p:txBody>
+      </p:sp>
+      <p:sp>
+        <p:nvSpPr>
+          <p:cNvPr id="4" name="Footer Placeholder 3">
+            <a:extLst>
+              <a:ext uri="{FF2B5EF4-FFF2-40B4-BE49-F238E27FC236}">
+                <a16:creationId xmlns:a16="http://schemas.microsoft.com/office/drawing/2014/main" id="{C4C44905-6DB7-CB74-36A5-829948D73D86}"/>
+              </a:ext>
+            </a:extLst>
+          </p:cNvPr>
+          <p:cNvSpPr>
+            <a:spLocks noGrp="1"/>
+          </p:cNvSpPr>
+          <p:nvPr>
+            <p:ph type="ftr" sz="quarter" idx="4"/>
+          </p:nvPr>
+        </p:nvSpPr>
+        <p:spPr/>
+        <p:txBody>
+          <a:bodyPr/>
+          <a:lstStyle/>
+          <a:p>
+            <a:endParaRPr lang="en-US" dirty="0"/>
+          </a:p>
+        </p:txBody>
+      </p:sp>
+    </p:spTree>
+    <p:extLst>
+      <p:ext uri="{BB962C8B-B14F-4D97-AF65-F5344CB8AC3E}">
+        <p14:creationId xmlns:p14="http://schemas.microsoft.com/office/powerpoint/2010/main" val="2457848129"/>
+      </p:ext>
+    </p:extLst>
+  </p:cSld>
+  <p:clrMapOvr>
+    <a:masterClrMapping/>
+  </p:clrMapOvr>
+</p:notes>
+</file>
+
+<file path=ppt/notesSlides/notesSlide16.xml><?xml version="1.0" encoding="utf-8"?>
+<p:notes xmlns:a="http://schemas.openxmlformats.org/drawingml/2006/main" xmlns:r="http://schemas.openxmlformats.org/officeDocument/2006/relationships" xmlns:p="http://schemas.openxmlformats.org/presentationml/2006/main">
+  <p:cSld>
+    <p:spTree>
+      <p:nvGrpSpPr>
+        <p:cNvPr id="1" name="">
+          <a:extLst>
+            <a:ext uri="{FF2B5EF4-FFF2-40B4-BE49-F238E27FC236}">
+              <a16:creationId xmlns:a16="http://schemas.microsoft.com/office/drawing/2014/main" id="{969AB7BE-B5F0-1BA4-F2AA-E9E37CC03C33}"/>
+            </a:ext>
+          </a:extLst>
+        </p:cNvPr>
+        <p:cNvGrpSpPr/>
+        <p:nvPr/>
+      </p:nvGrpSpPr>
+      <p:grpSpPr>
+        <a:xfrm>
+          <a:off x="0" y="0"/>
+          <a:ext cx="0" cy="0"/>
+          <a:chOff x="0" y="0"/>
+          <a:chExt cx="0" cy="0"/>
+        </a:xfrm>
+      </p:grpSpPr>
+      <p:sp>
+        <p:nvSpPr>
+          <p:cNvPr id="2" name="Slide Image Placeholder 1">
+            <a:extLst>
+              <a:ext uri="{FF2B5EF4-FFF2-40B4-BE49-F238E27FC236}">
+                <a16:creationId xmlns:a16="http://schemas.microsoft.com/office/drawing/2014/main" id="{D8D03EC0-8EAE-CB61-3E5C-E3CED008C6C3}"/>
+              </a:ext>
+            </a:extLst>
+          </p:cNvPr>
+          <p:cNvSpPr>
+            <a:spLocks noGrp="1" noRot="1" noChangeAspect="1"/>
+          </p:cNvSpPr>
+          <p:nvPr>
+            <p:ph type="sldImg"/>
+          </p:nvPr>
+        </p:nvSpPr>
+        <p:spPr/>
+      </p:sp>
+      <p:sp>
+        <p:nvSpPr>
+          <p:cNvPr id="3" name="Notes Placeholder 2">
+            <a:extLst>
+              <a:ext uri="{FF2B5EF4-FFF2-40B4-BE49-F238E27FC236}">
+                <a16:creationId xmlns:a16="http://schemas.microsoft.com/office/drawing/2014/main" id="{CAEDDF49-1185-C77B-88F8-A7CAEB91165D}"/>
+              </a:ext>
+            </a:extLst>
+          </p:cNvPr>
+          <p:cNvSpPr>
+            <a:spLocks noGrp="1"/>
+          </p:cNvSpPr>
+          <p:nvPr>
+            <p:ph type="body" idx="1"/>
+          </p:nvPr>
+        </p:nvSpPr>
+        <p:spPr/>
+        <p:txBody>
+          <a:bodyPr/>
+          <a:lstStyle/>
+          <a:p>
+            <a:pPr marL="0" indent="0">
+              <a:buFont typeface="Arial" panose="020B0604020202020204" pitchFamily="34" charset="0"/>
+              <a:buNone/>
+            </a:pPr>
+            <a:endParaRPr lang="en-US" dirty="0"/>
+          </a:p>
+        </p:txBody>
+      </p:sp>
+      <p:sp>
+        <p:nvSpPr>
+          <p:cNvPr id="4" name="Footer Placeholder 3">
+            <a:extLst>
+              <a:ext uri="{FF2B5EF4-FFF2-40B4-BE49-F238E27FC236}">
+                <a16:creationId xmlns:a16="http://schemas.microsoft.com/office/drawing/2014/main" id="{3D83F748-1E73-6391-CB43-65005F3A2097}"/>
+              </a:ext>
+            </a:extLst>
+          </p:cNvPr>
+          <p:cNvSpPr>
+            <a:spLocks noGrp="1"/>
+          </p:cNvSpPr>
+          <p:nvPr>
+            <p:ph type="ftr" sz="quarter" idx="4"/>
+          </p:nvPr>
+        </p:nvSpPr>
+        <p:spPr/>
+        <p:txBody>
+          <a:bodyPr/>
+          <a:lstStyle/>
+          <a:p>
+            <a:endParaRPr lang="en-US" dirty="0"/>
+          </a:p>
+        </p:txBody>
+      </p:sp>
+    </p:spTree>
+    <p:extLst>
+      <p:ext uri="{BB962C8B-B14F-4D97-AF65-F5344CB8AC3E}">
+        <p14:creationId xmlns:p14="http://schemas.microsoft.com/office/powerpoint/2010/main" val="3980192197"/>
       </p:ext>
     </p:extLst>
   </p:cSld>
@@ -23874,7 +24092,7 @@
           <a:p>
             <a:fld id="{4E285625-C24A-4341-90BC-6CD71F835625}" type="datetimeFigureOut">
               <a:rPr lang="en-GB" smtClean="0"/>
-              <a:t>08/02/2024</a:t>
+              <a:t>19/02/2024</a:t>
             </a:fld>
             <a:endParaRPr lang="en-GB"/>
           </a:p>
@@ -35821,7 +36039,7 @@
                 <a:latin typeface="Source Sans Pro Light" panose="020B0403030403020204" pitchFamily="34" charset="77"/>
                 <a:ea typeface="Source Sans Pro" panose="020B0503030403020204" pitchFamily="34" charset="0"/>
               </a:rPr>
-              <a:t>Parallel</a:t>
+              <a:t>Single</a:t>
             </a:r>
           </a:p>
         </p:txBody>
@@ -40346,6 +40564,2447 @@
     <p:extLst>
       <p:ext uri="{BB962C8B-B14F-4D97-AF65-F5344CB8AC3E}">
         <p14:creationId xmlns:p14="http://schemas.microsoft.com/office/powerpoint/2010/main" val="2348798651"/>
+      </p:ext>
+    </p:extLst>
+  </p:cSld>
+  <p:clrMapOvr>
+    <a:masterClrMapping/>
+  </p:clrMapOvr>
+</p:sld>
+</file>
+
+<file path=ppt/slides/slide16.xml><?xml version="1.0" encoding="utf-8"?>
+<p:sld xmlns:a="http://schemas.openxmlformats.org/drawingml/2006/main" xmlns:r="http://schemas.openxmlformats.org/officeDocument/2006/relationships" xmlns:p="http://schemas.openxmlformats.org/presentationml/2006/main">
+  <p:cSld>
+    <p:spTree>
+      <p:nvGrpSpPr>
+        <p:cNvPr id="1" name="">
+          <a:extLst>
+            <a:ext uri="{FF2B5EF4-FFF2-40B4-BE49-F238E27FC236}">
+              <a16:creationId xmlns:a16="http://schemas.microsoft.com/office/drawing/2014/main" id="{6FDFF038-45E9-D927-3C1E-44BC295DAEE4}"/>
+            </a:ext>
+          </a:extLst>
+        </p:cNvPr>
+        <p:cNvGrpSpPr/>
+        <p:nvPr/>
+      </p:nvGrpSpPr>
+      <p:grpSpPr>
+        <a:xfrm>
+          <a:off x="0" y="0"/>
+          <a:ext cx="0" cy="0"/>
+          <a:chOff x="0" y="0"/>
+          <a:chExt cx="0" cy="0"/>
+        </a:xfrm>
+      </p:grpSpPr>
+      <p:cxnSp>
+        <p:nvCxnSpPr>
+          <p:cNvPr id="42" name="Connector: Elbow 41">
+            <a:extLst>
+              <a:ext uri="{FF2B5EF4-FFF2-40B4-BE49-F238E27FC236}">
+                <a16:creationId xmlns:a16="http://schemas.microsoft.com/office/drawing/2014/main" id="{5D7B427E-4073-C2EA-D4C2-BA4C59CC4064}"/>
+              </a:ext>
+            </a:extLst>
+          </p:cNvPr>
+          <p:cNvCxnSpPr>
+            <a:cxnSpLocks/>
+            <a:stCxn id="378" idx="3"/>
+            <a:endCxn id="101" idx="0"/>
+          </p:cNvCxnSpPr>
+          <p:nvPr/>
+        </p:nvCxnSpPr>
+        <p:spPr>
+          <a:xfrm rot="10800000" flipV="1">
+            <a:off x="2962160" y="1428897"/>
+            <a:ext cx="1227207" cy="1271838"/>
+          </a:xfrm>
+          <a:prstGeom prst="bentConnector2">
+            <a:avLst/>
+          </a:prstGeom>
+          <a:ln w="19050">
+            <a:tailEnd type="triangle"/>
+          </a:ln>
+        </p:spPr>
+        <p:style>
+          <a:lnRef idx="1">
+            <a:schemeClr val="accent1"/>
+          </a:lnRef>
+          <a:fillRef idx="0">
+            <a:schemeClr val="accent1"/>
+          </a:fillRef>
+          <a:effectRef idx="0">
+            <a:schemeClr val="accent1"/>
+          </a:effectRef>
+          <a:fontRef idx="minor">
+            <a:schemeClr val="tx1"/>
+          </a:fontRef>
+        </p:style>
+      </p:cxnSp>
+      <p:sp>
+        <p:nvSpPr>
+          <p:cNvPr id="45" name="TextBox 44">
+            <a:extLst>
+              <a:ext uri="{FF2B5EF4-FFF2-40B4-BE49-F238E27FC236}">
+                <a16:creationId xmlns:a16="http://schemas.microsoft.com/office/drawing/2014/main" id="{352916D1-D382-5ADE-60C2-A0A75F0CEDC5}"/>
+              </a:ext>
+            </a:extLst>
+          </p:cNvPr>
+          <p:cNvSpPr txBox="1"/>
+          <p:nvPr/>
+        </p:nvSpPr>
+        <p:spPr>
+          <a:xfrm>
+            <a:off x="3575763" y="1137589"/>
+            <a:ext cx="799857" cy="215444"/>
+          </a:xfrm>
+          <a:prstGeom prst="rect">
+            <a:avLst/>
+          </a:prstGeom>
+          <a:noFill/>
+        </p:spPr>
+        <p:txBody>
+          <a:bodyPr vert="horz" wrap="square" lIns="0" tIns="0" rIns="0" bIns="0" numCol="1" spcCol="288000" rtlCol="0" anchor="t" anchorCtr="0">
+            <a:spAutoFit/>
+          </a:bodyPr>
+          <a:lstStyle/>
+          <a:p>
+            <a:pPr algn="l">
+              <a:spcBef>
+                <a:spcPts val="0"/>
+              </a:spcBef>
+              <a:spcAft>
+                <a:spcPts val="600"/>
+              </a:spcAft>
+            </a:pPr>
+            <a:r>
+              <a:rPr lang="en-US" sz="1400" b="0" i="0" spc="0" dirty="0">
+                <a:ln>
+                  <a:noFill/>
+                </a:ln>
+                <a:solidFill>
+                  <a:schemeClr val="tx2"/>
+                </a:solidFill>
+                <a:latin typeface="Source Sans Pro Light" charset="0"/>
+                <a:ea typeface="Source Sans Pro Light" charset="0"/>
+                <a:cs typeface="Source Sans Pro Light" charset="0"/>
+              </a:rPr>
+              <a:t>0 buffer</a:t>
+            </a:r>
+          </a:p>
+        </p:txBody>
+      </p:sp>
+      <p:cxnSp>
+        <p:nvCxnSpPr>
+          <p:cNvPr id="47" name="Connector: Elbow 46">
+            <a:extLst>
+              <a:ext uri="{FF2B5EF4-FFF2-40B4-BE49-F238E27FC236}">
+                <a16:creationId xmlns:a16="http://schemas.microsoft.com/office/drawing/2014/main" id="{4A868C56-EA38-B71D-6DAB-DDEDCC5120CC}"/>
+              </a:ext>
+            </a:extLst>
+          </p:cNvPr>
+          <p:cNvCxnSpPr>
+            <a:cxnSpLocks/>
+            <a:stCxn id="378" idx="7"/>
+            <a:endCxn id="103" idx="0"/>
+          </p:cNvCxnSpPr>
+          <p:nvPr/>
+        </p:nvCxnSpPr>
+        <p:spPr>
+          <a:xfrm>
+            <a:off x="5917366" y="1428897"/>
+            <a:ext cx="1236999" cy="1271838"/>
+          </a:xfrm>
+          <a:prstGeom prst="bentConnector2">
+            <a:avLst/>
+          </a:prstGeom>
+          <a:ln w="19050">
+            <a:tailEnd type="triangle"/>
+          </a:ln>
+        </p:spPr>
+        <p:style>
+          <a:lnRef idx="1">
+            <a:schemeClr val="accent1"/>
+          </a:lnRef>
+          <a:fillRef idx="0">
+            <a:schemeClr val="accent1"/>
+          </a:fillRef>
+          <a:effectRef idx="0">
+            <a:schemeClr val="accent1"/>
+          </a:effectRef>
+          <a:fontRef idx="minor">
+            <a:schemeClr val="tx1"/>
+          </a:fontRef>
+        </p:style>
+      </p:cxnSp>
+      <p:sp>
+        <p:nvSpPr>
+          <p:cNvPr id="101" name="Rectangle: Rounded Corners 100">
+            <a:extLst>
+              <a:ext uri="{FF2B5EF4-FFF2-40B4-BE49-F238E27FC236}">
+                <a16:creationId xmlns:a16="http://schemas.microsoft.com/office/drawing/2014/main" id="{0F43D8D6-21F7-BAE3-9C69-BC7DB4847E15}"/>
+              </a:ext>
+            </a:extLst>
+          </p:cNvPr>
+          <p:cNvSpPr/>
+          <p:nvPr/>
+        </p:nvSpPr>
+        <p:spPr>
+          <a:xfrm>
+            <a:off x="2098159" y="2700735"/>
+            <a:ext cx="1728000" cy="720000"/>
+          </a:xfrm>
+          <a:prstGeom prst="roundRect">
+            <a:avLst/>
+          </a:prstGeom>
+          <a:ln/>
+        </p:spPr>
+        <p:style>
+          <a:lnRef idx="2">
+            <a:schemeClr val="accent5"/>
+          </a:lnRef>
+          <a:fillRef idx="1">
+            <a:schemeClr val="lt1"/>
+          </a:fillRef>
+          <a:effectRef idx="0">
+            <a:schemeClr val="accent5"/>
+          </a:effectRef>
+          <a:fontRef idx="minor">
+            <a:schemeClr val="dk1"/>
+          </a:fontRef>
+        </p:style>
+        <p:txBody>
+          <a:bodyPr rtlCol="0" anchor="ctr"/>
+          <a:lstStyle/>
+          <a:p>
+            <a:pPr algn="ctr"/>
+            <a:r>
+              <a:rPr lang="en-US" sz="2000" b="1" dirty="0">
+                <a:solidFill>
+                  <a:schemeClr val="tx2"/>
+                </a:solidFill>
+                <a:latin typeface="Source Sans Pro Light" panose="020B0403030403020204" pitchFamily="34" charset="77"/>
+                <a:ea typeface="Source Sans Pro" panose="020B0503030403020204" pitchFamily="34" charset="0"/>
+              </a:rPr>
+              <a:t>Partial</a:t>
+            </a:r>
+          </a:p>
+        </p:txBody>
+      </p:sp>
+      <p:sp>
+        <p:nvSpPr>
+          <p:cNvPr id="102" name="Rectangle: Rounded Corners 101">
+            <a:extLst>
+              <a:ext uri="{FF2B5EF4-FFF2-40B4-BE49-F238E27FC236}">
+                <a16:creationId xmlns:a16="http://schemas.microsoft.com/office/drawing/2014/main" id="{694AD508-D760-BCA6-5CF3-4F77C6AF53A6}"/>
+              </a:ext>
+            </a:extLst>
+          </p:cNvPr>
+          <p:cNvSpPr/>
+          <p:nvPr/>
+        </p:nvSpPr>
+        <p:spPr>
+          <a:xfrm>
+            <a:off x="4194262" y="2700735"/>
+            <a:ext cx="1728000" cy="720000"/>
+          </a:xfrm>
+          <a:prstGeom prst="roundRect">
+            <a:avLst/>
+          </a:prstGeom>
+          <a:ln/>
+        </p:spPr>
+        <p:style>
+          <a:lnRef idx="2">
+            <a:schemeClr val="accent5"/>
+          </a:lnRef>
+          <a:fillRef idx="1">
+            <a:schemeClr val="lt1"/>
+          </a:fillRef>
+          <a:effectRef idx="0">
+            <a:schemeClr val="accent5"/>
+          </a:effectRef>
+          <a:fontRef idx="minor">
+            <a:schemeClr val="dk1"/>
+          </a:fontRef>
+        </p:style>
+        <p:txBody>
+          <a:bodyPr rtlCol="0" anchor="ctr"/>
+          <a:lstStyle/>
+          <a:p>
+            <a:pPr algn="ctr"/>
+            <a:r>
+              <a:rPr lang="en-US" sz="2000" b="1" dirty="0">
+                <a:solidFill>
+                  <a:schemeClr val="tx2"/>
+                </a:solidFill>
+                <a:latin typeface="Source Sans Pro Light" panose="020B0403030403020204" pitchFamily="34" charset="77"/>
+                <a:ea typeface="Source Sans Pro" panose="020B0503030403020204" pitchFamily="34" charset="0"/>
+              </a:rPr>
+              <a:t>Single</a:t>
+            </a:r>
+          </a:p>
+        </p:txBody>
+      </p:sp>
+      <p:sp>
+        <p:nvSpPr>
+          <p:cNvPr id="103" name="Rectangle: Rounded Corners 102">
+            <a:extLst>
+              <a:ext uri="{FF2B5EF4-FFF2-40B4-BE49-F238E27FC236}">
+                <a16:creationId xmlns:a16="http://schemas.microsoft.com/office/drawing/2014/main" id="{0503D9B7-F3C6-B8B5-2C8B-020368A0EA2A}"/>
+              </a:ext>
+            </a:extLst>
+          </p:cNvPr>
+          <p:cNvSpPr/>
+          <p:nvPr/>
+        </p:nvSpPr>
+        <p:spPr>
+          <a:xfrm>
+            <a:off x="6290365" y="2700735"/>
+            <a:ext cx="1728000" cy="720000"/>
+          </a:xfrm>
+          <a:prstGeom prst="roundRect">
+            <a:avLst/>
+          </a:prstGeom>
+          <a:ln/>
+        </p:spPr>
+        <p:style>
+          <a:lnRef idx="2">
+            <a:schemeClr val="accent5"/>
+          </a:lnRef>
+          <a:fillRef idx="1">
+            <a:schemeClr val="lt1"/>
+          </a:fillRef>
+          <a:effectRef idx="0">
+            <a:schemeClr val="accent5"/>
+          </a:effectRef>
+          <a:fontRef idx="minor">
+            <a:schemeClr val="dk1"/>
+          </a:fontRef>
+        </p:style>
+        <p:txBody>
+          <a:bodyPr rtlCol="0" anchor="ctr"/>
+          <a:lstStyle/>
+          <a:p>
+            <a:pPr algn="ctr"/>
+            <a:r>
+              <a:rPr lang="en-US" sz="2000" b="1" dirty="0">
+                <a:solidFill>
+                  <a:schemeClr val="tx2"/>
+                </a:solidFill>
+                <a:latin typeface="Source Sans Pro Light" panose="020B0403030403020204" pitchFamily="34" charset="77"/>
+                <a:ea typeface="Source Sans Pro" panose="020B0503030403020204" pitchFamily="34" charset="0"/>
+              </a:rPr>
+              <a:t>Copy &amp; Swap</a:t>
+            </a:r>
+          </a:p>
+        </p:txBody>
+      </p:sp>
+      <p:sp>
+        <p:nvSpPr>
+          <p:cNvPr id="104" name="Rectangle: Rounded Corners 103">
+            <a:extLst>
+              <a:ext uri="{FF2B5EF4-FFF2-40B4-BE49-F238E27FC236}">
+                <a16:creationId xmlns:a16="http://schemas.microsoft.com/office/drawing/2014/main" id="{62699CBC-D300-F506-A40D-2A7ADEE5F9D6}"/>
+              </a:ext>
+            </a:extLst>
+          </p:cNvPr>
+          <p:cNvSpPr/>
+          <p:nvPr/>
+        </p:nvSpPr>
+        <p:spPr>
+          <a:xfrm>
+            <a:off x="2056" y="2700735"/>
+            <a:ext cx="1728000" cy="720000"/>
+          </a:xfrm>
+          <a:prstGeom prst="roundRect">
+            <a:avLst/>
+          </a:prstGeom>
+          <a:ln>
+            <a:solidFill>
+              <a:schemeClr val="accent4">
+                <a:lumMod val="40000"/>
+                <a:lumOff val="60000"/>
+              </a:schemeClr>
+            </a:solidFill>
+            <a:prstDash val="dash"/>
+          </a:ln>
+        </p:spPr>
+        <p:style>
+          <a:lnRef idx="2">
+            <a:schemeClr val="accent5"/>
+          </a:lnRef>
+          <a:fillRef idx="1">
+            <a:schemeClr val="lt1"/>
+          </a:fillRef>
+          <a:effectRef idx="0">
+            <a:schemeClr val="accent5"/>
+          </a:effectRef>
+          <a:fontRef idx="minor">
+            <a:schemeClr val="dk1"/>
+          </a:fontRef>
+        </p:style>
+        <p:txBody>
+          <a:bodyPr rtlCol="0" anchor="ctr"/>
+          <a:lstStyle/>
+          <a:p>
+            <a:pPr algn="ctr"/>
+            <a:r>
+              <a:rPr lang="en-US" sz="2000" b="1" dirty="0">
+                <a:solidFill>
+                  <a:schemeClr val="tx2">
+                    <a:lumMod val="60000"/>
+                    <a:lumOff val="40000"/>
+                  </a:schemeClr>
+                </a:solidFill>
+                <a:latin typeface="Source Sans Pro Light" panose="020B0403030403020204" pitchFamily="34" charset="77"/>
+                <a:ea typeface="Source Sans Pro" panose="020B0503030403020204" pitchFamily="34" charset="0"/>
+              </a:rPr>
+              <a:t>Direct</a:t>
+            </a:r>
+          </a:p>
+        </p:txBody>
+      </p:sp>
+      <p:sp>
+        <p:nvSpPr>
+          <p:cNvPr id="105" name="Rectangle: Rounded Corners 104">
+            <a:extLst>
+              <a:ext uri="{FF2B5EF4-FFF2-40B4-BE49-F238E27FC236}">
+                <a16:creationId xmlns:a16="http://schemas.microsoft.com/office/drawing/2014/main" id="{0AD11061-46BC-FCFF-61CD-7AF65F26DBDA}"/>
+              </a:ext>
+            </a:extLst>
+          </p:cNvPr>
+          <p:cNvSpPr/>
+          <p:nvPr/>
+        </p:nvSpPr>
+        <p:spPr>
+          <a:xfrm>
+            <a:off x="8386468" y="2700735"/>
+            <a:ext cx="1728000" cy="720000"/>
+          </a:xfrm>
+          <a:prstGeom prst="roundRect">
+            <a:avLst/>
+          </a:prstGeom>
+          <a:ln>
+            <a:solidFill>
+              <a:schemeClr val="accent4">
+                <a:lumMod val="40000"/>
+                <a:lumOff val="60000"/>
+              </a:schemeClr>
+            </a:solidFill>
+            <a:prstDash val="dash"/>
+          </a:ln>
+        </p:spPr>
+        <p:style>
+          <a:lnRef idx="2">
+            <a:schemeClr val="accent5"/>
+          </a:lnRef>
+          <a:fillRef idx="1">
+            <a:schemeClr val="lt1"/>
+          </a:fillRef>
+          <a:effectRef idx="0">
+            <a:schemeClr val="accent5"/>
+          </a:effectRef>
+          <a:fontRef idx="minor">
+            <a:schemeClr val="dk1"/>
+          </a:fontRef>
+        </p:style>
+        <p:txBody>
+          <a:bodyPr rtlCol="0" anchor="ctr"/>
+          <a:lstStyle/>
+          <a:p>
+            <a:pPr algn="ctr"/>
+            <a:r>
+              <a:rPr lang="en-US" sz="2000" b="1" dirty="0">
+                <a:solidFill>
+                  <a:schemeClr val="tx2">
+                    <a:lumMod val="60000"/>
+                    <a:lumOff val="40000"/>
+                  </a:schemeClr>
+                </a:solidFill>
+                <a:latin typeface="Source Sans Pro Light" panose="020B0403030403020204" pitchFamily="34" charset="77"/>
+                <a:ea typeface="Source Sans Pro" panose="020B0503030403020204" pitchFamily="34" charset="0"/>
+              </a:rPr>
+              <a:t>Swap Double</a:t>
+            </a:r>
+          </a:p>
+        </p:txBody>
+      </p:sp>
+      <p:sp>
+        <p:nvSpPr>
+          <p:cNvPr id="106" name="Rectangle: Rounded Corners 105">
+            <a:extLst>
+              <a:ext uri="{FF2B5EF4-FFF2-40B4-BE49-F238E27FC236}">
+                <a16:creationId xmlns:a16="http://schemas.microsoft.com/office/drawing/2014/main" id="{544385FC-9ECE-D0DE-9F83-A56B911ABDA0}"/>
+              </a:ext>
+            </a:extLst>
+          </p:cNvPr>
+          <p:cNvSpPr/>
+          <p:nvPr/>
+        </p:nvSpPr>
+        <p:spPr>
+          <a:xfrm>
+            <a:off x="10482569" y="2700735"/>
+            <a:ext cx="1728000" cy="720000"/>
+          </a:xfrm>
+          <a:prstGeom prst="roundRect">
+            <a:avLst/>
+          </a:prstGeom>
+          <a:ln>
+            <a:solidFill>
+              <a:schemeClr val="accent4">
+                <a:lumMod val="40000"/>
+                <a:lumOff val="60000"/>
+              </a:schemeClr>
+            </a:solidFill>
+            <a:prstDash val="dash"/>
+          </a:ln>
+        </p:spPr>
+        <p:style>
+          <a:lnRef idx="2">
+            <a:schemeClr val="accent5"/>
+          </a:lnRef>
+          <a:fillRef idx="1">
+            <a:schemeClr val="lt1"/>
+          </a:fillRef>
+          <a:effectRef idx="0">
+            <a:schemeClr val="accent5"/>
+          </a:effectRef>
+          <a:fontRef idx="minor">
+            <a:schemeClr val="dk1"/>
+          </a:fontRef>
+        </p:style>
+        <p:txBody>
+          <a:bodyPr rtlCol="0" anchor="ctr"/>
+          <a:lstStyle/>
+          <a:p>
+            <a:pPr algn="ctr"/>
+            <a:r>
+              <a:rPr lang="en-US" sz="2000" b="1" dirty="0">
+                <a:solidFill>
+                  <a:schemeClr val="tx2">
+                    <a:lumMod val="60000"/>
+                    <a:lumOff val="40000"/>
+                  </a:schemeClr>
+                </a:solidFill>
+                <a:latin typeface="Source Sans Pro Light" panose="020B0403030403020204" pitchFamily="34" charset="77"/>
+                <a:ea typeface="Source Sans Pro" panose="020B0503030403020204" pitchFamily="34" charset="0"/>
+              </a:rPr>
+              <a:t>Swap Triple</a:t>
+            </a:r>
+          </a:p>
+        </p:txBody>
+      </p:sp>
+      <p:sp>
+        <p:nvSpPr>
+          <p:cNvPr id="378" name="Arrow: Left-Right 377">
+            <a:extLst>
+              <a:ext uri="{FF2B5EF4-FFF2-40B4-BE49-F238E27FC236}">
+                <a16:creationId xmlns:a16="http://schemas.microsoft.com/office/drawing/2014/main" id="{155CF700-018A-24E4-72C8-0FB6DA6D293D}"/>
+              </a:ext>
+            </a:extLst>
+          </p:cNvPr>
+          <p:cNvSpPr/>
+          <p:nvPr/>
+        </p:nvSpPr>
+        <p:spPr>
+          <a:xfrm>
+            <a:off x="4189366" y="1068897"/>
+            <a:ext cx="1728000" cy="720000"/>
+          </a:xfrm>
+          <a:prstGeom prst="leftRightArrow">
+            <a:avLst>
+              <a:gd name="adj1" fmla="val 100000"/>
+              <a:gd name="adj2" fmla="val 28824"/>
+            </a:avLst>
+          </a:prstGeom>
+          <a:ln>
+            <a:headEnd type="none" w="med" len="med"/>
+            <a:tailEnd type="none" w="med" len="med"/>
+          </a:ln>
+        </p:spPr>
+        <p:style>
+          <a:lnRef idx="2">
+            <a:schemeClr val="accent2"/>
+          </a:lnRef>
+          <a:fillRef idx="1">
+            <a:schemeClr val="lt1"/>
+          </a:fillRef>
+          <a:effectRef idx="0">
+            <a:schemeClr val="accent2"/>
+          </a:effectRef>
+          <a:fontRef idx="minor">
+            <a:schemeClr val="dk1"/>
+          </a:fontRef>
+        </p:style>
+        <p:txBody>
+          <a:bodyPr lIns="0" tIns="0" rIns="0" bIns="0" rtlCol="0" anchor="ctr"/>
+          <a:lstStyle/>
+          <a:p>
+            <a:pPr algn="ctr"/>
+            <a:r>
+              <a:rPr lang="en-US" sz="1400" dirty="0">
+                <a:solidFill>
+                  <a:schemeClr val="tx1"/>
+                </a:solidFill>
+              </a:rPr>
+              <a:t>Available RAM</a:t>
+            </a:r>
+          </a:p>
+          <a:p>
+            <a:pPr algn="ctr"/>
+            <a:r>
+              <a:rPr lang="en-US" sz="1400" dirty="0">
+                <a:solidFill>
+                  <a:schemeClr val="tx1"/>
+                </a:solidFill>
+              </a:rPr>
+              <a:t>for n buffer(s)</a:t>
+            </a:r>
+          </a:p>
+        </p:txBody>
+      </p:sp>
+      <p:sp>
+        <p:nvSpPr>
+          <p:cNvPr id="468" name="TextBox 467">
+            <a:extLst>
+              <a:ext uri="{FF2B5EF4-FFF2-40B4-BE49-F238E27FC236}">
+                <a16:creationId xmlns:a16="http://schemas.microsoft.com/office/drawing/2014/main" id="{0D140FD1-2C8B-C196-1BB5-06FE922DE008}"/>
+              </a:ext>
+            </a:extLst>
+          </p:cNvPr>
+          <p:cNvSpPr txBox="1"/>
+          <p:nvPr/>
+        </p:nvSpPr>
+        <p:spPr>
+          <a:xfrm>
+            <a:off x="6085895" y="1137589"/>
+            <a:ext cx="736601" cy="215444"/>
+          </a:xfrm>
+          <a:prstGeom prst="rect">
+            <a:avLst/>
+          </a:prstGeom>
+          <a:noFill/>
+        </p:spPr>
+        <p:txBody>
+          <a:bodyPr vert="horz" wrap="square" lIns="0" tIns="0" rIns="0" bIns="0" numCol="1" spcCol="288000" rtlCol="0" anchor="t" anchorCtr="0">
+            <a:spAutoFit/>
+          </a:bodyPr>
+          <a:lstStyle/>
+          <a:p>
+            <a:pPr algn="l">
+              <a:spcBef>
+                <a:spcPts val="0"/>
+              </a:spcBef>
+              <a:spcAft>
+                <a:spcPts val="600"/>
+              </a:spcAft>
+            </a:pPr>
+            <a:r>
+              <a:rPr lang="en-US" sz="1400" dirty="0">
+                <a:solidFill>
+                  <a:schemeClr val="tx2"/>
+                </a:solidFill>
+                <a:latin typeface="Source Sans Pro Light" charset="0"/>
+                <a:ea typeface="Source Sans Pro Light" charset="0"/>
+                <a:cs typeface="Source Sans Pro Light" charset="0"/>
+              </a:rPr>
+              <a:t>2 buffers</a:t>
+            </a:r>
+            <a:endParaRPr lang="en-US" sz="1400" b="0" i="0" spc="0" dirty="0">
+              <a:ln>
+                <a:noFill/>
+              </a:ln>
+              <a:solidFill>
+                <a:schemeClr val="tx2"/>
+              </a:solidFill>
+              <a:latin typeface="Source Sans Pro Light" charset="0"/>
+              <a:ea typeface="Source Sans Pro Light" charset="0"/>
+              <a:cs typeface="Source Sans Pro Light" charset="0"/>
+            </a:endParaRPr>
+          </a:p>
+        </p:txBody>
+      </p:sp>
+      <p:sp>
+        <p:nvSpPr>
+          <p:cNvPr id="2" name="TextBox 1">
+            <a:extLst>
+              <a:ext uri="{FF2B5EF4-FFF2-40B4-BE49-F238E27FC236}">
+                <a16:creationId xmlns:a16="http://schemas.microsoft.com/office/drawing/2014/main" id="{B8DC905C-BBC6-1CD1-63C9-1357E6EA3A54}"/>
+              </a:ext>
+            </a:extLst>
+          </p:cNvPr>
+          <p:cNvSpPr txBox="1"/>
+          <p:nvPr/>
+        </p:nvSpPr>
+        <p:spPr>
+          <a:xfrm>
+            <a:off x="5168200" y="1859454"/>
+            <a:ext cx="736601" cy="215444"/>
+          </a:xfrm>
+          <a:prstGeom prst="rect">
+            <a:avLst/>
+          </a:prstGeom>
+          <a:noFill/>
+        </p:spPr>
+        <p:txBody>
+          <a:bodyPr vert="horz" wrap="square" lIns="0" tIns="0" rIns="0" bIns="0" numCol="1" spcCol="288000" rtlCol="0" anchor="t" anchorCtr="0">
+            <a:spAutoFit/>
+          </a:bodyPr>
+          <a:lstStyle/>
+          <a:p>
+            <a:pPr algn="l">
+              <a:spcBef>
+                <a:spcPts val="0"/>
+              </a:spcBef>
+              <a:spcAft>
+                <a:spcPts val="600"/>
+              </a:spcAft>
+            </a:pPr>
+            <a:r>
+              <a:rPr lang="en-US" sz="1400" dirty="0">
+                <a:solidFill>
+                  <a:schemeClr val="tx2"/>
+                </a:solidFill>
+                <a:latin typeface="Source Sans Pro Light" charset="0"/>
+                <a:ea typeface="Source Sans Pro Light" charset="0"/>
+                <a:cs typeface="Source Sans Pro Light" charset="0"/>
+              </a:rPr>
+              <a:t>1 buffer</a:t>
+            </a:r>
+            <a:endParaRPr lang="en-US" sz="1400" b="0" i="0" spc="0" dirty="0">
+              <a:ln>
+                <a:noFill/>
+              </a:ln>
+              <a:solidFill>
+                <a:schemeClr val="tx2"/>
+              </a:solidFill>
+              <a:latin typeface="Source Sans Pro Light" charset="0"/>
+              <a:ea typeface="Source Sans Pro Light" charset="0"/>
+              <a:cs typeface="Source Sans Pro Light" charset="0"/>
+            </a:endParaRPr>
+          </a:p>
+        </p:txBody>
+      </p:sp>
+      <p:cxnSp>
+        <p:nvCxnSpPr>
+          <p:cNvPr id="12" name="Straight Arrow Connector 11">
+            <a:extLst>
+              <a:ext uri="{FF2B5EF4-FFF2-40B4-BE49-F238E27FC236}">
+                <a16:creationId xmlns:a16="http://schemas.microsoft.com/office/drawing/2014/main" id="{4101F69D-A413-DA30-5A5F-5B509BE5791F}"/>
+              </a:ext>
+            </a:extLst>
+          </p:cNvPr>
+          <p:cNvCxnSpPr>
+            <a:stCxn id="378" idx="5"/>
+            <a:endCxn id="102" idx="0"/>
+          </p:cNvCxnSpPr>
+          <p:nvPr/>
+        </p:nvCxnSpPr>
+        <p:spPr>
+          <a:xfrm>
+            <a:off x="5053366" y="1788897"/>
+            <a:ext cx="4896" cy="911838"/>
+          </a:xfrm>
+          <a:prstGeom prst="straightConnector1">
+            <a:avLst/>
+          </a:prstGeom>
+          <a:ln w="19050">
+            <a:tailEnd type="triangle"/>
+          </a:ln>
+        </p:spPr>
+        <p:style>
+          <a:lnRef idx="1">
+            <a:schemeClr val="accent1"/>
+          </a:lnRef>
+          <a:fillRef idx="0">
+            <a:schemeClr val="accent1"/>
+          </a:fillRef>
+          <a:effectRef idx="0">
+            <a:schemeClr val="accent1"/>
+          </a:effectRef>
+          <a:fontRef idx="minor">
+            <a:schemeClr val="tx1"/>
+          </a:fontRef>
+        </p:style>
+      </p:cxnSp>
+    </p:spTree>
+    <p:extLst>
+      <p:ext uri="{BB962C8B-B14F-4D97-AF65-F5344CB8AC3E}">
+        <p14:creationId xmlns:p14="http://schemas.microsoft.com/office/powerpoint/2010/main" val="3970490044"/>
+      </p:ext>
+    </p:extLst>
+  </p:cSld>
+  <p:clrMapOvr>
+    <a:masterClrMapping/>
+  </p:clrMapOvr>
+</p:sld>
+</file>
+
+<file path=ppt/slides/slide17.xml><?xml version="1.0" encoding="utf-8"?>
+<p:sld xmlns:a="http://schemas.openxmlformats.org/drawingml/2006/main" xmlns:r="http://schemas.openxmlformats.org/officeDocument/2006/relationships" xmlns:p="http://schemas.openxmlformats.org/presentationml/2006/main">
+  <p:cSld>
+    <p:spTree>
+      <p:nvGrpSpPr>
+        <p:cNvPr id="1" name="">
+          <a:extLst>
+            <a:ext uri="{FF2B5EF4-FFF2-40B4-BE49-F238E27FC236}">
+              <a16:creationId xmlns:a16="http://schemas.microsoft.com/office/drawing/2014/main" id="{B8496C05-7E36-E387-487A-F839E1E144D3}"/>
+            </a:ext>
+          </a:extLst>
+        </p:cNvPr>
+        <p:cNvGrpSpPr/>
+        <p:nvPr/>
+      </p:nvGrpSpPr>
+      <p:grpSpPr>
+        <a:xfrm>
+          <a:off x="0" y="0"/>
+          <a:ext cx="0" cy="0"/>
+          <a:chOff x="0" y="0"/>
+          <a:chExt cx="0" cy="0"/>
+        </a:xfrm>
+      </p:grpSpPr>
+      <p:sp>
+        <p:nvSpPr>
+          <p:cNvPr id="101" name="Rectangle: Rounded Corners 100">
+            <a:extLst>
+              <a:ext uri="{FF2B5EF4-FFF2-40B4-BE49-F238E27FC236}">
+                <a16:creationId xmlns:a16="http://schemas.microsoft.com/office/drawing/2014/main" id="{E65FC6EA-4686-177B-A786-DC2C95951F5B}"/>
+              </a:ext>
+            </a:extLst>
+          </p:cNvPr>
+          <p:cNvSpPr/>
+          <p:nvPr/>
+        </p:nvSpPr>
+        <p:spPr>
+          <a:xfrm>
+            <a:off x="2096103" y="4311820"/>
+            <a:ext cx="1728000" cy="720000"/>
+          </a:xfrm>
+          <a:prstGeom prst="roundRect">
+            <a:avLst/>
+          </a:prstGeom>
+          <a:ln/>
+        </p:spPr>
+        <p:style>
+          <a:lnRef idx="2">
+            <a:schemeClr val="accent5"/>
+          </a:lnRef>
+          <a:fillRef idx="1">
+            <a:schemeClr val="lt1"/>
+          </a:fillRef>
+          <a:effectRef idx="0">
+            <a:schemeClr val="accent5"/>
+          </a:effectRef>
+          <a:fontRef idx="minor">
+            <a:schemeClr val="dk1"/>
+          </a:fontRef>
+        </p:style>
+        <p:txBody>
+          <a:bodyPr rtlCol="0" anchor="ctr"/>
+          <a:lstStyle/>
+          <a:p>
+            <a:pPr algn="ctr"/>
+            <a:r>
+              <a:rPr lang="en-US" sz="2000" b="1" dirty="0">
+                <a:solidFill>
+                  <a:schemeClr val="tx2"/>
+                </a:solidFill>
+                <a:latin typeface="Source Sans Pro Light" panose="020B0403030403020204" pitchFamily="34" charset="77"/>
+                <a:ea typeface="Source Sans Pro" panose="020B0503030403020204" pitchFamily="34" charset="0"/>
+              </a:rPr>
+              <a:t>Partial</a:t>
+            </a:r>
+          </a:p>
+        </p:txBody>
+      </p:sp>
+      <p:sp>
+        <p:nvSpPr>
+          <p:cNvPr id="102" name="Rectangle: Rounded Corners 101">
+            <a:extLst>
+              <a:ext uri="{FF2B5EF4-FFF2-40B4-BE49-F238E27FC236}">
+                <a16:creationId xmlns:a16="http://schemas.microsoft.com/office/drawing/2014/main" id="{090CFE8F-6454-F3A2-573B-5F98589B6039}"/>
+              </a:ext>
+            </a:extLst>
+          </p:cNvPr>
+          <p:cNvSpPr/>
+          <p:nvPr/>
+        </p:nvSpPr>
+        <p:spPr>
+          <a:xfrm>
+            <a:off x="4192206" y="4311820"/>
+            <a:ext cx="1728000" cy="720000"/>
+          </a:xfrm>
+          <a:prstGeom prst="roundRect">
+            <a:avLst/>
+          </a:prstGeom>
+          <a:ln/>
+        </p:spPr>
+        <p:style>
+          <a:lnRef idx="2">
+            <a:schemeClr val="accent5"/>
+          </a:lnRef>
+          <a:fillRef idx="1">
+            <a:schemeClr val="lt1"/>
+          </a:fillRef>
+          <a:effectRef idx="0">
+            <a:schemeClr val="accent5"/>
+          </a:effectRef>
+          <a:fontRef idx="minor">
+            <a:schemeClr val="dk1"/>
+          </a:fontRef>
+        </p:style>
+        <p:txBody>
+          <a:bodyPr rtlCol="0" anchor="ctr"/>
+          <a:lstStyle/>
+          <a:p>
+            <a:pPr algn="ctr"/>
+            <a:r>
+              <a:rPr lang="en-US" sz="2000" b="1" dirty="0">
+                <a:solidFill>
+                  <a:schemeClr val="tx2"/>
+                </a:solidFill>
+                <a:latin typeface="Source Sans Pro Light" panose="020B0403030403020204" pitchFamily="34" charset="77"/>
+                <a:ea typeface="Source Sans Pro" panose="020B0503030403020204" pitchFamily="34" charset="0"/>
+              </a:rPr>
+              <a:t>Single</a:t>
+            </a:r>
+          </a:p>
+        </p:txBody>
+      </p:sp>
+      <p:sp>
+        <p:nvSpPr>
+          <p:cNvPr id="103" name="Rectangle: Rounded Corners 102">
+            <a:extLst>
+              <a:ext uri="{FF2B5EF4-FFF2-40B4-BE49-F238E27FC236}">
+                <a16:creationId xmlns:a16="http://schemas.microsoft.com/office/drawing/2014/main" id="{F40C5512-0F15-2C7D-CE61-A408875D4270}"/>
+              </a:ext>
+            </a:extLst>
+          </p:cNvPr>
+          <p:cNvSpPr/>
+          <p:nvPr/>
+        </p:nvSpPr>
+        <p:spPr>
+          <a:xfrm>
+            <a:off x="6288309" y="4311820"/>
+            <a:ext cx="1728000" cy="720000"/>
+          </a:xfrm>
+          <a:prstGeom prst="roundRect">
+            <a:avLst/>
+          </a:prstGeom>
+          <a:ln/>
+        </p:spPr>
+        <p:style>
+          <a:lnRef idx="2">
+            <a:schemeClr val="accent5"/>
+          </a:lnRef>
+          <a:fillRef idx="1">
+            <a:schemeClr val="lt1"/>
+          </a:fillRef>
+          <a:effectRef idx="0">
+            <a:schemeClr val="accent5"/>
+          </a:effectRef>
+          <a:fontRef idx="minor">
+            <a:schemeClr val="dk1"/>
+          </a:fontRef>
+        </p:style>
+        <p:txBody>
+          <a:bodyPr rtlCol="0" anchor="ctr"/>
+          <a:lstStyle/>
+          <a:p>
+            <a:pPr algn="ctr"/>
+            <a:r>
+              <a:rPr lang="en-US" sz="2000" b="1" dirty="0">
+                <a:solidFill>
+                  <a:schemeClr val="tx2"/>
+                </a:solidFill>
+                <a:latin typeface="Source Sans Pro Light" panose="020B0403030403020204" pitchFamily="34" charset="77"/>
+                <a:ea typeface="Source Sans Pro" panose="020B0503030403020204" pitchFamily="34" charset="0"/>
+              </a:rPr>
+              <a:t>Copy &amp; Swap</a:t>
+            </a:r>
+          </a:p>
+        </p:txBody>
+      </p:sp>
+      <p:sp>
+        <p:nvSpPr>
+          <p:cNvPr id="104" name="Rectangle: Rounded Corners 103">
+            <a:extLst>
+              <a:ext uri="{FF2B5EF4-FFF2-40B4-BE49-F238E27FC236}">
+                <a16:creationId xmlns:a16="http://schemas.microsoft.com/office/drawing/2014/main" id="{A377A9F4-1F4D-FBC3-5905-530B9281146E}"/>
+              </a:ext>
+            </a:extLst>
+          </p:cNvPr>
+          <p:cNvSpPr/>
+          <p:nvPr/>
+        </p:nvSpPr>
+        <p:spPr>
+          <a:xfrm>
+            <a:off x="0" y="4311820"/>
+            <a:ext cx="1728000" cy="720000"/>
+          </a:xfrm>
+          <a:prstGeom prst="roundRect">
+            <a:avLst/>
+          </a:prstGeom>
+          <a:ln/>
+        </p:spPr>
+        <p:style>
+          <a:lnRef idx="2">
+            <a:schemeClr val="accent5"/>
+          </a:lnRef>
+          <a:fillRef idx="1">
+            <a:schemeClr val="lt1"/>
+          </a:fillRef>
+          <a:effectRef idx="0">
+            <a:schemeClr val="accent5"/>
+          </a:effectRef>
+          <a:fontRef idx="minor">
+            <a:schemeClr val="dk1"/>
+          </a:fontRef>
+        </p:style>
+        <p:txBody>
+          <a:bodyPr rtlCol="0" anchor="ctr"/>
+          <a:lstStyle/>
+          <a:p>
+            <a:pPr algn="ctr"/>
+            <a:r>
+              <a:rPr lang="en-US" sz="2000" b="1" dirty="0">
+                <a:solidFill>
+                  <a:schemeClr val="tx2"/>
+                </a:solidFill>
+                <a:latin typeface="Source Sans Pro Light" panose="020B0403030403020204" pitchFamily="34" charset="77"/>
+                <a:ea typeface="Source Sans Pro" panose="020B0503030403020204" pitchFamily="34" charset="0"/>
+              </a:rPr>
+              <a:t>Direct</a:t>
+            </a:r>
+          </a:p>
+        </p:txBody>
+      </p:sp>
+      <p:sp>
+        <p:nvSpPr>
+          <p:cNvPr id="105" name="Rectangle: Rounded Corners 104">
+            <a:extLst>
+              <a:ext uri="{FF2B5EF4-FFF2-40B4-BE49-F238E27FC236}">
+                <a16:creationId xmlns:a16="http://schemas.microsoft.com/office/drawing/2014/main" id="{54E8E622-C173-8DC2-E404-55D07A9D2751}"/>
+              </a:ext>
+            </a:extLst>
+          </p:cNvPr>
+          <p:cNvSpPr/>
+          <p:nvPr/>
+        </p:nvSpPr>
+        <p:spPr>
+          <a:xfrm>
+            <a:off x="8384412" y="4311820"/>
+            <a:ext cx="1728000" cy="720000"/>
+          </a:xfrm>
+          <a:prstGeom prst="roundRect">
+            <a:avLst/>
+          </a:prstGeom>
+          <a:ln/>
+        </p:spPr>
+        <p:style>
+          <a:lnRef idx="2">
+            <a:schemeClr val="accent5"/>
+          </a:lnRef>
+          <a:fillRef idx="1">
+            <a:schemeClr val="lt1"/>
+          </a:fillRef>
+          <a:effectRef idx="0">
+            <a:schemeClr val="accent5"/>
+          </a:effectRef>
+          <a:fontRef idx="minor">
+            <a:schemeClr val="dk1"/>
+          </a:fontRef>
+        </p:style>
+        <p:txBody>
+          <a:bodyPr rtlCol="0" anchor="ctr"/>
+          <a:lstStyle/>
+          <a:p>
+            <a:pPr algn="ctr"/>
+            <a:r>
+              <a:rPr lang="en-US" sz="2000" b="1" dirty="0">
+                <a:solidFill>
+                  <a:schemeClr val="tx2"/>
+                </a:solidFill>
+                <a:latin typeface="Source Sans Pro Light" panose="020B0403030403020204" pitchFamily="34" charset="77"/>
+                <a:ea typeface="Source Sans Pro" panose="020B0503030403020204" pitchFamily="34" charset="0"/>
+              </a:rPr>
+              <a:t>Swap Double</a:t>
+            </a:r>
+          </a:p>
+        </p:txBody>
+      </p:sp>
+      <p:sp>
+        <p:nvSpPr>
+          <p:cNvPr id="106" name="Rectangle: Rounded Corners 105">
+            <a:extLst>
+              <a:ext uri="{FF2B5EF4-FFF2-40B4-BE49-F238E27FC236}">
+                <a16:creationId xmlns:a16="http://schemas.microsoft.com/office/drawing/2014/main" id="{2DBB197D-6CDB-B9E1-0BEE-11457415AD75}"/>
+              </a:ext>
+            </a:extLst>
+          </p:cNvPr>
+          <p:cNvSpPr/>
+          <p:nvPr/>
+        </p:nvSpPr>
+        <p:spPr>
+          <a:xfrm>
+            <a:off x="10480513" y="4311820"/>
+            <a:ext cx="1728000" cy="720000"/>
+          </a:xfrm>
+          <a:prstGeom prst="roundRect">
+            <a:avLst/>
+          </a:prstGeom>
+          <a:ln/>
+        </p:spPr>
+        <p:style>
+          <a:lnRef idx="2">
+            <a:schemeClr val="accent5"/>
+          </a:lnRef>
+          <a:fillRef idx="1">
+            <a:schemeClr val="lt1"/>
+          </a:fillRef>
+          <a:effectRef idx="0">
+            <a:schemeClr val="accent5"/>
+          </a:effectRef>
+          <a:fontRef idx="minor">
+            <a:schemeClr val="dk1"/>
+          </a:fontRef>
+        </p:style>
+        <p:txBody>
+          <a:bodyPr rtlCol="0" anchor="ctr"/>
+          <a:lstStyle/>
+          <a:p>
+            <a:pPr algn="ctr"/>
+            <a:r>
+              <a:rPr lang="en-US" sz="2000" b="1" dirty="0">
+                <a:solidFill>
+                  <a:schemeClr val="tx2"/>
+                </a:solidFill>
+                <a:latin typeface="Source Sans Pro Light" panose="020B0403030403020204" pitchFamily="34" charset="77"/>
+                <a:ea typeface="Source Sans Pro" panose="020B0503030403020204" pitchFamily="34" charset="0"/>
+              </a:rPr>
+              <a:t>Swap Triple</a:t>
+            </a:r>
+          </a:p>
+        </p:txBody>
+      </p:sp>
+      <p:sp>
+        <p:nvSpPr>
+          <p:cNvPr id="30" name="Arrow: Left-Right 29">
+            <a:extLst>
+              <a:ext uri="{FF2B5EF4-FFF2-40B4-BE49-F238E27FC236}">
+                <a16:creationId xmlns:a16="http://schemas.microsoft.com/office/drawing/2014/main" id="{89E72019-1F27-A6FD-1CA5-CDBFFD58B234}"/>
+              </a:ext>
+            </a:extLst>
+          </p:cNvPr>
+          <p:cNvSpPr/>
+          <p:nvPr/>
+        </p:nvSpPr>
+        <p:spPr>
+          <a:xfrm>
+            <a:off x="7371580" y="2071270"/>
+            <a:ext cx="1727409" cy="787987"/>
+          </a:xfrm>
+          <a:prstGeom prst="leftRightArrow">
+            <a:avLst>
+              <a:gd name="adj1" fmla="val 100000"/>
+              <a:gd name="adj2" fmla="val 28824"/>
+            </a:avLst>
+          </a:prstGeom>
+          <a:ln>
+            <a:headEnd type="none" w="med" len="med"/>
+            <a:tailEnd type="none" w="med" len="med"/>
+          </a:ln>
+        </p:spPr>
+        <p:style>
+          <a:lnRef idx="2">
+            <a:schemeClr val="accent2"/>
+          </a:lnRef>
+          <a:fillRef idx="1">
+            <a:schemeClr val="lt1"/>
+          </a:fillRef>
+          <a:effectRef idx="0">
+            <a:schemeClr val="accent2"/>
+          </a:effectRef>
+          <a:fontRef idx="minor">
+            <a:schemeClr val="dk1"/>
+          </a:fontRef>
+        </p:style>
+        <p:txBody>
+          <a:bodyPr lIns="0" tIns="0" rIns="0" bIns="0" rtlCol="0" anchor="ctr"/>
+          <a:lstStyle/>
+          <a:p>
+            <a:pPr algn="ctr"/>
+            <a:r>
+              <a:rPr lang="en-US" sz="1400" dirty="0">
+                <a:solidFill>
+                  <a:schemeClr val="tx1"/>
+                </a:solidFill>
+              </a:rPr>
+              <a:t>Display can</a:t>
+            </a:r>
+          </a:p>
+          <a:p>
+            <a:pPr algn="ctr"/>
+            <a:r>
+              <a:rPr lang="en-US" sz="1400" dirty="0">
+                <a:solidFill>
+                  <a:schemeClr val="tx1"/>
+                </a:solidFill>
+              </a:rPr>
+              <a:t>change its source</a:t>
+            </a:r>
+          </a:p>
+          <a:p>
+            <a:pPr algn="ctr"/>
+            <a:r>
+              <a:rPr lang="en-US" sz="1400" dirty="0">
+                <a:solidFill>
+                  <a:schemeClr val="tx1"/>
+                </a:solidFill>
+              </a:rPr>
+              <a:t>buffer address</a:t>
+            </a:r>
+          </a:p>
+        </p:txBody>
+      </p:sp>
+      <p:cxnSp>
+        <p:nvCxnSpPr>
+          <p:cNvPr id="178" name="Connector: Elbow 177">
+            <a:extLst>
+              <a:ext uri="{FF2B5EF4-FFF2-40B4-BE49-F238E27FC236}">
+                <a16:creationId xmlns:a16="http://schemas.microsoft.com/office/drawing/2014/main" id="{2162A338-10D2-2261-974A-C58F035B2349}"/>
+              </a:ext>
+            </a:extLst>
+          </p:cNvPr>
+          <p:cNvCxnSpPr>
+            <a:cxnSpLocks/>
+            <a:stCxn id="374" idx="3"/>
+            <a:endCxn id="373" idx="1"/>
+          </p:cNvCxnSpPr>
+          <p:nvPr/>
+        </p:nvCxnSpPr>
+        <p:spPr>
+          <a:xfrm rot="10800000" flipV="1">
+            <a:off x="1868195" y="1778565"/>
+            <a:ext cx="1132989" cy="1088202"/>
+          </a:xfrm>
+          <a:prstGeom prst="bentConnector2">
+            <a:avLst/>
+          </a:prstGeom>
+          <a:ln w="19050">
+            <a:tailEnd type="triangle"/>
+          </a:ln>
+        </p:spPr>
+        <p:style>
+          <a:lnRef idx="1">
+            <a:schemeClr val="accent1"/>
+          </a:lnRef>
+          <a:fillRef idx="0">
+            <a:schemeClr val="accent1"/>
+          </a:fillRef>
+          <a:effectRef idx="0">
+            <a:schemeClr val="accent1"/>
+          </a:effectRef>
+          <a:fontRef idx="minor">
+            <a:schemeClr val="tx1"/>
+          </a:fontRef>
+        </p:style>
+      </p:cxnSp>
+      <p:cxnSp>
+        <p:nvCxnSpPr>
+          <p:cNvPr id="185" name="Connector: Elbow 184">
+            <a:extLst>
+              <a:ext uri="{FF2B5EF4-FFF2-40B4-BE49-F238E27FC236}">
+                <a16:creationId xmlns:a16="http://schemas.microsoft.com/office/drawing/2014/main" id="{74827B9F-2B5E-E53D-4BD8-12990D2DC78F}"/>
+              </a:ext>
+            </a:extLst>
+          </p:cNvPr>
+          <p:cNvCxnSpPr>
+            <a:cxnSpLocks/>
+            <a:stCxn id="374" idx="7"/>
+            <a:endCxn id="30" idx="1"/>
+          </p:cNvCxnSpPr>
+          <p:nvPr/>
+        </p:nvCxnSpPr>
+        <p:spPr>
+          <a:xfrm>
+            <a:off x="4729183" y="1778565"/>
+            <a:ext cx="3506102" cy="292705"/>
+          </a:xfrm>
+          <a:prstGeom prst="bentConnector2">
+            <a:avLst/>
+          </a:prstGeom>
+          <a:ln w="19050">
+            <a:tailEnd type="triangle"/>
+          </a:ln>
+        </p:spPr>
+        <p:style>
+          <a:lnRef idx="1">
+            <a:schemeClr val="accent1"/>
+          </a:lnRef>
+          <a:fillRef idx="0">
+            <a:schemeClr val="accent1"/>
+          </a:fillRef>
+          <a:effectRef idx="0">
+            <a:schemeClr val="accent1"/>
+          </a:effectRef>
+          <a:fontRef idx="minor">
+            <a:schemeClr val="tx1"/>
+          </a:fontRef>
+        </p:style>
+      </p:cxnSp>
+      <p:cxnSp>
+        <p:nvCxnSpPr>
+          <p:cNvPr id="191" name="Connector: Elbow 190">
+            <a:extLst>
+              <a:ext uri="{FF2B5EF4-FFF2-40B4-BE49-F238E27FC236}">
+                <a16:creationId xmlns:a16="http://schemas.microsoft.com/office/drawing/2014/main" id="{245C8C6D-A8AD-54E5-8B4B-3EE172CCA34B}"/>
+              </a:ext>
+            </a:extLst>
+          </p:cNvPr>
+          <p:cNvCxnSpPr>
+            <a:cxnSpLocks/>
+            <a:stCxn id="376" idx="3"/>
+            <a:endCxn id="102" idx="0"/>
+          </p:cNvCxnSpPr>
+          <p:nvPr/>
+        </p:nvCxnSpPr>
+        <p:spPr>
+          <a:xfrm rot="10800000" flipV="1">
+            <a:off x="5056206" y="3260760"/>
+            <a:ext cx="140194" cy="1051059"/>
+          </a:xfrm>
+          <a:prstGeom prst="bentConnector2">
+            <a:avLst/>
+          </a:prstGeom>
+          <a:ln w="19050">
+            <a:tailEnd type="triangle"/>
+          </a:ln>
+        </p:spPr>
+        <p:style>
+          <a:lnRef idx="1">
+            <a:schemeClr val="accent1"/>
+          </a:lnRef>
+          <a:fillRef idx="0">
+            <a:schemeClr val="accent1"/>
+          </a:fillRef>
+          <a:effectRef idx="0">
+            <a:schemeClr val="accent1"/>
+          </a:effectRef>
+          <a:fontRef idx="minor">
+            <a:schemeClr val="tx1"/>
+          </a:fontRef>
+        </p:style>
+      </p:cxnSp>
+      <p:cxnSp>
+        <p:nvCxnSpPr>
+          <p:cNvPr id="194" name="Connector: Elbow 193">
+            <a:extLst>
+              <a:ext uri="{FF2B5EF4-FFF2-40B4-BE49-F238E27FC236}">
+                <a16:creationId xmlns:a16="http://schemas.microsoft.com/office/drawing/2014/main" id="{DC52333A-36D6-EC56-8862-937B50289A3A}"/>
+              </a:ext>
+            </a:extLst>
+          </p:cNvPr>
+          <p:cNvCxnSpPr>
+            <a:cxnSpLocks/>
+            <a:stCxn id="376" idx="7"/>
+            <a:endCxn id="103" idx="0"/>
+          </p:cNvCxnSpPr>
+          <p:nvPr/>
+        </p:nvCxnSpPr>
+        <p:spPr>
+          <a:xfrm>
+            <a:off x="6924400" y="3260761"/>
+            <a:ext cx="227909" cy="1051059"/>
+          </a:xfrm>
+          <a:prstGeom prst="bentConnector2">
+            <a:avLst/>
+          </a:prstGeom>
+          <a:ln w="19050">
+            <a:tailEnd type="triangle"/>
+          </a:ln>
+        </p:spPr>
+        <p:style>
+          <a:lnRef idx="1">
+            <a:schemeClr val="accent1"/>
+          </a:lnRef>
+          <a:fillRef idx="0">
+            <a:schemeClr val="accent1"/>
+          </a:fillRef>
+          <a:effectRef idx="0">
+            <a:schemeClr val="accent1"/>
+          </a:effectRef>
+          <a:fontRef idx="minor">
+            <a:schemeClr val="tx1"/>
+          </a:fontRef>
+        </p:style>
+      </p:cxnSp>
+      <p:cxnSp>
+        <p:nvCxnSpPr>
+          <p:cNvPr id="199" name="Connector: Elbow 198">
+            <a:extLst>
+              <a:ext uri="{FF2B5EF4-FFF2-40B4-BE49-F238E27FC236}">
+                <a16:creationId xmlns:a16="http://schemas.microsoft.com/office/drawing/2014/main" id="{432674B4-8CB2-5768-AC43-649822860DD3}"/>
+              </a:ext>
+            </a:extLst>
+          </p:cNvPr>
+          <p:cNvCxnSpPr>
+            <a:cxnSpLocks/>
+            <a:stCxn id="375" idx="3"/>
+            <a:endCxn id="105" idx="0"/>
+          </p:cNvCxnSpPr>
+          <p:nvPr/>
+        </p:nvCxnSpPr>
+        <p:spPr>
+          <a:xfrm rot="10800000" flipV="1">
+            <a:off x="9248412" y="3260760"/>
+            <a:ext cx="140194" cy="1051059"/>
+          </a:xfrm>
+          <a:prstGeom prst="bentConnector2">
+            <a:avLst/>
+          </a:prstGeom>
+          <a:ln w="19050">
+            <a:tailEnd type="triangle"/>
+          </a:ln>
+        </p:spPr>
+        <p:style>
+          <a:lnRef idx="1">
+            <a:schemeClr val="accent1"/>
+          </a:lnRef>
+          <a:fillRef idx="0">
+            <a:schemeClr val="accent1"/>
+          </a:fillRef>
+          <a:effectRef idx="0">
+            <a:schemeClr val="accent1"/>
+          </a:effectRef>
+          <a:fontRef idx="minor">
+            <a:schemeClr val="tx1"/>
+          </a:fontRef>
+        </p:style>
+      </p:cxnSp>
+      <p:cxnSp>
+        <p:nvCxnSpPr>
+          <p:cNvPr id="202" name="Connector: Elbow 201">
+            <a:extLst>
+              <a:ext uri="{FF2B5EF4-FFF2-40B4-BE49-F238E27FC236}">
+                <a16:creationId xmlns:a16="http://schemas.microsoft.com/office/drawing/2014/main" id="{9611FAAD-60A8-C5EA-5DA2-B18164557B34}"/>
+              </a:ext>
+            </a:extLst>
+          </p:cNvPr>
+          <p:cNvCxnSpPr>
+            <a:cxnSpLocks/>
+            <a:stCxn id="375" idx="7"/>
+            <a:endCxn id="106" idx="0"/>
+          </p:cNvCxnSpPr>
+          <p:nvPr/>
+        </p:nvCxnSpPr>
+        <p:spPr>
+          <a:xfrm>
+            <a:off x="11116606" y="3260761"/>
+            <a:ext cx="227907" cy="1051059"/>
+          </a:xfrm>
+          <a:prstGeom prst="bentConnector2">
+            <a:avLst/>
+          </a:prstGeom>
+          <a:ln w="19050">
+            <a:tailEnd type="triangle"/>
+          </a:ln>
+        </p:spPr>
+        <p:style>
+          <a:lnRef idx="1">
+            <a:schemeClr val="accent1"/>
+          </a:lnRef>
+          <a:fillRef idx="0">
+            <a:schemeClr val="accent1"/>
+          </a:fillRef>
+          <a:effectRef idx="0">
+            <a:schemeClr val="accent1"/>
+          </a:effectRef>
+          <a:fontRef idx="minor">
+            <a:schemeClr val="tx1"/>
+          </a:fontRef>
+        </p:style>
+      </p:cxnSp>
+      <p:cxnSp>
+        <p:nvCxnSpPr>
+          <p:cNvPr id="221" name="Connector: Elbow 220">
+            <a:extLst>
+              <a:ext uri="{FF2B5EF4-FFF2-40B4-BE49-F238E27FC236}">
+                <a16:creationId xmlns:a16="http://schemas.microsoft.com/office/drawing/2014/main" id="{C5A48454-BB09-EFE0-7D79-A0261BCAE488}"/>
+              </a:ext>
+            </a:extLst>
+          </p:cNvPr>
+          <p:cNvCxnSpPr>
+            <a:cxnSpLocks/>
+            <a:stCxn id="30" idx="3"/>
+            <a:endCxn id="376" idx="1"/>
+          </p:cNvCxnSpPr>
+          <p:nvPr/>
+        </p:nvCxnSpPr>
+        <p:spPr>
+          <a:xfrm rot="10800000" flipV="1">
+            <a:off x="6060400" y="2465263"/>
+            <a:ext cx="1311180" cy="401503"/>
+          </a:xfrm>
+          <a:prstGeom prst="bentConnector2">
+            <a:avLst/>
+          </a:prstGeom>
+          <a:ln w="19050">
+            <a:tailEnd type="triangle"/>
+          </a:ln>
+        </p:spPr>
+        <p:style>
+          <a:lnRef idx="1">
+            <a:schemeClr val="accent1"/>
+          </a:lnRef>
+          <a:fillRef idx="0">
+            <a:schemeClr val="accent1"/>
+          </a:fillRef>
+          <a:effectRef idx="0">
+            <a:schemeClr val="accent1"/>
+          </a:effectRef>
+          <a:fontRef idx="minor">
+            <a:schemeClr val="tx1"/>
+          </a:fontRef>
+        </p:style>
+      </p:cxnSp>
+      <p:cxnSp>
+        <p:nvCxnSpPr>
+          <p:cNvPr id="224" name="Connector: Elbow 223">
+            <a:extLst>
+              <a:ext uri="{FF2B5EF4-FFF2-40B4-BE49-F238E27FC236}">
+                <a16:creationId xmlns:a16="http://schemas.microsoft.com/office/drawing/2014/main" id="{8F45121B-64C1-47FB-A3CB-EE7A48B6F851}"/>
+              </a:ext>
+            </a:extLst>
+          </p:cNvPr>
+          <p:cNvCxnSpPr>
+            <a:cxnSpLocks/>
+            <a:stCxn id="30" idx="7"/>
+            <a:endCxn id="375" idx="1"/>
+          </p:cNvCxnSpPr>
+          <p:nvPr/>
+        </p:nvCxnSpPr>
+        <p:spPr>
+          <a:xfrm>
+            <a:off x="9098989" y="2465264"/>
+            <a:ext cx="1153617" cy="401503"/>
+          </a:xfrm>
+          <a:prstGeom prst="bentConnector2">
+            <a:avLst/>
+          </a:prstGeom>
+          <a:ln w="19050">
+            <a:tailEnd type="triangle"/>
+          </a:ln>
+        </p:spPr>
+        <p:style>
+          <a:lnRef idx="1">
+            <a:schemeClr val="accent1"/>
+          </a:lnRef>
+          <a:fillRef idx="0">
+            <a:schemeClr val="accent1"/>
+          </a:fillRef>
+          <a:effectRef idx="0">
+            <a:schemeClr val="accent1"/>
+          </a:effectRef>
+          <a:fontRef idx="minor">
+            <a:schemeClr val="tx1"/>
+          </a:fontRef>
+        </p:style>
+      </p:cxnSp>
+      <p:cxnSp>
+        <p:nvCxnSpPr>
+          <p:cNvPr id="227" name="Connector: Elbow 226">
+            <a:extLst>
+              <a:ext uri="{FF2B5EF4-FFF2-40B4-BE49-F238E27FC236}">
+                <a16:creationId xmlns:a16="http://schemas.microsoft.com/office/drawing/2014/main" id="{CFDA01C7-CF54-1431-A94F-A5A9FD54FE54}"/>
+              </a:ext>
+            </a:extLst>
+          </p:cNvPr>
+          <p:cNvCxnSpPr>
+            <a:cxnSpLocks/>
+            <a:stCxn id="373" idx="7"/>
+            <a:endCxn id="101" idx="0"/>
+          </p:cNvCxnSpPr>
+          <p:nvPr/>
+        </p:nvCxnSpPr>
+        <p:spPr>
+          <a:xfrm>
+            <a:off x="2732194" y="3260761"/>
+            <a:ext cx="227909" cy="1051059"/>
+          </a:xfrm>
+          <a:prstGeom prst="bentConnector2">
+            <a:avLst/>
+          </a:prstGeom>
+          <a:ln w="19050">
+            <a:tailEnd type="triangle"/>
+          </a:ln>
+        </p:spPr>
+        <p:style>
+          <a:lnRef idx="1">
+            <a:schemeClr val="accent1"/>
+          </a:lnRef>
+          <a:fillRef idx="0">
+            <a:schemeClr val="accent1"/>
+          </a:fillRef>
+          <a:effectRef idx="0">
+            <a:schemeClr val="accent1"/>
+          </a:effectRef>
+          <a:fontRef idx="minor">
+            <a:schemeClr val="tx1"/>
+          </a:fontRef>
+        </p:style>
+      </p:cxnSp>
+      <p:cxnSp>
+        <p:nvCxnSpPr>
+          <p:cNvPr id="230" name="Connector: Elbow 229">
+            <a:extLst>
+              <a:ext uri="{FF2B5EF4-FFF2-40B4-BE49-F238E27FC236}">
+                <a16:creationId xmlns:a16="http://schemas.microsoft.com/office/drawing/2014/main" id="{2CD08044-6B4B-162F-D7F0-A64158A9248F}"/>
+              </a:ext>
+            </a:extLst>
+          </p:cNvPr>
+          <p:cNvCxnSpPr>
+            <a:cxnSpLocks/>
+            <a:stCxn id="373" idx="3"/>
+            <a:endCxn id="104" idx="0"/>
+          </p:cNvCxnSpPr>
+          <p:nvPr/>
+        </p:nvCxnSpPr>
+        <p:spPr>
+          <a:xfrm rot="10800000" flipV="1">
+            <a:off x="864000" y="3260760"/>
+            <a:ext cx="140194" cy="1051059"/>
+          </a:xfrm>
+          <a:prstGeom prst="bentConnector2">
+            <a:avLst/>
+          </a:prstGeom>
+          <a:ln w="19050">
+            <a:tailEnd type="triangle"/>
+          </a:ln>
+        </p:spPr>
+        <p:style>
+          <a:lnRef idx="1">
+            <a:schemeClr val="accent1"/>
+          </a:lnRef>
+          <a:fillRef idx="0">
+            <a:schemeClr val="accent1"/>
+          </a:fillRef>
+          <a:effectRef idx="0">
+            <a:schemeClr val="accent1"/>
+          </a:effectRef>
+          <a:fontRef idx="minor">
+            <a:schemeClr val="tx1"/>
+          </a:fontRef>
+        </p:style>
+      </p:cxnSp>
+      <p:sp>
+        <p:nvSpPr>
+          <p:cNvPr id="373" name="Arrow: Left-Right 372">
+            <a:extLst>
+              <a:ext uri="{FF2B5EF4-FFF2-40B4-BE49-F238E27FC236}">
+                <a16:creationId xmlns:a16="http://schemas.microsoft.com/office/drawing/2014/main" id="{CECF962D-7DCC-BA70-D27A-12A2E1DC1467}"/>
+              </a:ext>
+            </a:extLst>
+          </p:cNvPr>
+          <p:cNvSpPr/>
+          <p:nvPr/>
+        </p:nvSpPr>
+        <p:spPr>
+          <a:xfrm>
+            <a:off x="1004194" y="2866767"/>
+            <a:ext cx="1728000" cy="787987"/>
+          </a:xfrm>
+          <a:prstGeom prst="leftRightArrow">
+            <a:avLst>
+              <a:gd name="adj1" fmla="val 100000"/>
+              <a:gd name="adj2" fmla="val 28824"/>
+            </a:avLst>
+          </a:prstGeom>
+          <a:ln>
+            <a:headEnd type="none" w="med" len="med"/>
+            <a:tailEnd type="none" w="med" len="med"/>
+          </a:ln>
+        </p:spPr>
+        <p:style>
+          <a:lnRef idx="2">
+            <a:schemeClr val="accent2"/>
+          </a:lnRef>
+          <a:fillRef idx="1">
+            <a:schemeClr val="lt1"/>
+          </a:fillRef>
+          <a:effectRef idx="0">
+            <a:schemeClr val="accent2"/>
+          </a:effectRef>
+          <a:fontRef idx="minor">
+            <a:schemeClr val="dk1"/>
+          </a:fontRef>
+        </p:style>
+        <p:txBody>
+          <a:bodyPr lIns="0" tIns="0" rIns="0" bIns="0" rtlCol="0" anchor="ctr"/>
+          <a:lstStyle/>
+          <a:p>
+            <a:pPr algn="ctr"/>
+            <a:r>
+              <a:rPr lang="en-US" sz="1400" dirty="0">
+                <a:solidFill>
+                  <a:schemeClr val="tx1"/>
+                </a:solidFill>
+              </a:rPr>
+              <a:t>Available RAM</a:t>
+            </a:r>
+          </a:p>
+          <a:p>
+            <a:pPr algn="ctr"/>
+            <a:r>
+              <a:rPr lang="en-US" sz="1400" dirty="0">
+                <a:solidFill>
+                  <a:schemeClr val="tx1"/>
+                </a:solidFill>
+              </a:rPr>
+              <a:t>for a partial buffer</a:t>
+            </a:r>
+          </a:p>
+        </p:txBody>
+      </p:sp>
+      <p:sp>
+        <p:nvSpPr>
+          <p:cNvPr id="374" name="Arrow: Left-Right 373">
+            <a:extLst>
+              <a:ext uri="{FF2B5EF4-FFF2-40B4-BE49-F238E27FC236}">
+                <a16:creationId xmlns:a16="http://schemas.microsoft.com/office/drawing/2014/main" id="{8AD3AE9B-880D-71B9-2348-1027A6C254E5}"/>
+              </a:ext>
+            </a:extLst>
+          </p:cNvPr>
+          <p:cNvSpPr/>
+          <p:nvPr/>
+        </p:nvSpPr>
+        <p:spPr>
+          <a:xfrm>
+            <a:off x="3001183" y="1384571"/>
+            <a:ext cx="1728000" cy="787987"/>
+          </a:xfrm>
+          <a:prstGeom prst="leftRightArrow">
+            <a:avLst>
+              <a:gd name="adj1" fmla="val 100000"/>
+              <a:gd name="adj2" fmla="val 28824"/>
+            </a:avLst>
+          </a:prstGeom>
+          <a:ln>
+            <a:headEnd type="none" w="med" len="med"/>
+            <a:tailEnd type="none" w="med" len="med"/>
+          </a:ln>
+        </p:spPr>
+        <p:style>
+          <a:lnRef idx="2">
+            <a:schemeClr val="accent2"/>
+          </a:lnRef>
+          <a:fillRef idx="1">
+            <a:schemeClr val="lt1"/>
+          </a:fillRef>
+          <a:effectRef idx="0">
+            <a:schemeClr val="accent2"/>
+          </a:effectRef>
+          <a:fontRef idx="minor">
+            <a:schemeClr val="dk1"/>
+          </a:fontRef>
+        </p:style>
+        <p:txBody>
+          <a:bodyPr lIns="0" tIns="0" rIns="0" bIns="0" rtlCol="0" anchor="ctr"/>
+          <a:lstStyle/>
+          <a:p>
+            <a:pPr algn="ctr"/>
+            <a:r>
+              <a:rPr lang="en-US" sz="1400" dirty="0">
+                <a:solidFill>
+                  <a:schemeClr val="tx1"/>
+                </a:solidFill>
+              </a:rPr>
+              <a:t>Available RAM</a:t>
+            </a:r>
+          </a:p>
+          <a:p>
+            <a:pPr algn="ctr"/>
+            <a:r>
+              <a:rPr lang="en-US" sz="1400" dirty="0">
+                <a:solidFill>
+                  <a:schemeClr val="tx1"/>
+                </a:solidFill>
+              </a:rPr>
+              <a:t>for 2 buffers</a:t>
+            </a:r>
+          </a:p>
+        </p:txBody>
+      </p:sp>
+      <p:sp>
+        <p:nvSpPr>
+          <p:cNvPr id="375" name="Arrow: Left-Right 374">
+            <a:extLst>
+              <a:ext uri="{FF2B5EF4-FFF2-40B4-BE49-F238E27FC236}">
+                <a16:creationId xmlns:a16="http://schemas.microsoft.com/office/drawing/2014/main" id="{F5CD0EDD-4DC5-281B-D555-6F7F7092AF79}"/>
+              </a:ext>
+            </a:extLst>
+          </p:cNvPr>
+          <p:cNvSpPr/>
+          <p:nvPr/>
+        </p:nvSpPr>
+        <p:spPr>
+          <a:xfrm>
+            <a:off x="9388606" y="2866767"/>
+            <a:ext cx="1728000" cy="787987"/>
+          </a:xfrm>
+          <a:prstGeom prst="leftRightArrow">
+            <a:avLst>
+              <a:gd name="adj1" fmla="val 100000"/>
+              <a:gd name="adj2" fmla="val 28824"/>
+            </a:avLst>
+          </a:prstGeom>
+          <a:ln>
+            <a:headEnd type="none" w="med" len="med"/>
+            <a:tailEnd type="none" w="med" len="med"/>
+          </a:ln>
+        </p:spPr>
+        <p:style>
+          <a:lnRef idx="2">
+            <a:schemeClr val="accent2"/>
+          </a:lnRef>
+          <a:fillRef idx="1">
+            <a:schemeClr val="lt1"/>
+          </a:fillRef>
+          <a:effectRef idx="0">
+            <a:schemeClr val="accent2"/>
+          </a:effectRef>
+          <a:fontRef idx="minor">
+            <a:schemeClr val="dk1"/>
+          </a:fontRef>
+        </p:style>
+        <p:txBody>
+          <a:bodyPr lIns="0" tIns="0" rIns="0" bIns="0" rtlCol="0" anchor="ctr"/>
+          <a:lstStyle/>
+          <a:p>
+            <a:pPr algn="ctr"/>
+            <a:r>
+              <a:rPr lang="en-US" sz="1400" dirty="0">
+                <a:solidFill>
+                  <a:schemeClr val="tx1"/>
+                </a:solidFill>
+              </a:rPr>
+              <a:t>Available RAM</a:t>
+            </a:r>
+          </a:p>
+          <a:p>
+            <a:pPr algn="ctr"/>
+            <a:r>
+              <a:rPr lang="en-US" sz="1400" dirty="0">
+                <a:solidFill>
+                  <a:schemeClr val="tx1"/>
+                </a:solidFill>
+              </a:rPr>
+              <a:t>for 3 buffers</a:t>
+            </a:r>
+          </a:p>
+        </p:txBody>
+      </p:sp>
+      <p:sp>
+        <p:nvSpPr>
+          <p:cNvPr id="376" name="Arrow: Left-Right 375">
+            <a:extLst>
+              <a:ext uri="{FF2B5EF4-FFF2-40B4-BE49-F238E27FC236}">
+                <a16:creationId xmlns:a16="http://schemas.microsoft.com/office/drawing/2014/main" id="{57668BA7-7304-84B9-5436-413311F7BAF5}"/>
+              </a:ext>
+            </a:extLst>
+          </p:cNvPr>
+          <p:cNvSpPr/>
+          <p:nvPr/>
+        </p:nvSpPr>
+        <p:spPr>
+          <a:xfrm>
+            <a:off x="5196400" y="2866767"/>
+            <a:ext cx="1728000" cy="787987"/>
+          </a:xfrm>
+          <a:prstGeom prst="leftRightArrow">
+            <a:avLst>
+              <a:gd name="adj1" fmla="val 100000"/>
+              <a:gd name="adj2" fmla="val 28824"/>
+            </a:avLst>
+          </a:prstGeom>
+          <a:ln>
+            <a:headEnd type="none" w="med" len="med"/>
+            <a:tailEnd type="none" w="med" len="med"/>
+          </a:ln>
+        </p:spPr>
+        <p:style>
+          <a:lnRef idx="2">
+            <a:schemeClr val="accent2"/>
+          </a:lnRef>
+          <a:fillRef idx="1">
+            <a:schemeClr val="lt1"/>
+          </a:fillRef>
+          <a:effectRef idx="0">
+            <a:schemeClr val="accent2"/>
+          </a:effectRef>
+          <a:fontRef idx="minor">
+            <a:schemeClr val="dk1"/>
+          </a:fontRef>
+        </p:style>
+        <p:txBody>
+          <a:bodyPr lIns="0" tIns="0" rIns="0" bIns="0" rtlCol="0" anchor="ctr"/>
+          <a:lstStyle/>
+          <a:p>
+            <a:pPr algn="ctr"/>
+            <a:r>
+              <a:rPr lang="en-US" sz="1400" dirty="0">
+                <a:solidFill>
+                  <a:schemeClr val="tx1"/>
+                </a:solidFill>
+              </a:rPr>
+              <a:t>Available RAM</a:t>
+            </a:r>
+          </a:p>
+          <a:p>
+            <a:pPr algn="ctr"/>
+            <a:r>
+              <a:rPr lang="en-US" sz="1400" dirty="0">
+                <a:solidFill>
+                  <a:schemeClr val="tx1"/>
+                </a:solidFill>
+              </a:rPr>
+              <a:t>for 3 buffers</a:t>
+            </a:r>
+          </a:p>
+        </p:txBody>
+      </p:sp>
+      <p:sp>
+        <p:nvSpPr>
+          <p:cNvPr id="464" name="TextBox 463">
+            <a:extLst>
+              <a:ext uri="{FF2B5EF4-FFF2-40B4-BE49-F238E27FC236}">
+                <a16:creationId xmlns:a16="http://schemas.microsoft.com/office/drawing/2014/main" id="{17BCC528-E9A2-CDC0-FDBD-D60DD2C4DAD0}"/>
+              </a:ext>
+            </a:extLst>
+          </p:cNvPr>
+          <p:cNvSpPr txBox="1"/>
+          <p:nvPr/>
+        </p:nvSpPr>
+        <p:spPr>
+          <a:xfrm>
+            <a:off x="738921" y="3026082"/>
+            <a:ext cx="296624" cy="235788"/>
+          </a:xfrm>
+          <a:prstGeom prst="rect">
+            <a:avLst/>
+          </a:prstGeom>
+          <a:noFill/>
+        </p:spPr>
+        <p:txBody>
+          <a:bodyPr vert="horz" wrap="square" lIns="0" tIns="0" rIns="0" bIns="0" numCol="1" spcCol="288000" rtlCol="0" anchor="t" anchorCtr="0">
+            <a:spAutoFit/>
+          </a:bodyPr>
+          <a:lstStyle/>
+          <a:p>
+            <a:pPr algn="l">
+              <a:spcBef>
+                <a:spcPts val="0"/>
+              </a:spcBef>
+              <a:spcAft>
+                <a:spcPts val="600"/>
+              </a:spcAft>
+            </a:pPr>
+            <a:r>
+              <a:rPr lang="en-US" sz="1400" b="0" i="0" spc="0" dirty="0">
+                <a:ln>
+                  <a:noFill/>
+                </a:ln>
+                <a:solidFill>
+                  <a:schemeClr val="tx2"/>
+                </a:solidFill>
+                <a:latin typeface="Source Sans Pro Light" charset="0"/>
+                <a:ea typeface="Source Sans Pro Light" charset="0"/>
+                <a:cs typeface="Source Sans Pro Light" charset="0"/>
+              </a:rPr>
+              <a:t>no</a:t>
+            </a:r>
+          </a:p>
+        </p:txBody>
+      </p:sp>
+      <p:sp>
+        <p:nvSpPr>
+          <p:cNvPr id="465" name="TextBox 464">
+            <a:extLst>
+              <a:ext uri="{FF2B5EF4-FFF2-40B4-BE49-F238E27FC236}">
+                <a16:creationId xmlns:a16="http://schemas.microsoft.com/office/drawing/2014/main" id="{5968EFFA-7598-0F04-B72C-88F26C7ADF4A}"/>
+              </a:ext>
+            </a:extLst>
+          </p:cNvPr>
+          <p:cNvSpPr txBox="1"/>
+          <p:nvPr/>
+        </p:nvSpPr>
+        <p:spPr>
+          <a:xfrm>
+            <a:off x="4991435" y="3046247"/>
+            <a:ext cx="296624" cy="235788"/>
+          </a:xfrm>
+          <a:prstGeom prst="rect">
+            <a:avLst/>
+          </a:prstGeom>
+          <a:noFill/>
+        </p:spPr>
+        <p:txBody>
+          <a:bodyPr vert="horz" wrap="square" lIns="0" tIns="0" rIns="0" bIns="0" numCol="1" spcCol="288000" rtlCol="0" anchor="t" anchorCtr="0">
+            <a:spAutoFit/>
+          </a:bodyPr>
+          <a:lstStyle/>
+          <a:p>
+            <a:pPr algn="l">
+              <a:spcBef>
+                <a:spcPts val="0"/>
+              </a:spcBef>
+              <a:spcAft>
+                <a:spcPts val="600"/>
+              </a:spcAft>
+            </a:pPr>
+            <a:r>
+              <a:rPr lang="en-US" sz="1400" b="0" i="0" spc="0" dirty="0">
+                <a:ln>
+                  <a:noFill/>
+                </a:ln>
+                <a:solidFill>
+                  <a:schemeClr val="tx2"/>
+                </a:solidFill>
+                <a:latin typeface="Source Sans Pro Light" charset="0"/>
+                <a:ea typeface="Source Sans Pro Light" charset="0"/>
+                <a:cs typeface="Source Sans Pro Light" charset="0"/>
+              </a:rPr>
+              <a:t>no</a:t>
+            </a:r>
+          </a:p>
+        </p:txBody>
+      </p:sp>
+      <p:sp>
+        <p:nvSpPr>
+          <p:cNvPr id="466" name="TextBox 465">
+            <a:extLst>
+              <a:ext uri="{FF2B5EF4-FFF2-40B4-BE49-F238E27FC236}">
+                <a16:creationId xmlns:a16="http://schemas.microsoft.com/office/drawing/2014/main" id="{2A259C06-59E4-987D-B911-29288C1EB39A}"/>
+              </a:ext>
+            </a:extLst>
+          </p:cNvPr>
+          <p:cNvSpPr txBox="1"/>
+          <p:nvPr/>
+        </p:nvSpPr>
+        <p:spPr>
+          <a:xfrm>
+            <a:off x="7115701" y="2229476"/>
+            <a:ext cx="296624" cy="235788"/>
+          </a:xfrm>
+          <a:prstGeom prst="rect">
+            <a:avLst/>
+          </a:prstGeom>
+          <a:noFill/>
+        </p:spPr>
+        <p:txBody>
+          <a:bodyPr vert="horz" wrap="square" lIns="0" tIns="0" rIns="0" bIns="0" numCol="1" spcCol="288000" rtlCol="0" anchor="t" anchorCtr="0">
+            <a:spAutoFit/>
+          </a:bodyPr>
+          <a:lstStyle/>
+          <a:p>
+            <a:pPr algn="l">
+              <a:spcBef>
+                <a:spcPts val="0"/>
+              </a:spcBef>
+              <a:spcAft>
+                <a:spcPts val="600"/>
+              </a:spcAft>
+            </a:pPr>
+            <a:r>
+              <a:rPr lang="en-US" sz="1400" b="0" i="0" spc="0" dirty="0">
+                <a:ln>
+                  <a:noFill/>
+                </a:ln>
+                <a:solidFill>
+                  <a:schemeClr val="tx2"/>
+                </a:solidFill>
+                <a:latin typeface="Source Sans Pro Light" charset="0"/>
+                <a:ea typeface="Source Sans Pro Light" charset="0"/>
+                <a:cs typeface="Source Sans Pro Light" charset="0"/>
+              </a:rPr>
+              <a:t>no</a:t>
+            </a:r>
+          </a:p>
+        </p:txBody>
+      </p:sp>
+      <p:sp>
+        <p:nvSpPr>
+          <p:cNvPr id="467" name="TextBox 466">
+            <a:extLst>
+              <a:ext uri="{FF2B5EF4-FFF2-40B4-BE49-F238E27FC236}">
+                <a16:creationId xmlns:a16="http://schemas.microsoft.com/office/drawing/2014/main" id="{585776DD-A6E2-B2AC-BF99-E3E2D336D43F}"/>
+              </a:ext>
+            </a:extLst>
+          </p:cNvPr>
+          <p:cNvSpPr txBox="1"/>
+          <p:nvPr/>
+        </p:nvSpPr>
+        <p:spPr>
+          <a:xfrm>
+            <a:off x="9189897" y="3035129"/>
+            <a:ext cx="296624" cy="235788"/>
+          </a:xfrm>
+          <a:prstGeom prst="rect">
+            <a:avLst/>
+          </a:prstGeom>
+          <a:noFill/>
+        </p:spPr>
+        <p:txBody>
+          <a:bodyPr vert="horz" wrap="square" lIns="0" tIns="0" rIns="0" bIns="0" numCol="1" spcCol="288000" rtlCol="0" anchor="t" anchorCtr="0">
+            <a:spAutoFit/>
+          </a:bodyPr>
+          <a:lstStyle/>
+          <a:p>
+            <a:pPr algn="l">
+              <a:spcBef>
+                <a:spcPts val="0"/>
+              </a:spcBef>
+              <a:spcAft>
+                <a:spcPts val="600"/>
+              </a:spcAft>
+            </a:pPr>
+            <a:r>
+              <a:rPr lang="en-US" sz="1400" b="0" i="0" spc="0" dirty="0">
+                <a:ln>
+                  <a:noFill/>
+                </a:ln>
+                <a:solidFill>
+                  <a:schemeClr val="tx2"/>
+                </a:solidFill>
+                <a:latin typeface="Source Sans Pro Light" charset="0"/>
+                <a:ea typeface="Source Sans Pro Light" charset="0"/>
+                <a:cs typeface="Source Sans Pro Light" charset="0"/>
+              </a:rPr>
+              <a:t>no</a:t>
+            </a:r>
+          </a:p>
+        </p:txBody>
+      </p:sp>
+      <p:sp>
+        <p:nvSpPr>
+          <p:cNvPr id="470" name="TextBox 469">
+            <a:extLst>
+              <a:ext uri="{FF2B5EF4-FFF2-40B4-BE49-F238E27FC236}">
+                <a16:creationId xmlns:a16="http://schemas.microsoft.com/office/drawing/2014/main" id="{9C2D2BC6-923B-FE75-87CF-8B67450F659B}"/>
+              </a:ext>
+            </a:extLst>
+          </p:cNvPr>
+          <p:cNvSpPr txBox="1"/>
+          <p:nvPr/>
+        </p:nvSpPr>
+        <p:spPr>
+          <a:xfrm>
+            <a:off x="2756537" y="3017733"/>
+            <a:ext cx="296624" cy="235788"/>
+          </a:xfrm>
+          <a:prstGeom prst="rect">
+            <a:avLst/>
+          </a:prstGeom>
+          <a:noFill/>
+        </p:spPr>
+        <p:txBody>
+          <a:bodyPr vert="horz" wrap="square" lIns="0" tIns="0" rIns="0" bIns="0" numCol="1" spcCol="288000" rtlCol="0" anchor="t" anchorCtr="0">
+            <a:spAutoFit/>
+          </a:bodyPr>
+          <a:lstStyle/>
+          <a:p>
+            <a:pPr algn="l">
+              <a:spcBef>
+                <a:spcPts val="0"/>
+              </a:spcBef>
+              <a:spcAft>
+                <a:spcPts val="600"/>
+              </a:spcAft>
+            </a:pPr>
+            <a:r>
+              <a:rPr lang="en-US" sz="1400" b="0" i="0" spc="0" dirty="0">
+                <a:ln>
+                  <a:noFill/>
+                </a:ln>
+                <a:solidFill>
+                  <a:schemeClr val="tx2"/>
+                </a:solidFill>
+                <a:latin typeface="Source Sans Pro Light" charset="0"/>
+                <a:ea typeface="Source Sans Pro Light" charset="0"/>
+                <a:cs typeface="Source Sans Pro Light" charset="0"/>
+              </a:rPr>
+              <a:t>yes</a:t>
+            </a:r>
+          </a:p>
+        </p:txBody>
+      </p:sp>
+      <p:sp>
+        <p:nvSpPr>
+          <p:cNvPr id="471" name="TextBox 470">
+            <a:extLst>
+              <a:ext uri="{FF2B5EF4-FFF2-40B4-BE49-F238E27FC236}">
+                <a16:creationId xmlns:a16="http://schemas.microsoft.com/office/drawing/2014/main" id="{46397B65-A68D-B28C-C1F7-FD16B412E3BD}"/>
+              </a:ext>
+            </a:extLst>
+          </p:cNvPr>
+          <p:cNvSpPr txBox="1"/>
+          <p:nvPr/>
+        </p:nvSpPr>
+        <p:spPr>
+          <a:xfrm>
+            <a:off x="6909742" y="3006544"/>
+            <a:ext cx="296624" cy="235788"/>
+          </a:xfrm>
+          <a:prstGeom prst="rect">
+            <a:avLst/>
+          </a:prstGeom>
+          <a:noFill/>
+        </p:spPr>
+        <p:txBody>
+          <a:bodyPr vert="horz" wrap="square" lIns="0" tIns="0" rIns="0" bIns="0" numCol="1" spcCol="288000" rtlCol="0" anchor="t" anchorCtr="0">
+            <a:spAutoFit/>
+          </a:bodyPr>
+          <a:lstStyle/>
+          <a:p>
+            <a:pPr algn="l">
+              <a:spcBef>
+                <a:spcPts val="0"/>
+              </a:spcBef>
+              <a:spcAft>
+                <a:spcPts val="600"/>
+              </a:spcAft>
+            </a:pPr>
+            <a:r>
+              <a:rPr lang="en-US" sz="1400" b="0" i="0" spc="0" dirty="0">
+                <a:ln>
+                  <a:noFill/>
+                </a:ln>
+                <a:solidFill>
+                  <a:schemeClr val="tx2"/>
+                </a:solidFill>
+                <a:latin typeface="Source Sans Pro Light" charset="0"/>
+                <a:ea typeface="Source Sans Pro Light" charset="0"/>
+                <a:cs typeface="Source Sans Pro Light" charset="0"/>
+              </a:rPr>
+              <a:t>yes</a:t>
+            </a:r>
+          </a:p>
+        </p:txBody>
+      </p:sp>
+      <p:sp>
+        <p:nvSpPr>
+          <p:cNvPr id="472" name="TextBox 471">
+            <a:extLst>
+              <a:ext uri="{FF2B5EF4-FFF2-40B4-BE49-F238E27FC236}">
+                <a16:creationId xmlns:a16="http://schemas.microsoft.com/office/drawing/2014/main" id="{7AD68D03-AEAA-7E63-DE3D-243BBD032226}"/>
+              </a:ext>
+            </a:extLst>
+          </p:cNvPr>
+          <p:cNvSpPr txBox="1"/>
+          <p:nvPr/>
+        </p:nvSpPr>
+        <p:spPr>
+          <a:xfrm>
+            <a:off x="9098989" y="2232284"/>
+            <a:ext cx="296624" cy="235788"/>
+          </a:xfrm>
+          <a:prstGeom prst="rect">
+            <a:avLst/>
+          </a:prstGeom>
+          <a:noFill/>
+        </p:spPr>
+        <p:txBody>
+          <a:bodyPr vert="horz" wrap="square" lIns="0" tIns="0" rIns="0" bIns="0" numCol="1" spcCol="288000" rtlCol="0" anchor="t" anchorCtr="0">
+            <a:spAutoFit/>
+          </a:bodyPr>
+          <a:lstStyle/>
+          <a:p>
+            <a:pPr algn="l">
+              <a:spcBef>
+                <a:spcPts val="0"/>
+              </a:spcBef>
+              <a:spcAft>
+                <a:spcPts val="600"/>
+              </a:spcAft>
+            </a:pPr>
+            <a:r>
+              <a:rPr lang="en-US" sz="1400" b="0" i="0" spc="0" dirty="0">
+                <a:ln>
+                  <a:noFill/>
+                </a:ln>
+                <a:solidFill>
+                  <a:schemeClr val="tx2"/>
+                </a:solidFill>
+                <a:latin typeface="Source Sans Pro Light" charset="0"/>
+                <a:ea typeface="Source Sans Pro Light" charset="0"/>
+                <a:cs typeface="Source Sans Pro Light" charset="0"/>
+              </a:rPr>
+              <a:t>yes</a:t>
+            </a:r>
+          </a:p>
+        </p:txBody>
+      </p:sp>
+      <p:sp>
+        <p:nvSpPr>
+          <p:cNvPr id="473" name="TextBox 472">
+            <a:extLst>
+              <a:ext uri="{FF2B5EF4-FFF2-40B4-BE49-F238E27FC236}">
+                <a16:creationId xmlns:a16="http://schemas.microsoft.com/office/drawing/2014/main" id="{2C38EEA3-1FB1-5AE4-4A8E-1A130D9C3862}"/>
+              </a:ext>
+            </a:extLst>
+          </p:cNvPr>
+          <p:cNvSpPr txBox="1"/>
+          <p:nvPr/>
+        </p:nvSpPr>
+        <p:spPr>
+          <a:xfrm>
+            <a:off x="11152343" y="3026082"/>
+            <a:ext cx="296624" cy="235788"/>
+          </a:xfrm>
+          <a:prstGeom prst="rect">
+            <a:avLst/>
+          </a:prstGeom>
+          <a:noFill/>
+        </p:spPr>
+        <p:txBody>
+          <a:bodyPr vert="horz" wrap="square" lIns="0" tIns="0" rIns="0" bIns="0" numCol="1" spcCol="288000" rtlCol="0" anchor="t" anchorCtr="0">
+            <a:spAutoFit/>
+          </a:bodyPr>
+          <a:lstStyle/>
+          <a:p>
+            <a:pPr algn="l">
+              <a:spcBef>
+                <a:spcPts val="0"/>
+              </a:spcBef>
+              <a:spcAft>
+                <a:spcPts val="600"/>
+              </a:spcAft>
+            </a:pPr>
+            <a:r>
+              <a:rPr lang="en-US" sz="1400" b="0" i="0" spc="0" dirty="0">
+                <a:ln>
+                  <a:noFill/>
+                </a:ln>
+                <a:solidFill>
+                  <a:schemeClr val="tx2"/>
+                </a:solidFill>
+                <a:latin typeface="Source Sans Pro Light" charset="0"/>
+                <a:ea typeface="Source Sans Pro Light" charset="0"/>
+                <a:cs typeface="Source Sans Pro Light" charset="0"/>
+              </a:rPr>
+              <a:t>yes</a:t>
+            </a:r>
+          </a:p>
+        </p:txBody>
+      </p:sp>
+      <p:sp>
+        <p:nvSpPr>
+          <p:cNvPr id="475" name="TextBox 474">
+            <a:extLst>
+              <a:ext uri="{FF2B5EF4-FFF2-40B4-BE49-F238E27FC236}">
+                <a16:creationId xmlns:a16="http://schemas.microsoft.com/office/drawing/2014/main" id="{C51B25BF-F79C-3F6F-18BA-9B5770652714}"/>
+              </a:ext>
+            </a:extLst>
+          </p:cNvPr>
+          <p:cNvSpPr txBox="1"/>
+          <p:nvPr/>
+        </p:nvSpPr>
+        <p:spPr>
+          <a:xfrm>
+            <a:off x="4774822" y="1542777"/>
+            <a:ext cx="296624" cy="235788"/>
+          </a:xfrm>
+          <a:prstGeom prst="rect">
+            <a:avLst/>
+          </a:prstGeom>
+          <a:noFill/>
+        </p:spPr>
+        <p:txBody>
+          <a:bodyPr vert="horz" wrap="square" lIns="0" tIns="0" rIns="0" bIns="0" numCol="1" spcCol="288000" rtlCol="0" anchor="t" anchorCtr="0">
+            <a:spAutoFit/>
+          </a:bodyPr>
+          <a:lstStyle/>
+          <a:p>
+            <a:pPr algn="l">
+              <a:spcBef>
+                <a:spcPts val="0"/>
+              </a:spcBef>
+              <a:spcAft>
+                <a:spcPts val="600"/>
+              </a:spcAft>
+            </a:pPr>
+            <a:r>
+              <a:rPr lang="en-US" sz="1400" b="0" i="0" spc="0" dirty="0">
+                <a:ln>
+                  <a:noFill/>
+                </a:ln>
+                <a:solidFill>
+                  <a:schemeClr val="tx2"/>
+                </a:solidFill>
+                <a:latin typeface="Source Sans Pro Light" charset="0"/>
+                <a:ea typeface="Source Sans Pro Light" charset="0"/>
+                <a:cs typeface="Source Sans Pro Light" charset="0"/>
+              </a:rPr>
+              <a:t>yes</a:t>
+            </a:r>
+          </a:p>
+        </p:txBody>
+      </p:sp>
+      <p:sp>
+        <p:nvSpPr>
+          <p:cNvPr id="477" name="TextBox 476">
+            <a:extLst>
+              <a:ext uri="{FF2B5EF4-FFF2-40B4-BE49-F238E27FC236}">
+                <a16:creationId xmlns:a16="http://schemas.microsoft.com/office/drawing/2014/main" id="{96B0FEDD-8657-5CC0-E9E9-4213C8378A12}"/>
+              </a:ext>
+            </a:extLst>
+          </p:cNvPr>
+          <p:cNvSpPr txBox="1"/>
+          <p:nvPr/>
+        </p:nvSpPr>
+        <p:spPr>
+          <a:xfrm>
+            <a:off x="2774662" y="1535537"/>
+            <a:ext cx="296624" cy="235788"/>
+          </a:xfrm>
+          <a:prstGeom prst="rect">
+            <a:avLst/>
+          </a:prstGeom>
+          <a:noFill/>
+        </p:spPr>
+        <p:txBody>
+          <a:bodyPr vert="horz" wrap="square" lIns="0" tIns="0" rIns="0" bIns="0" numCol="1" spcCol="288000" rtlCol="0" anchor="t" anchorCtr="0">
+            <a:spAutoFit/>
+          </a:bodyPr>
+          <a:lstStyle/>
+          <a:p>
+            <a:pPr algn="l">
+              <a:spcBef>
+                <a:spcPts val="0"/>
+              </a:spcBef>
+              <a:spcAft>
+                <a:spcPts val="600"/>
+              </a:spcAft>
+            </a:pPr>
+            <a:r>
+              <a:rPr lang="en-US" sz="1400" b="0" i="0" spc="0" dirty="0">
+                <a:ln>
+                  <a:noFill/>
+                </a:ln>
+                <a:solidFill>
+                  <a:schemeClr val="tx2"/>
+                </a:solidFill>
+                <a:latin typeface="Source Sans Pro Light" charset="0"/>
+                <a:ea typeface="Source Sans Pro Light" charset="0"/>
+                <a:cs typeface="Source Sans Pro Light" charset="0"/>
+              </a:rPr>
+              <a:t>no</a:t>
+            </a:r>
+          </a:p>
+        </p:txBody>
+      </p:sp>
+    </p:spTree>
+    <p:extLst>
+      <p:ext uri="{BB962C8B-B14F-4D97-AF65-F5344CB8AC3E}">
+        <p14:creationId xmlns:p14="http://schemas.microsoft.com/office/powerpoint/2010/main" val="2587249731"/>
       </p:ext>
     </p:extLst>
   </p:cSld>

</xml_diff>

<commit_message>
replace the notion of "copy & swap" by "transmit & swap"
</commit_message>
<xml_diff>
--- a/VEEPortingGuide/images/ui_overview2.pptx
+++ b/VEEPortingGuide/images/ui_overview2.pptx
@@ -9650,7 +9650,7 @@
               <a:rPr lang="fr-FR" smtClean="0">
                 <a:latin typeface="Calibri Regular" charset="0"/>
               </a:rPr>
-              <a:t>vendredi 23 février 2024</a:t>
+              <a:t>lundi 18 mars 2024</a:t>
             </a:fld>
             <a:endParaRPr lang="en-US" dirty="0">
               <a:latin typeface="Calibri Regular" charset="0"/>
@@ -9828,7 +9828,7 @@
           <a:p>
             <a:fld id="{885721CF-495B-2B41-A23A-4D3221F80235}" type="datetime2">
               <a:rPr lang="fr-FR" smtClean="0"/>
-              <a:t>vendredi 23 février 2024</a:t>
+              <a:t>lundi 18 mars 2024</a:t>
             </a:fld>
             <a:endParaRPr lang="en-US" dirty="0"/>
           </a:p>
@@ -24092,7 +24092,7 @@
           <a:p>
             <a:fld id="{4E285625-C24A-4341-90BC-6CD71F835625}" type="datetimeFigureOut">
               <a:rPr lang="en-GB" smtClean="0"/>
-              <a:t>23/02/2024</a:t>
+              <a:t>18/03/2024</a:t>
             </a:fld>
             <a:endParaRPr lang="en-GB"/>
           </a:p>
@@ -36093,7 +36093,7 @@
                 <a:latin typeface="Source Sans Pro Light" panose="020B0403030403020204" pitchFamily="34" charset="77"/>
                 <a:ea typeface="Source Sans Pro" panose="020B0503030403020204" pitchFamily="34" charset="0"/>
               </a:rPr>
-              <a:t>Copy &amp; Swap</a:t>
+              <a:t>Transmit &amp; Swap</a:t>
             </a:r>
           </a:p>
         </p:txBody>
@@ -38366,7 +38366,7 @@
                 <a:latin typeface="Source Sans Pro Light" panose="020B0403030403020204" pitchFamily="34" charset="77"/>
                 <a:ea typeface="Source Sans Pro" panose="020B0503030403020204" pitchFamily="34" charset="0"/>
               </a:rPr>
-              <a:t>Copy &amp; Swap</a:t>
+              <a:t>Transmit &amp; Swap</a:t>
             </a:r>
           </a:p>
         </p:txBody>
@@ -40892,7 +40892,7 @@
                 <a:latin typeface="Source Sans Pro Light" panose="020B0403030403020204" pitchFamily="34" charset="77"/>
                 <a:ea typeface="Source Sans Pro" panose="020B0503030403020204" pitchFamily="34" charset="0"/>
               </a:rPr>
-              <a:t>Copy &amp; Swap</a:t>
+              <a:t>Transmit &amp; Swap</a:t>
             </a:r>
           </a:p>
         </p:txBody>
@@ -41511,14 +41511,24 @@
           <a:p>
             <a:pPr algn="ctr"/>
             <a:r>
-              <a:rPr lang="en-US" sz="2000" b="1" dirty="0">
+              <a:rPr lang="en-US" sz="2000" b="1">
                 <a:solidFill>
                   <a:schemeClr val="tx2"/>
                 </a:solidFill>
                 <a:latin typeface="Source Sans Pro Light" panose="020B0403030403020204" pitchFamily="34" charset="77"/>
                 <a:ea typeface="Source Sans Pro" panose="020B0503030403020204" pitchFamily="34" charset="0"/>
               </a:rPr>
-              <a:t>Copy &amp; Swap</a:t>
+              <a:t>Transmit </a:t>
+            </a:r>
+            <a:r>
+              <a:rPr lang="en-US" sz="2000" b="1" dirty="0">
+                <a:solidFill>
+                  <a:schemeClr val="tx2"/>
+                </a:solidFill>
+                <a:latin typeface="Source Sans Pro Light" panose="020B0403030403020204" pitchFamily="34" charset="77"/>
+                <a:ea typeface="Source Sans Pro" panose="020B0503030403020204" pitchFamily="34" charset="0"/>
+              </a:rPr>
+              <a:t>&amp; Swap</a:t>
             </a:r>
           </a:p>
         </p:txBody>

</xml_diff>